<commit_message>
Main Document is almost finished and Updated Presentation
</commit_message>
<xml_diff>
--- a/Documentation/4th Year Project Presentation.pptx
+++ b/Documentation/4th Year Project Presentation.pptx
@@ -7,13 +7,20 @@
   <p:sldIdLst>
     <p:sldId id="256" r:id="rId2"/>
     <p:sldId id="257" r:id="rId3"/>
-    <p:sldId id="258" r:id="rId4"/>
-    <p:sldId id="259" r:id="rId5"/>
-    <p:sldId id="260" r:id="rId6"/>
+    <p:sldId id="265" r:id="rId4"/>
+    <p:sldId id="260" r:id="rId5"/>
+    <p:sldId id="266" r:id="rId6"/>
     <p:sldId id="261" r:id="rId7"/>
-    <p:sldId id="262" r:id="rId8"/>
-    <p:sldId id="264" r:id="rId9"/>
-    <p:sldId id="263" r:id="rId10"/>
+    <p:sldId id="267" r:id="rId8"/>
+    <p:sldId id="258" r:id="rId9"/>
+    <p:sldId id="259" r:id="rId10"/>
+    <p:sldId id="262" r:id="rId11"/>
+    <p:sldId id="268" r:id="rId12"/>
+    <p:sldId id="269" r:id="rId13"/>
+    <p:sldId id="271" r:id="rId14"/>
+    <p:sldId id="270" r:id="rId15"/>
+    <p:sldId id="264" r:id="rId16"/>
+    <p:sldId id="263" r:id="rId17"/>
   </p:sldIdLst>
   <p:sldSz cx="12192000" cy="6858000"/>
   <p:notesSz cx="6858000" cy="9144000"/>
@@ -124,8 +131,8 @@
 <pc:chgInfo xmlns:a="http://schemas.openxmlformats.org/drawingml/2006/main" xmlns:r="http://schemas.openxmlformats.org/officeDocument/2006/relationships" xmlns:ac="http://schemas.microsoft.com/office/drawing/2013/main/command" xmlns:pc="http://schemas.microsoft.com/office/powerpoint/2013/main/command">
   <pc:docChgLst>
     <pc:chgData name="Souporno Ghosh" userId="e9e722df7c9c76e5" providerId="LiveId" clId="{7E4CF494-4069-4614-9DAF-4322F70DDEBD}"/>
-    <pc:docChg chg="undo custSel addSld delSld modSld">
-      <pc:chgData name="Souporno Ghosh" userId="e9e722df7c9c76e5" providerId="LiveId" clId="{7E4CF494-4069-4614-9DAF-4322F70DDEBD}" dt="2021-03-24T19:36:25.150" v="441" actId="20577"/>
+    <pc:docChg chg="undo redo custSel addSld delSld modSld sldOrd">
+      <pc:chgData name="Souporno Ghosh" userId="e9e722df7c9c76e5" providerId="LiveId" clId="{7E4CF494-4069-4614-9DAF-4322F70DDEBD}" dt="2021-03-26T17:07:51.810" v="1786" actId="680"/>
       <pc:docMkLst>
         <pc:docMk/>
       </pc:docMkLst>
@@ -167,18 +174,26 @@
           </ac:spMkLst>
         </pc:spChg>
       </pc:sldChg>
-      <pc:sldChg chg="modSp new mod">
-        <pc:chgData name="Souporno Ghosh" userId="e9e722df7c9c76e5" providerId="LiveId" clId="{7E4CF494-4069-4614-9DAF-4322F70DDEBD}" dt="2021-03-24T19:36:25.150" v="441" actId="20577"/>
+      <pc:sldChg chg="modSp new mod ord">
+        <pc:chgData name="Souporno Ghosh" userId="e9e722df7c9c76e5" providerId="LiveId" clId="{7E4CF494-4069-4614-9DAF-4322F70DDEBD}" dt="2021-03-26T16:35:20.669" v="1064"/>
         <pc:sldMkLst>
           <pc:docMk/>
           <pc:sldMk cId="98565076" sldId="258"/>
         </pc:sldMkLst>
         <pc:spChg chg="mod">
-          <ac:chgData name="Souporno Ghosh" userId="e9e722df7c9c76e5" providerId="LiveId" clId="{7E4CF494-4069-4614-9DAF-4322F70DDEBD}" dt="2021-03-24T19:36:25.150" v="441" actId="20577"/>
+          <ac:chgData name="Souporno Ghosh" userId="e9e722df7c9c76e5" providerId="LiveId" clId="{7E4CF494-4069-4614-9DAF-4322F70DDEBD}" dt="2021-03-26T16:08:46.114" v="596" actId="2711"/>
           <ac:spMkLst>
             <pc:docMk/>
             <pc:sldMk cId="98565076" sldId="258"/>
             <ac:spMk id="2" creationId="{FBAAA32B-BD42-4446-809A-7EC9BA53ACA7}"/>
+          </ac:spMkLst>
+        </pc:spChg>
+        <pc:spChg chg="mod">
+          <ac:chgData name="Souporno Ghosh" userId="e9e722df7c9c76e5" providerId="LiveId" clId="{7E4CF494-4069-4614-9DAF-4322F70DDEBD}" dt="2021-03-26T16:09:05.514" v="598" actId="1076"/>
+          <ac:spMkLst>
+            <pc:docMk/>
+            <pc:sldMk cId="98565076" sldId="258"/>
+            <ac:spMk id="3" creationId="{E0643363-7A65-4963-9491-D6A5839A5585}"/>
           </ac:spMkLst>
         </pc:spChg>
       </pc:sldChg>
@@ -197,50 +212,82 @@
           </ac:spMkLst>
         </pc:spChg>
       </pc:sldChg>
-      <pc:sldChg chg="modSp new mod">
-        <pc:chgData name="Souporno Ghosh" userId="e9e722df7c9c76e5" providerId="LiveId" clId="{7E4CF494-4069-4614-9DAF-4322F70DDEBD}" dt="2021-03-24T18:39:53.844" v="231" actId="20577"/>
+      <pc:sldChg chg="modSp new mod ord">
+        <pc:chgData name="Souporno Ghosh" userId="e9e722df7c9c76e5" providerId="LiveId" clId="{7E4CF494-4069-4614-9DAF-4322F70DDEBD}" dt="2021-03-26T16:14:41.299" v="655" actId="20577"/>
         <pc:sldMkLst>
           <pc:docMk/>
           <pc:sldMk cId="4201603467" sldId="260"/>
         </pc:sldMkLst>
         <pc:spChg chg="mod">
-          <ac:chgData name="Souporno Ghosh" userId="e9e722df7c9c76e5" providerId="LiveId" clId="{7E4CF494-4069-4614-9DAF-4322F70DDEBD}" dt="2021-03-24T18:39:53.844" v="231" actId="20577"/>
+          <ac:chgData name="Souporno Ghosh" userId="e9e722df7c9c76e5" providerId="LiveId" clId="{7E4CF494-4069-4614-9DAF-4322F70DDEBD}" dt="2021-03-26T16:13:05.283" v="601" actId="20577"/>
           <ac:spMkLst>
             <pc:docMk/>
             <pc:sldMk cId="4201603467" sldId="260"/>
             <ac:spMk id="2" creationId="{45A89841-D178-4B1E-8FB7-A968CC75D3E5}"/>
           </ac:spMkLst>
         </pc:spChg>
+        <pc:spChg chg="mod">
+          <ac:chgData name="Souporno Ghosh" userId="e9e722df7c9c76e5" providerId="LiveId" clId="{7E4CF494-4069-4614-9DAF-4322F70DDEBD}" dt="2021-03-26T16:14:41.299" v="655" actId="20577"/>
+          <ac:spMkLst>
+            <pc:docMk/>
+            <pc:sldMk cId="4201603467" sldId="260"/>
+            <ac:spMk id="3" creationId="{C69C6BB9-394E-4389-98FC-04D2A8AC46E7}"/>
+          </ac:spMkLst>
+        </pc:spChg>
       </pc:sldChg>
-      <pc:sldChg chg="modSp new mod">
-        <pc:chgData name="Souporno Ghosh" userId="e9e722df7c9c76e5" providerId="LiveId" clId="{7E4CF494-4069-4614-9DAF-4322F70DDEBD}" dt="2021-03-24T19:03:46.881" v="284" actId="20577"/>
+      <pc:sldChg chg="modSp new mod ord">
+        <pc:chgData name="Souporno Ghosh" userId="e9e722df7c9c76e5" providerId="LiveId" clId="{7E4CF494-4069-4614-9DAF-4322F70DDEBD}" dt="2021-03-26T16:35:27.648" v="1066"/>
         <pc:sldMkLst>
           <pc:docMk/>
           <pc:sldMk cId="1124173596" sldId="261"/>
         </pc:sldMkLst>
         <pc:spChg chg="mod">
-          <ac:chgData name="Souporno Ghosh" userId="e9e722df7c9c76e5" providerId="LiveId" clId="{7E4CF494-4069-4614-9DAF-4322F70DDEBD}" dt="2021-03-24T19:03:46.881" v="284" actId="20577"/>
+          <ac:chgData name="Souporno Ghosh" userId="e9e722df7c9c76e5" providerId="LiveId" clId="{7E4CF494-4069-4614-9DAF-4322F70DDEBD}" dt="2021-03-26T16:27:15.390" v="966" actId="20577"/>
           <ac:spMkLst>
             <pc:docMk/>
             <pc:sldMk cId="1124173596" sldId="261"/>
             <ac:spMk id="2" creationId="{643A320E-D976-47E4-929C-B3785801B479}"/>
           </ac:spMkLst>
         </pc:spChg>
+        <pc:spChg chg="mod">
+          <ac:chgData name="Souporno Ghosh" userId="e9e722df7c9c76e5" providerId="LiveId" clId="{7E4CF494-4069-4614-9DAF-4322F70DDEBD}" dt="2021-03-26T16:29:06.869" v="1036" actId="20577"/>
+          <ac:spMkLst>
+            <pc:docMk/>
+            <pc:sldMk cId="1124173596" sldId="261"/>
+            <ac:spMk id="3" creationId="{DDDF508F-4344-4318-A1AF-BCE8A393EBAF}"/>
+          </ac:spMkLst>
+        </pc:spChg>
       </pc:sldChg>
-      <pc:sldChg chg="modSp new mod">
-        <pc:chgData name="Souporno Ghosh" userId="e9e722df7c9c76e5" providerId="LiveId" clId="{7E4CF494-4069-4614-9DAF-4322F70DDEBD}" dt="2021-03-24T19:03:57.641" v="300" actId="20577"/>
+      <pc:sldChg chg="addSp delSp modSp new mod">
+        <pc:chgData name="Souporno Ghosh" userId="e9e722df7c9c76e5" providerId="LiveId" clId="{7E4CF494-4069-4614-9DAF-4322F70DDEBD}" dt="2021-03-26T16:54:29.442" v="1571" actId="1076"/>
         <pc:sldMkLst>
           <pc:docMk/>
           <pc:sldMk cId="3148733716" sldId="262"/>
         </pc:sldMkLst>
         <pc:spChg chg="mod">
-          <ac:chgData name="Souporno Ghosh" userId="e9e722df7c9c76e5" providerId="LiveId" clId="{7E4CF494-4069-4614-9DAF-4322F70DDEBD}" dt="2021-03-24T19:03:57.641" v="300" actId="20577"/>
+          <ac:chgData name="Souporno Ghosh" userId="e9e722df7c9c76e5" providerId="LiveId" clId="{7E4CF494-4069-4614-9DAF-4322F70DDEBD}" dt="2021-03-26T16:54:16.724" v="1560" actId="21"/>
           <ac:spMkLst>
             <pc:docMk/>
             <pc:sldMk cId="3148733716" sldId="262"/>
             <ac:spMk id="2" creationId="{0DC8E74A-8FBA-48C4-A822-E3ADE557B88C}"/>
           </ac:spMkLst>
         </pc:spChg>
+        <pc:spChg chg="mod">
+          <ac:chgData name="Souporno Ghosh" userId="e9e722df7c9c76e5" providerId="LiveId" clId="{7E4CF494-4069-4614-9DAF-4322F70DDEBD}" dt="2021-03-26T16:54:17.762" v="1563" actId="21"/>
+          <ac:spMkLst>
+            <pc:docMk/>
+            <pc:sldMk cId="3148733716" sldId="262"/>
+            <ac:spMk id="3" creationId="{6EA92CA0-D082-4220-A25D-35242FF375F5}"/>
+          </ac:spMkLst>
+        </pc:spChg>
+        <pc:picChg chg="add del mod">
+          <ac:chgData name="Souporno Ghosh" userId="e9e722df7c9c76e5" providerId="LiveId" clId="{7E4CF494-4069-4614-9DAF-4322F70DDEBD}" dt="2021-03-26T16:54:29.442" v="1571" actId="1076"/>
+          <ac:picMkLst>
+            <pc:docMk/>
+            <pc:sldMk cId="3148733716" sldId="262"/>
+            <ac:picMk id="4" creationId="{D5E65E33-B36B-40F6-91E5-EB45CEB3B9A2}"/>
+          </ac:picMkLst>
+        </pc:picChg>
       </pc:sldChg>
       <pc:sldChg chg="modSp new mod">
         <pc:chgData name="Souporno Ghosh" userId="e9e722df7c9c76e5" providerId="LiveId" clId="{7E4CF494-4069-4614-9DAF-4322F70DDEBD}" dt="2021-03-24T19:04:08.512" v="316" actId="20577"/>
@@ -258,13 +305,13 @@
         </pc:spChg>
       </pc:sldChg>
       <pc:sldChg chg="modSp new mod">
-        <pc:chgData name="Souporno Ghosh" userId="e9e722df7c9c76e5" providerId="LiveId" clId="{7E4CF494-4069-4614-9DAF-4322F70DDEBD}" dt="2021-03-24T19:04:38.155" v="349" actId="20577"/>
+        <pc:chgData name="Souporno Ghosh" userId="e9e722df7c9c76e5" providerId="LiveId" clId="{7E4CF494-4069-4614-9DAF-4322F70DDEBD}" dt="2021-03-26T16:55:27.743" v="1614" actId="20577"/>
         <pc:sldMkLst>
           <pc:docMk/>
           <pc:sldMk cId="353132920" sldId="264"/>
         </pc:sldMkLst>
         <pc:spChg chg="mod">
-          <ac:chgData name="Souporno Ghosh" userId="e9e722df7c9c76e5" providerId="LiveId" clId="{7E4CF494-4069-4614-9DAF-4322F70DDEBD}" dt="2021-03-24T19:04:38.155" v="349" actId="20577"/>
+          <ac:chgData name="Souporno Ghosh" userId="e9e722df7c9c76e5" providerId="LiveId" clId="{7E4CF494-4069-4614-9DAF-4322F70DDEBD}" dt="2021-03-26T16:55:27.743" v="1614" actId="20577"/>
           <ac:spMkLst>
             <pc:docMk/>
             <pc:sldMk cId="353132920" sldId="264"/>
@@ -277,6 +324,198 @@
         <pc:sldMkLst>
           <pc:docMk/>
           <pc:sldMk cId="4175159345" sldId="264"/>
+        </pc:sldMkLst>
+      </pc:sldChg>
+      <pc:sldChg chg="modSp new mod">
+        <pc:chgData name="Souporno Ghosh" userId="e9e722df7c9c76e5" providerId="LiveId" clId="{7E4CF494-4069-4614-9DAF-4322F70DDEBD}" dt="2021-03-26T16:16:06.342" v="752" actId="20577"/>
+        <pc:sldMkLst>
+          <pc:docMk/>
+          <pc:sldMk cId="1740807983" sldId="265"/>
+        </pc:sldMkLst>
+        <pc:spChg chg="mod">
+          <ac:chgData name="Souporno Ghosh" userId="e9e722df7c9c76e5" providerId="LiveId" clId="{7E4CF494-4069-4614-9DAF-4322F70DDEBD}" dt="2021-03-26T16:14:55.561" v="669" actId="20577"/>
+          <ac:spMkLst>
+            <pc:docMk/>
+            <pc:sldMk cId="1740807983" sldId="265"/>
+            <ac:spMk id="2" creationId="{DBCC1EB3-BDD3-4D3F-A6DA-32CA58C394B5}"/>
+          </ac:spMkLst>
+        </pc:spChg>
+        <pc:spChg chg="mod">
+          <ac:chgData name="Souporno Ghosh" userId="e9e722df7c9c76e5" providerId="LiveId" clId="{7E4CF494-4069-4614-9DAF-4322F70DDEBD}" dt="2021-03-26T16:16:06.342" v="752" actId="20577"/>
+          <ac:spMkLst>
+            <pc:docMk/>
+            <pc:sldMk cId="1740807983" sldId="265"/>
+            <ac:spMk id="3" creationId="{4DEB95E1-32C5-408A-AA5D-D2891327DA28}"/>
+          </ac:spMkLst>
+        </pc:spChg>
+      </pc:sldChg>
+      <pc:sldChg chg="modSp new mod">
+        <pc:chgData name="Souporno Ghosh" userId="e9e722df7c9c76e5" providerId="LiveId" clId="{7E4CF494-4069-4614-9DAF-4322F70DDEBD}" dt="2021-03-26T16:17:30.495" v="856" actId="20577"/>
+        <pc:sldMkLst>
+          <pc:docMk/>
+          <pc:sldMk cId="1716320188" sldId="266"/>
+        </pc:sldMkLst>
+        <pc:spChg chg="mod">
+          <ac:chgData name="Souporno Ghosh" userId="e9e722df7c9c76e5" providerId="LiveId" clId="{7E4CF494-4069-4614-9DAF-4322F70DDEBD}" dt="2021-03-26T16:16:35.256" v="795" actId="20577"/>
+          <ac:spMkLst>
+            <pc:docMk/>
+            <pc:sldMk cId="1716320188" sldId="266"/>
+            <ac:spMk id="2" creationId="{6D8269B7-E799-4838-AD49-925420035CB4}"/>
+          </ac:spMkLst>
+        </pc:spChg>
+        <pc:spChg chg="mod">
+          <ac:chgData name="Souporno Ghosh" userId="e9e722df7c9c76e5" providerId="LiveId" clId="{7E4CF494-4069-4614-9DAF-4322F70DDEBD}" dt="2021-03-26T16:17:30.495" v="856" actId="20577"/>
+          <ac:spMkLst>
+            <pc:docMk/>
+            <pc:sldMk cId="1716320188" sldId="266"/>
+            <ac:spMk id="3" creationId="{316EA5F6-470D-4404-A64D-43C58B55C5A6}"/>
+          </ac:spMkLst>
+        </pc:spChg>
+      </pc:sldChg>
+      <pc:sldChg chg="modSp new mod ord">
+        <pc:chgData name="Souporno Ghosh" userId="e9e722df7c9c76e5" providerId="LiveId" clId="{7E4CF494-4069-4614-9DAF-4322F70DDEBD}" dt="2021-03-26T16:43:32.817" v="1347" actId="2711"/>
+        <pc:sldMkLst>
+          <pc:docMk/>
+          <pc:sldMk cId="3098385368" sldId="267"/>
+        </pc:sldMkLst>
+        <pc:spChg chg="mod">
+          <ac:chgData name="Souporno Ghosh" userId="e9e722df7c9c76e5" providerId="LiveId" clId="{7E4CF494-4069-4614-9DAF-4322F70DDEBD}" dt="2021-03-26T16:43:32.817" v="1347" actId="2711"/>
+          <ac:spMkLst>
+            <pc:docMk/>
+            <pc:sldMk cId="3098385368" sldId="267"/>
+            <ac:spMk id="2" creationId="{323FA6F3-109C-4DE0-B86F-5C0467EBD8FD}"/>
+          </ac:spMkLst>
+        </pc:spChg>
+        <pc:spChg chg="mod">
+          <ac:chgData name="Souporno Ghosh" userId="e9e722df7c9c76e5" providerId="LiveId" clId="{7E4CF494-4069-4614-9DAF-4322F70DDEBD}" dt="2021-03-26T16:43:25.656" v="1346" actId="20577"/>
+          <ac:spMkLst>
+            <pc:docMk/>
+            <pc:sldMk cId="3098385368" sldId="267"/>
+            <ac:spMk id="3" creationId="{46EF48B6-9995-458D-AA70-B7B974D14D25}"/>
+          </ac:spMkLst>
+        </pc:spChg>
+      </pc:sldChg>
+      <pc:sldChg chg="modSp new mod">
+        <pc:chgData name="Souporno Ghosh" userId="e9e722df7c9c76e5" providerId="LiveId" clId="{7E4CF494-4069-4614-9DAF-4322F70DDEBD}" dt="2021-03-26T16:55:22.157" v="1613" actId="20577"/>
+        <pc:sldMkLst>
+          <pc:docMk/>
+          <pc:sldMk cId="817125723" sldId="268"/>
+        </pc:sldMkLst>
+        <pc:spChg chg="mod">
+          <ac:chgData name="Souporno Ghosh" userId="e9e722df7c9c76e5" providerId="LiveId" clId="{7E4CF494-4069-4614-9DAF-4322F70DDEBD}" dt="2021-03-26T16:54:58.754" v="1591" actId="20577"/>
+          <ac:spMkLst>
+            <pc:docMk/>
+            <pc:sldMk cId="817125723" sldId="268"/>
+            <ac:spMk id="2" creationId="{412A804F-D373-469B-BF0E-330FEF49775D}"/>
+          </ac:spMkLst>
+        </pc:spChg>
+        <pc:spChg chg="mod">
+          <ac:chgData name="Souporno Ghosh" userId="e9e722df7c9c76e5" providerId="LiveId" clId="{7E4CF494-4069-4614-9DAF-4322F70DDEBD}" dt="2021-03-26T16:55:22.157" v="1613" actId="20577"/>
+          <ac:spMkLst>
+            <pc:docMk/>
+            <pc:sldMk cId="817125723" sldId="268"/>
+            <ac:spMk id="3" creationId="{8258DF25-4811-4199-84D3-FE57EA47BE57}"/>
+          </ac:spMkLst>
+        </pc:spChg>
+      </pc:sldChg>
+      <pc:sldChg chg="addSp delSp modSp new del mod">
+        <pc:chgData name="Souporno Ghosh" userId="e9e722df7c9c76e5" providerId="LiveId" clId="{7E4CF494-4069-4614-9DAF-4322F70DDEBD}" dt="2021-03-26T16:54:36.071" v="1572" actId="47"/>
+        <pc:sldMkLst>
+          <pc:docMk/>
+          <pc:sldMk cId="1261631755" sldId="269"/>
+        </pc:sldMkLst>
+        <pc:spChg chg="mod">
+          <ac:chgData name="Souporno Ghosh" userId="e9e722df7c9c76e5" providerId="LiveId" clId="{7E4CF494-4069-4614-9DAF-4322F70DDEBD}" dt="2021-03-26T16:54:16.460" v="1559"/>
+          <ac:spMkLst>
+            <pc:docMk/>
+            <pc:sldMk cId="1261631755" sldId="269"/>
+            <ac:spMk id="2" creationId="{F61C0E6E-3487-4602-871B-22C06D1D19F2}"/>
+          </ac:spMkLst>
+        </pc:spChg>
+        <pc:spChg chg="add del">
+          <ac:chgData name="Souporno Ghosh" userId="e9e722df7c9c76e5" providerId="LiveId" clId="{7E4CF494-4069-4614-9DAF-4322F70DDEBD}" dt="2021-03-26T16:54:19.066" v="1567"/>
+          <ac:spMkLst>
+            <pc:docMk/>
+            <pc:sldMk cId="1261631755" sldId="269"/>
+            <ac:spMk id="3" creationId="{8F45C909-AECB-46C8-91B0-00D2F9871FAF}"/>
+          </ac:spMkLst>
+        </pc:spChg>
+        <pc:spChg chg="mod">
+          <ac:chgData name="Souporno Ghosh" userId="e9e722df7c9c76e5" providerId="LiveId" clId="{7E4CF494-4069-4614-9DAF-4322F70DDEBD}" dt="2021-03-26T16:54:17.478" v="1562"/>
+          <ac:spMkLst>
+            <pc:docMk/>
+            <pc:sldMk cId="1261631755" sldId="269"/>
+            <ac:spMk id="4" creationId="{2414A1D7-E70F-4218-B0C1-554FF727EC94}"/>
+          </ac:spMkLst>
+        </pc:spChg>
+        <pc:picChg chg="add del mod">
+          <ac:chgData name="Souporno Ghosh" userId="e9e722df7c9c76e5" providerId="LiveId" clId="{7E4CF494-4069-4614-9DAF-4322F70DDEBD}" dt="2021-03-26T16:54:19.066" v="1567"/>
+          <ac:picMkLst>
+            <pc:docMk/>
+            <pc:sldMk cId="1261631755" sldId="269"/>
+            <ac:picMk id="5" creationId="{A075E1F1-9B55-42D2-9358-6BB4BBB2143F}"/>
+          </ac:picMkLst>
+        </pc:picChg>
+      </pc:sldChg>
+      <pc:sldChg chg="addSp delSp modSp new mod">
+        <pc:chgData name="Souporno Ghosh" userId="e9e722df7c9c76e5" providerId="LiveId" clId="{7E4CF494-4069-4614-9DAF-4322F70DDEBD}" dt="2021-03-26T17:07:45.758" v="1785" actId="1076"/>
+        <pc:sldMkLst>
+          <pc:docMk/>
+          <pc:sldMk cId="1510136491" sldId="269"/>
+        </pc:sldMkLst>
+        <pc:spChg chg="mod">
+          <ac:chgData name="Souporno Ghosh" userId="e9e722df7c9c76e5" providerId="LiveId" clId="{7E4CF494-4069-4614-9DAF-4322F70DDEBD}" dt="2021-03-26T17:00:40.051" v="1699" actId="20577"/>
+          <ac:spMkLst>
+            <pc:docMk/>
+            <pc:sldMk cId="1510136491" sldId="269"/>
+            <ac:spMk id="2" creationId="{9166B2DA-65B0-4CCB-A4D1-561F9792A84A}"/>
+          </ac:spMkLst>
+        </pc:spChg>
+        <pc:spChg chg="del">
+          <ac:chgData name="Souporno Ghosh" userId="e9e722df7c9c76e5" providerId="LiveId" clId="{7E4CF494-4069-4614-9DAF-4322F70DDEBD}" dt="2021-03-26T17:00:11.118" v="1676" actId="1032"/>
+          <ac:spMkLst>
+            <pc:docMk/>
+            <pc:sldMk cId="1510136491" sldId="269"/>
+            <ac:spMk id="3" creationId="{BC3B383D-E45D-4219-BDD0-539374D41308}"/>
+          </ac:spMkLst>
+        </pc:spChg>
+        <pc:spChg chg="add mod">
+          <ac:chgData name="Souporno Ghosh" userId="e9e722df7c9c76e5" providerId="LiveId" clId="{7E4CF494-4069-4614-9DAF-4322F70DDEBD}" dt="2021-03-26T17:07:45.758" v="1785" actId="1076"/>
+          <ac:spMkLst>
+            <pc:docMk/>
+            <pc:sldMk cId="1510136491" sldId="269"/>
+            <ac:spMk id="6" creationId="{60E45A0A-05A8-47C5-AFCA-94F0FEA1E6EF}"/>
+          </ac:spMkLst>
+        </pc:spChg>
+        <pc:graphicFrameChg chg="add del mod modGraphic">
+          <ac:chgData name="Souporno Ghosh" userId="e9e722df7c9c76e5" providerId="LiveId" clId="{7E4CF494-4069-4614-9DAF-4322F70DDEBD}" dt="2021-03-26T17:06:27.297" v="1771" actId="478"/>
+          <ac:graphicFrameMkLst>
+            <pc:docMk/>
+            <pc:sldMk cId="1510136491" sldId="269"/>
+            <ac:graphicFrameMk id="4" creationId="{A1CDB85A-13B7-413D-8D15-6681AE417D9B}"/>
+          </ac:graphicFrameMkLst>
+        </pc:graphicFrameChg>
+      </pc:sldChg>
+      <pc:sldChg chg="modSp new mod">
+        <pc:chgData name="Souporno Ghosh" userId="e9e722df7c9c76e5" providerId="LiveId" clId="{7E4CF494-4069-4614-9DAF-4322F70DDEBD}" dt="2021-03-26T16:56:27.650" v="1675" actId="20577"/>
+        <pc:sldMkLst>
+          <pc:docMk/>
+          <pc:sldMk cId="305898157" sldId="270"/>
+        </pc:sldMkLst>
+        <pc:spChg chg="mod">
+          <ac:chgData name="Souporno Ghosh" userId="e9e722df7c9c76e5" providerId="LiveId" clId="{7E4CF494-4069-4614-9DAF-4322F70DDEBD}" dt="2021-03-26T16:56:27.650" v="1675" actId="20577"/>
+          <ac:spMkLst>
+            <pc:docMk/>
+            <pc:sldMk cId="305898157" sldId="270"/>
+            <ac:spMk id="2" creationId="{381CC4B7-5A8D-4F09-91BF-BC61DC7733A9}"/>
+          </ac:spMkLst>
+        </pc:spChg>
+      </pc:sldChg>
+      <pc:sldChg chg="new">
+        <pc:chgData name="Souporno Ghosh" userId="e9e722df7c9c76e5" providerId="LiveId" clId="{7E4CF494-4069-4614-9DAF-4322F70DDEBD}" dt="2021-03-26T17:07:51.810" v="1786" actId="680"/>
+        <pc:sldMkLst>
+          <pc:docMk/>
+          <pc:sldMk cId="2499631946" sldId="271"/>
         </pc:sldMkLst>
       </pc:sldChg>
     </pc:docChg>
@@ -433,7 +672,7 @@
           <a:p>
             <a:fld id="{21D9AB09-D600-4578-8243-21B8A8CCB975}" type="datetimeFigureOut">
               <a:rPr lang="en-IN" smtClean="0"/>
-              <a:t>25-03-2021</a:t>
+              <a:t>26-03-2021</a:t>
             </a:fld>
             <a:endParaRPr lang="en-IN"/>
           </a:p>
@@ -633,7 +872,7 @@
           <a:p>
             <a:fld id="{21D9AB09-D600-4578-8243-21B8A8CCB975}" type="datetimeFigureOut">
               <a:rPr lang="en-IN" smtClean="0"/>
-              <a:t>25-03-2021</a:t>
+              <a:t>26-03-2021</a:t>
             </a:fld>
             <a:endParaRPr lang="en-IN"/>
           </a:p>
@@ -843,7 +1082,7 @@
           <a:p>
             <a:fld id="{21D9AB09-D600-4578-8243-21B8A8CCB975}" type="datetimeFigureOut">
               <a:rPr lang="en-IN" smtClean="0"/>
-              <a:t>25-03-2021</a:t>
+              <a:t>26-03-2021</a:t>
             </a:fld>
             <a:endParaRPr lang="en-IN"/>
           </a:p>
@@ -1043,7 +1282,7 @@
           <a:p>
             <a:fld id="{21D9AB09-D600-4578-8243-21B8A8CCB975}" type="datetimeFigureOut">
               <a:rPr lang="en-IN" smtClean="0"/>
-              <a:t>25-03-2021</a:t>
+              <a:t>26-03-2021</a:t>
             </a:fld>
             <a:endParaRPr lang="en-IN"/>
           </a:p>
@@ -1319,7 +1558,7 @@
           <a:p>
             <a:fld id="{21D9AB09-D600-4578-8243-21B8A8CCB975}" type="datetimeFigureOut">
               <a:rPr lang="en-IN" smtClean="0"/>
-              <a:t>25-03-2021</a:t>
+              <a:t>26-03-2021</a:t>
             </a:fld>
             <a:endParaRPr lang="en-IN"/>
           </a:p>
@@ -1587,7 +1826,7 @@
           <a:p>
             <a:fld id="{21D9AB09-D600-4578-8243-21B8A8CCB975}" type="datetimeFigureOut">
               <a:rPr lang="en-IN" smtClean="0"/>
-              <a:t>25-03-2021</a:t>
+              <a:t>26-03-2021</a:t>
             </a:fld>
             <a:endParaRPr lang="en-IN"/>
           </a:p>
@@ -2002,7 +2241,7 @@
           <a:p>
             <a:fld id="{21D9AB09-D600-4578-8243-21B8A8CCB975}" type="datetimeFigureOut">
               <a:rPr lang="en-IN" smtClean="0"/>
-              <a:t>25-03-2021</a:t>
+              <a:t>26-03-2021</a:t>
             </a:fld>
             <a:endParaRPr lang="en-IN"/>
           </a:p>
@@ -2144,7 +2383,7 @@
           <a:p>
             <a:fld id="{21D9AB09-D600-4578-8243-21B8A8CCB975}" type="datetimeFigureOut">
               <a:rPr lang="en-IN" smtClean="0"/>
-              <a:t>25-03-2021</a:t>
+              <a:t>26-03-2021</a:t>
             </a:fld>
             <a:endParaRPr lang="en-IN"/>
           </a:p>
@@ -2257,7 +2496,7 @@
           <a:p>
             <a:fld id="{21D9AB09-D600-4578-8243-21B8A8CCB975}" type="datetimeFigureOut">
               <a:rPr lang="en-IN" smtClean="0"/>
-              <a:t>25-03-2021</a:t>
+              <a:t>26-03-2021</a:t>
             </a:fld>
             <a:endParaRPr lang="en-IN"/>
           </a:p>
@@ -2570,7 +2809,7 @@
           <a:p>
             <a:fld id="{21D9AB09-D600-4578-8243-21B8A8CCB975}" type="datetimeFigureOut">
               <a:rPr lang="en-IN" smtClean="0"/>
-              <a:t>25-03-2021</a:t>
+              <a:t>26-03-2021</a:t>
             </a:fld>
             <a:endParaRPr lang="en-IN"/>
           </a:p>
@@ -2859,7 +3098,7 @@
           <a:p>
             <a:fld id="{21D9AB09-D600-4578-8243-21B8A8CCB975}" type="datetimeFigureOut">
               <a:rPr lang="en-IN" smtClean="0"/>
-              <a:t>25-03-2021</a:t>
+              <a:t>26-03-2021</a:t>
             </a:fld>
             <a:endParaRPr lang="en-IN"/>
           </a:p>
@@ -3102,7 +3341,7 @@
           <a:p>
             <a:fld id="{21D9AB09-D600-4578-8243-21B8A8CCB975}" type="datetimeFigureOut">
               <a:rPr lang="en-IN" smtClean="0"/>
-              <a:t>25-03-2021</a:t>
+              <a:t>26-03-2021</a:t>
             </a:fld>
             <a:endParaRPr lang="en-IN"/>
           </a:p>
@@ -3699,6 +3938,1257 @@
 </p:sld>
 </file>
 
+<file path=ppt/slides/slide10.xml><?xml version="1.0" encoding="utf-8"?>
+<p:sld xmlns:a="http://schemas.openxmlformats.org/drawingml/2006/main" xmlns:r="http://schemas.openxmlformats.org/officeDocument/2006/relationships" xmlns:p="http://schemas.openxmlformats.org/presentationml/2006/main">
+  <p:cSld>
+    <p:spTree>
+      <p:nvGrpSpPr>
+        <p:cNvPr id="1" name=""/>
+        <p:cNvGrpSpPr/>
+        <p:nvPr/>
+      </p:nvGrpSpPr>
+      <p:grpSpPr>
+        <a:xfrm>
+          <a:off x="0" y="0"/>
+          <a:ext cx="0" cy="0"/>
+          <a:chOff x="0" y="0"/>
+          <a:chExt cx="0" cy="0"/>
+        </a:xfrm>
+      </p:grpSpPr>
+      <p:sp>
+        <p:nvSpPr>
+          <p:cNvPr id="2" name="Title 1">
+            <a:extLst>
+              <a:ext uri="{FF2B5EF4-FFF2-40B4-BE49-F238E27FC236}">
+                <a16:creationId xmlns:a16="http://schemas.microsoft.com/office/drawing/2014/main" id="{0DC8E74A-8FBA-48C4-A822-E3ADE557B88C}"/>
+              </a:ext>
+            </a:extLst>
+          </p:cNvPr>
+          <p:cNvSpPr>
+            <a:spLocks noGrp="1"/>
+          </p:cNvSpPr>
+          <p:nvPr>
+            <p:ph type="title"/>
+          </p:nvPr>
+        </p:nvSpPr>
+        <p:spPr/>
+        <p:txBody>
+          <a:bodyPr/>
+          <a:lstStyle/>
+          <a:p>
+            <a:r>
+              <a:rPr lang="en-US" dirty="0"/>
+              <a:t>About VGG16 Model</a:t>
+            </a:r>
+            <a:endParaRPr lang="en-IN" dirty="0"/>
+          </a:p>
+        </p:txBody>
+      </p:sp>
+      <p:sp>
+        <p:nvSpPr>
+          <p:cNvPr id="3" name="Content Placeholder 2">
+            <a:extLst>
+              <a:ext uri="{FF2B5EF4-FFF2-40B4-BE49-F238E27FC236}">
+                <a16:creationId xmlns:a16="http://schemas.microsoft.com/office/drawing/2014/main" id="{6EA92CA0-D082-4220-A25D-35242FF375F5}"/>
+              </a:ext>
+            </a:extLst>
+          </p:cNvPr>
+          <p:cNvSpPr>
+            <a:spLocks noGrp="1"/>
+          </p:cNvSpPr>
+          <p:nvPr>
+            <p:ph idx="1"/>
+          </p:nvPr>
+        </p:nvSpPr>
+        <p:spPr/>
+        <p:txBody>
+          <a:bodyPr/>
+          <a:lstStyle/>
+          <a:p>
+            <a:r>
+              <a:rPr lang="en-US" dirty="0"/>
+              <a:t>Proposed by </a:t>
+            </a:r>
+            <a:r>
+              <a:rPr lang="en-US" dirty="0" err="1"/>
+              <a:t>Simonyan</a:t>
+            </a:r>
+            <a:r>
+              <a:rPr lang="en-US" dirty="0"/>
+              <a:t> and Zisserman in 2014</a:t>
+            </a:r>
+          </a:p>
+          <a:p>
+            <a:endParaRPr lang="en-US" dirty="0"/>
+          </a:p>
+          <a:p>
+            <a:r>
+              <a:rPr lang="en-US" dirty="0"/>
+              <a:t>92.7% accuracy with the ImageNet Database</a:t>
+            </a:r>
+          </a:p>
+          <a:p>
+            <a:endParaRPr lang="en-IN" dirty="0"/>
+          </a:p>
+          <a:p>
+            <a:r>
+              <a:rPr lang="en-IN" dirty="0"/>
+              <a:t>16 Neural Network Layers </a:t>
+            </a:r>
+          </a:p>
+          <a:p>
+            <a:pPr lvl="1"/>
+            <a:r>
+              <a:rPr lang="en-IN" dirty="0"/>
+              <a:t>13 Convolutional Networks</a:t>
+            </a:r>
+          </a:p>
+          <a:p>
+            <a:pPr lvl="1"/>
+            <a:r>
+              <a:rPr lang="en-IN" dirty="0"/>
+              <a:t>3 Dense Networks</a:t>
+            </a:r>
+          </a:p>
+        </p:txBody>
+      </p:sp>
+      <p:pic>
+        <p:nvPicPr>
+          <p:cNvPr id="4" name="Picture 3">
+            <a:extLst>
+              <a:ext uri="{FF2B5EF4-FFF2-40B4-BE49-F238E27FC236}">
+                <a16:creationId xmlns:a16="http://schemas.microsoft.com/office/drawing/2014/main" id="{D5E65E33-B36B-40F6-91E5-EB45CEB3B9A2}"/>
+              </a:ext>
+            </a:extLst>
+          </p:cNvPr>
+          <p:cNvPicPr/>
+          <p:nvPr/>
+        </p:nvPicPr>
+        <p:blipFill>
+          <a:blip r:embed="rId2">
+            <a:grayscl/>
+            <a:extLst>
+              <a:ext uri="{BEBA8EAE-BF5A-486C-A8C5-ECC9F3942E4B}">
+                <a14:imgProps xmlns:a14="http://schemas.microsoft.com/office/drawing/2010/main">
+                  <a14:imgLayer r:embed="rId3">
+                    <a14:imgEffect>
+                      <a14:colorTemperature colorTemp="11200"/>
+                    </a14:imgEffect>
+                    <a14:imgEffect>
+                      <a14:saturation sat="400000"/>
+                    </a14:imgEffect>
+                    <a14:imgEffect>
+                      <a14:brightnessContrast bright="20000" contrast="40000"/>
+                    </a14:imgEffect>
+                  </a14:imgLayer>
+                </a14:imgProps>
+              </a:ext>
+            </a:extLst>
+          </a:blip>
+          <a:stretch>
+            <a:fillRect/>
+          </a:stretch>
+        </p:blipFill>
+        <p:spPr>
+          <a:xfrm rot="5400000">
+            <a:off x="6982326" y="2004596"/>
+            <a:ext cx="5188197" cy="2541079"/>
+          </a:xfrm>
+          <a:prstGeom prst="rect">
+            <a:avLst/>
+          </a:prstGeom>
+          <a:ln>
+            <a:solidFill>
+              <a:schemeClr val="tx1"/>
+            </a:solidFill>
+          </a:ln>
+        </p:spPr>
+      </p:pic>
+    </p:spTree>
+    <p:extLst>
+      <p:ext uri="{BB962C8B-B14F-4D97-AF65-F5344CB8AC3E}">
+        <p14:creationId xmlns:p14="http://schemas.microsoft.com/office/powerpoint/2010/main" val="3148733716"/>
+      </p:ext>
+    </p:extLst>
+  </p:cSld>
+  <p:clrMapOvr>
+    <a:masterClrMapping/>
+  </p:clrMapOvr>
+</p:sld>
+</file>
+
+<file path=ppt/slides/slide11.xml><?xml version="1.0" encoding="utf-8"?>
+<p:sld xmlns:a="http://schemas.openxmlformats.org/drawingml/2006/main" xmlns:r="http://schemas.openxmlformats.org/officeDocument/2006/relationships" xmlns:p="http://schemas.openxmlformats.org/presentationml/2006/main">
+  <p:cSld>
+    <p:spTree>
+      <p:nvGrpSpPr>
+        <p:cNvPr id="1" name=""/>
+        <p:cNvGrpSpPr/>
+        <p:nvPr/>
+      </p:nvGrpSpPr>
+      <p:grpSpPr>
+        <a:xfrm>
+          <a:off x="0" y="0"/>
+          <a:ext cx="0" cy="0"/>
+          <a:chOff x="0" y="0"/>
+          <a:chExt cx="0" cy="0"/>
+        </a:xfrm>
+      </p:grpSpPr>
+      <p:sp>
+        <p:nvSpPr>
+          <p:cNvPr id="2" name="Title 1">
+            <a:extLst>
+              <a:ext uri="{FF2B5EF4-FFF2-40B4-BE49-F238E27FC236}">
+                <a16:creationId xmlns:a16="http://schemas.microsoft.com/office/drawing/2014/main" id="{412A804F-D373-469B-BF0E-330FEF49775D}"/>
+              </a:ext>
+            </a:extLst>
+          </p:cNvPr>
+          <p:cNvSpPr>
+            <a:spLocks noGrp="1"/>
+          </p:cNvSpPr>
+          <p:nvPr>
+            <p:ph type="title"/>
+          </p:nvPr>
+        </p:nvSpPr>
+        <p:spPr/>
+        <p:txBody>
+          <a:bodyPr/>
+          <a:lstStyle/>
+          <a:p>
+            <a:r>
+              <a:rPr lang="en-US" dirty="0"/>
+              <a:t>Challenges of VGG16</a:t>
+            </a:r>
+            <a:endParaRPr lang="en-IN" dirty="0"/>
+          </a:p>
+        </p:txBody>
+      </p:sp>
+      <p:sp>
+        <p:nvSpPr>
+          <p:cNvPr id="3" name="Content Placeholder 2">
+            <a:extLst>
+              <a:ext uri="{FF2B5EF4-FFF2-40B4-BE49-F238E27FC236}">
+                <a16:creationId xmlns:a16="http://schemas.microsoft.com/office/drawing/2014/main" id="{8258DF25-4811-4199-84D3-FE57EA47BE57}"/>
+              </a:ext>
+            </a:extLst>
+          </p:cNvPr>
+          <p:cNvSpPr>
+            <a:spLocks noGrp="1"/>
+          </p:cNvSpPr>
+          <p:nvPr>
+            <p:ph idx="1"/>
+          </p:nvPr>
+        </p:nvSpPr>
+        <p:spPr/>
+        <p:txBody>
+          <a:bodyPr/>
+          <a:lstStyle/>
+          <a:p>
+            <a:r>
+              <a:rPr lang="en-US" dirty="0"/>
+              <a:t>Slow to Train</a:t>
+            </a:r>
+          </a:p>
+          <a:p>
+            <a:r>
+              <a:rPr lang="en-US" dirty="0"/>
+              <a:t>Big Size</a:t>
+            </a:r>
+            <a:endParaRPr lang="en-IN" dirty="0"/>
+          </a:p>
+        </p:txBody>
+      </p:sp>
+    </p:spTree>
+    <p:extLst>
+      <p:ext uri="{BB962C8B-B14F-4D97-AF65-F5344CB8AC3E}">
+        <p14:creationId xmlns:p14="http://schemas.microsoft.com/office/powerpoint/2010/main" val="817125723"/>
+      </p:ext>
+    </p:extLst>
+  </p:cSld>
+  <p:clrMapOvr>
+    <a:masterClrMapping/>
+  </p:clrMapOvr>
+</p:sld>
+</file>
+
+<file path=ppt/slides/slide12.xml><?xml version="1.0" encoding="utf-8"?>
+<p:sld xmlns:a="http://schemas.openxmlformats.org/drawingml/2006/main" xmlns:r="http://schemas.openxmlformats.org/officeDocument/2006/relationships" xmlns:p="http://schemas.openxmlformats.org/presentationml/2006/main">
+  <p:cSld>
+    <p:spTree>
+      <p:nvGrpSpPr>
+        <p:cNvPr id="1" name=""/>
+        <p:cNvGrpSpPr/>
+        <p:nvPr/>
+      </p:nvGrpSpPr>
+      <p:grpSpPr>
+        <a:xfrm>
+          <a:off x="0" y="0"/>
+          <a:ext cx="0" cy="0"/>
+          <a:chOff x="0" y="0"/>
+          <a:chExt cx="0" cy="0"/>
+        </a:xfrm>
+      </p:grpSpPr>
+      <p:sp>
+        <p:nvSpPr>
+          <p:cNvPr id="2" name="Title 1">
+            <a:extLst>
+              <a:ext uri="{FF2B5EF4-FFF2-40B4-BE49-F238E27FC236}">
+                <a16:creationId xmlns:a16="http://schemas.microsoft.com/office/drawing/2014/main" id="{9166B2DA-65B0-4CCB-A4D1-561F9792A84A}"/>
+              </a:ext>
+            </a:extLst>
+          </p:cNvPr>
+          <p:cNvSpPr>
+            <a:spLocks noGrp="1"/>
+          </p:cNvSpPr>
+          <p:nvPr>
+            <p:ph type="title"/>
+          </p:nvPr>
+        </p:nvSpPr>
+        <p:spPr/>
+        <p:txBody>
+          <a:bodyPr/>
+          <a:lstStyle/>
+          <a:p>
+            <a:r>
+              <a:rPr lang="en-US" dirty="0"/>
+              <a:t>The Architecture of VGG</a:t>
+            </a:r>
+            <a:endParaRPr lang="en-IN" dirty="0"/>
+          </a:p>
+        </p:txBody>
+      </p:sp>
+      <p:sp>
+        <p:nvSpPr>
+          <p:cNvPr id="6" name="Content Placeholder 5">
+            <a:extLst>
+              <a:ext uri="{FF2B5EF4-FFF2-40B4-BE49-F238E27FC236}">
+                <a16:creationId xmlns:a16="http://schemas.microsoft.com/office/drawing/2014/main" id="{60E45A0A-05A8-47C5-AFCA-94F0FEA1E6EF}"/>
+              </a:ext>
+            </a:extLst>
+          </p:cNvPr>
+          <p:cNvSpPr>
+            <a:spLocks noGrp="1"/>
+          </p:cNvSpPr>
+          <p:nvPr>
+            <p:ph idx="1"/>
+          </p:nvPr>
+        </p:nvSpPr>
+        <p:spPr>
+          <a:xfrm>
+            <a:off x="838200" y="1690688"/>
+            <a:ext cx="10515600" cy="4351338"/>
+          </a:xfrm>
+        </p:spPr>
+        <p:txBody>
+          <a:bodyPr>
+            <a:normAutofit fontScale="92500" lnSpcReduction="10000"/>
+          </a:bodyPr>
+          <a:lstStyle/>
+          <a:p>
+            <a:pPr marL="342900" indent="-342900">
+              <a:buFont typeface="+mj-lt"/>
+              <a:buAutoNum type="arabicPeriod"/>
+            </a:pPr>
+            <a:r>
+              <a:rPr lang="en-IN" sz="1800" dirty="0">
+                <a:solidFill>
+                  <a:srgbClr val="000000"/>
+                </a:solidFill>
+                <a:effectLst/>
+                <a:latin typeface="Ubuntu Mono" panose="020B0509030602030204" pitchFamily="49" charset="0"/>
+                <a:ea typeface="Times New Roman" panose="02020603050405020304" pitchFamily="18" charset="0"/>
+              </a:rPr>
+              <a:t>import </a:t>
+            </a:r>
+            <a:r>
+              <a:rPr lang="en-IN" sz="1800" dirty="0" err="1">
+                <a:solidFill>
+                  <a:srgbClr val="000000"/>
+                </a:solidFill>
+                <a:effectLst/>
+                <a:latin typeface="Ubuntu Mono" panose="020B0509030602030204" pitchFamily="49" charset="0"/>
+                <a:ea typeface="Times New Roman" panose="02020603050405020304" pitchFamily="18" charset="0"/>
+              </a:rPr>
+              <a:t>keras</a:t>
+            </a:r>
+            <a:endParaRPr lang="en-IN" sz="1800" dirty="0">
+              <a:latin typeface="Times New Roman" panose="02020603050405020304" pitchFamily="18" charset="0"/>
+              <a:ea typeface="Times New Roman" panose="02020603050405020304" pitchFamily="18" charset="0"/>
+            </a:endParaRPr>
+          </a:p>
+          <a:p>
+            <a:pPr marL="342900" indent="-342900">
+              <a:buFont typeface="+mj-lt"/>
+              <a:buAutoNum type="arabicPeriod"/>
+            </a:pPr>
+            <a:r>
+              <a:rPr lang="en-IN" sz="1800" dirty="0">
+                <a:solidFill>
+                  <a:srgbClr val="000000"/>
+                </a:solidFill>
+                <a:effectLst/>
+                <a:latin typeface="Ubuntu Mono" panose="020B0509030602030204" pitchFamily="49" charset="0"/>
+                <a:ea typeface="Times New Roman" panose="02020603050405020304" pitchFamily="18" charset="0"/>
+              </a:rPr>
+              <a:t>import </a:t>
+            </a:r>
+            <a:r>
+              <a:rPr lang="en-IN" sz="1800" dirty="0" err="1">
+                <a:solidFill>
+                  <a:srgbClr val="000000"/>
+                </a:solidFill>
+                <a:effectLst/>
+                <a:latin typeface="Ubuntu Mono" panose="020B0509030602030204" pitchFamily="49" charset="0"/>
+                <a:ea typeface="Times New Roman" panose="02020603050405020304" pitchFamily="18" charset="0"/>
+              </a:rPr>
+              <a:t>os</a:t>
+            </a:r>
+            <a:endParaRPr lang="en-IN" sz="1800" dirty="0">
+              <a:solidFill>
+                <a:srgbClr val="000000"/>
+              </a:solidFill>
+              <a:effectLst/>
+              <a:latin typeface="Ubuntu Mono" panose="020B0509030602030204" pitchFamily="49" charset="0"/>
+              <a:ea typeface="Times New Roman" panose="02020603050405020304" pitchFamily="18" charset="0"/>
+            </a:endParaRPr>
+          </a:p>
+          <a:p>
+            <a:pPr marL="342900" indent="-342900">
+              <a:buFont typeface="+mj-lt"/>
+              <a:buAutoNum type="arabicPeriod"/>
+            </a:pPr>
+            <a:endParaRPr lang="en-IN" sz="1800" dirty="0">
+              <a:solidFill>
+                <a:srgbClr val="000000"/>
+              </a:solidFill>
+              <a:effectLst/>
+              <a:latin typeface="Ubuntu Mono" panose="020B0509030602030204" pitchFamily="49" charset="0"/>
+              <a:ea typeface="Times New Roman" panose="02020603050405020304" pitchFamily="18" charset="0"/>
+            </a:endParaRPr>
+          </a:p>
+          <a:p>
+            <a:pPr marL="342900" indent="-342900">
+              <a:buFont typeface="+mj-lt"/>
+              <a:buAutoNum type="arabicPeriod"/>
+            </a:pPr>
+            <a:r>
+              <a:rPr lang="en-IN" sz="1800" dirty="0">
+                <a:solidFill>
+                  <a:srgbClr val="000000"/>
+                </a:solidFill>
+                <a:effectLst/>
+                <a:latin typeface="Ubuntu Mono" panose="020B0509030602030204" pitchFamily="49" charset="0"/>
+                <a:ea typeface="Times New Roman" panose="02020603050405020304" pitchFamily="18" charset="0"/>
+              </a:rPr>
+              <a:t>from </a:t>
+            </a:r>
+            <a:r>
+              <a:rPr lang="en-IN" sz="1800" dirty="0" err="1">
+                <a:solidFill>
+                  <a:srgbClr val="000000"/>
+                </a:solidFill>
+                <a:effectLst/>
+                <a:latin typeface="Ubuntu Mono" panose="020B0509030602030204" pitchFamily="49" charset="0"/>
+                <a:ea typeface="Times New Roman" panose="02020603050405020304" pitchFamily="18" charset="0"/>
+              </a:rPr>
+              <a:t>keras.models</a:t>
+            </a:r>
+            <a:r>
+              <a:rPr lang="en-IN" sz="1800" dirty="0">
+                <a:solidFill>
+                  <a:srgbClr val="000000"/>
+                </a:solidFill>
+                <a:effectLst/>
+                <a:latin typeface="Ubuntu Mono" panose="020B0509030602030204" pitchFamily="49" charset="0"/>
+                <a:ea typeface="Times New Roman" panose="02020603050405020304" pitchFamily="18" charset="0"/>
+              </a:rPr>
+              <a:t> import Sequential</a:t>
+            </a:r>
+            <a:endParaRPr lang="en-IN" sz="1800" dirty="0">
+              <a:effectLst/>
+              <a:latin typeface="Times New Roman" panose="02020603050405020304" pitchFamily="18" charset="0"/>
+              <a:ea typeface="Times New Roman" panose="02020603050405020304" pitchFamily="18" charset="0"/>
+            </a:endParaRPr>
+          </a:p>
+          <a:p>
+            <a:pPr marL="342900" indent="-342900">
+              <a:buFont typeface="+mj-lt"/>
+              <a:buAutoNum type="arabicPeriod"/>
+            </a:pPr>
+            <a:r>
+              <a:rPr lang="en-IN" sz="1800" dirty="0">
+                <a:solidFill>
+                  <a:srgbClr val="000000"/>
+                </a:solidFill>
+                <a:effectLst/>
+                <a:latin typeface="Ubuntu Mono" panose="020B0509030602030204" pitchFamily="49" charset="0"/>
+                <a:ea typeface="Times New Roman" panose="02020603050405020304" pitchFamily="18" charset="0"/>
+              </a:rPr>
+              <a:t>from </a:t>
+            </a:r>
+            <a:r>
+              <a:rPr lang="en-IN" sz="1800" dirty="0" err="1">
+                <a:solidFill>
+                  <a:srgbClr val="000000"/>
+                </a:solidFill>
+                <a:effectLst/>
+                <a:latin typeface="Ubuntu Mono" panose="020B0509030602030204" pitchFamily="49" charset="0"/>
+                <a:ea typeface="Times New Roman" panose="02020603050405020304" pitchFamily="18" charset="0"/>
+              </a:rPr>
+              <a:t>keras.layers</a:t>
+            </a:r>
+            <a:r>
+              <a:rPr lang="en-IN" sz="1800" dirty="0">
+                <a:solidFill>
+                  <a:srgbClr val="000000"/>
+                </a:solidFill>
+                <a:effectLst/>
+                <a:latin typeface="Ubuntu Mono" panose="020B0509030602030204" pitchFamily="49" charset="0"/>
+                <a:ea typeface="Times New Roman" panose="02020603050405020304" pitchFamily="18" charset="0"/>
+              </a:rPr>
+              <a:t> import Dense, Conv2D, MaxPool2D, Flatten</a:t>
+            </a:r>
+            <a:endParaRPr lang="en-IN" sz="1800" dirty="0">
+              <a:effectLst/>
+              <a:latin typeface="Times New Roman" panose="02020603050405020304" pitchFamily="18" charset="0"/>
+              <a:ea typeface="Times New Roman" panose="02020603050405020304" pitchFamily="18" charset="0"/>
+            </a:endParaRPr>
+          </a:p>
+          <a:p>
+            <a:pPr marL="342900" indent="-342900">
+              <a:buFont typeface="+mj-lt"/>
+              <a:buAutoNum type="arabicPeriod"/>
+            </a:pPr>
+            <a:r>
+              <a:rPr lang="en-IN" sz="1800" dirty="0">
+                <a:solidFill>
+                  <a:srgbClr val="000000"/>
+                </a:solidFill>
+                <a:effectLst/>
+                <a:latin typeface="Ubuntu Mono" panose="020B0509030602030204" pitchFamily="49" charset="0"/>
+                <a:ea typeface="Times New Roman" panose="02020603050405020304" pitchFamily="18" charset="0"/>
+              </a:rPr>
+              <a:t>from </a:t>
+            </a:r>
+            <a:r>
+              <a:rPr lang="en-IN" sz="1800" dirty="0" err="1">
+                <a:solidFill>
+                  <a:srgbClr val="000000"/>
+                </a:solidFill>
+                <a:effectLst/>
+                <a:latin typeface="Ubuntu Mono" panose="020B0509030602030204" pitchFamily="49" charset="0"/>
+                <a:ea typeface="Times New Roman" panose="02020603050405020304" pitchFamily="18" charset="0"/>
+              </a:rPr>
+              <a:t>keras.preprocessing.image</a:t>
+            </a:r>
+            <a:r>
+              <a:rPr lang="en-IN" sz="1800" dirty="0">
+                <a:solidFill>
+                  <a:srgbClr val="000000"/>
+                </a:solidFill>
+                <a:effectLst/>
+                <a:latin typeface="Ubuntu Mono" panose="020B0509030602030204" pitchFamily="49" charset="0"/>
+                <a:ea typeface="Times New Roman" panose="02020603050405020304" pitchFamily="18" charset="0"/>
+              </a:rPr>
+              <a:t> import </a:t>
+            </a:r>
+            <a:r>
+              <a:rPr lang="en-IN" sz="1800" dirty="0" err="1">
+                <a:solidFill>
+                  <a:srgbClr val="000000"/>
+                </a:solidFill>
+                <a:effectLst/>
+                <a:latin typeface="Ubuntu Mono" panose="020B0509030602030204" pitchFamily="49" charset="0"/>
+                <a:ea typeface="Times New Roman" panose="02020603050405020304" pitchFamily="18" charset="0"/>
+              </a:rPr>
+              <a:t>ImageDataGenerator</a:t>
+            </a:r>
+            <a:endParaRPr lang="en-IN" sz="1800" dirty="0">
+              <a:effectLst/>
+              <a:latin typeface="Times New Roman" panose="02020603050405020304" pitchFamily="18" charset="0"/>
+              <a:ea typeface="Times New Roman" panose="02020603050405020304" pitchFamily="18" charset="0"/>
+            </a:endParaRPr>
+          </a:p>
+          <a:p>
+            <a:pPr marL="342900" indent="-342900">
+              <a:buFont typeface="+mj-lt"/>
+              <a:buAutoNum type="arabicPeriod"/>
+            </a:pPr>
+            <a:r>
+              <a:rPr lang="en-IN" sz="1800" dirty="0">
+                <a:solidFill>
+                  <a:srgbClr val="000000"/>
+                </a:solidFill>
+                <a:effectLst/>
+                <a:latin typeface="Ubuntu Mono" panose="020B0509030602030204" pitchFamily="49" charset="0"/>
+                <a:ea typeface="Times New Roman" panose="02020603050405020304" pitchFamily="18" charset="0"/>
+              </a:rPr>
+              <a:t>from </a:t>
+            </a:r>
+            <a:r>
+              <a:rPr lang="en-IN" sz="1800" dirty="0" err="1">
+                <a:solidFill>
+                  <a:srgbClr val="000000"/>
+                </a:solidFill>
+                <a:effectLst/>
+                <a:latin typeface="Ubuntu Mono" panose="020B0509030602030204" pitchFamily="49" charset="0"/>
+                <a:ea typeface="Times New Roman" panose="02020603050405020304" pitchFamily="18" charset="0"/>
+              </a:rPr>
+              <a:t>keras.callbacks</a:t>
+            </a:r>
+            <a:r>
+              <a:rPr lang="en-IN" sz="1800" dirty="0">
+                <a:solidFill>
+                  <a:srgbClr val="000000"/>
+                </a:solidFill>
+                <a:effectLst/>
+                <a:latin typeface="Ubuntu Mono" panose="020B0509030602030204" pitchFamily="49" charset="0"/>
+                <a:ea typeface="Times New Roman" panose="02020603050405020304" pitchFamily="18" charset="0"/>
+              </a:rPr>
+              <a:t> import </a:t>
+            </a:r>
+            <a:r>
+              <a:rPr lang="en-IN" sz="1800" dirty="0" err="1">
+                <a:solidFill>
+                  <a:srgbClr val="000000"/>
+                </a:solidFill>
+                <a:effectLst/>
+                <a:latin typeface="Ubuntu Mono" panose="020B0509030602030204" pitchFamily="49" charset="0"/>
+                <a:ea typeface="Times New Roman" panose="02020603050405020304" pitchFamily="18" charset="0"/>
+              </a:rPr>
+              <a:t>ModelCheckpoint</a:t>
+            </a:r>
+            <a:r>
+              <a:rPr lang="en-IN" sz="1800" dirty="0">
+                <a:solidFill>
+                  <a:srgbClr val="000000"/>
+                </a:solidFill>
+                <a:effectLst/>
+                <a:latin typeface="Ubuntu Mono" panose="020B0509030602030204" pitchFamily="49" charset="0"/>
+                <a:ea typeface="Times New Roman" panose="02020603050405020304" pitchFamily="18" charset="0"/>
+              </a:rPr>
+              <a:t>, </a:t>
+            </a:r>
+            <a:r>
+              <a:rPr lang="en-IN" sz="1800" dirty="0" err="1">
+                <a:solidFill>
+                  <a:srgbClr val="000000"/>
+                </a:solidFill>
+                <a:effectLst/>
+                <a:latin typeface="Ubuntu Mono" panose="020B0509030602030204" pitchFamily="49" charset="0"/>
+                <a:ea typeface="Times New Roman" panose="02020603050405020304" pitchFamily="18" charset="0"/>
+              </a:rPr>
+              <a:t>EarlyStopping</a:t>
+            </a:r>
+            <a:endParaRPr lang="en-IN" sz="1800" dirty="0">
+              <a:effectLst/>
+              <a:latin typeface="Times New Roman" panose="02020603050405020304" pitchFamily="18" charset="0"/>
+              <a:ea typeface="Times New Roman" panose="02020603050405020304" pitchFamily="18" charset="0"/>
+            </a:endParaRPr>
+          </a:p>
+          <a:p>
+            <a:pPr marL="342900" indent="-342900">
+              <a:buFont typeface="+mj-lt"/>
+              <a:buAutoNum type="arabicPeriod"/>
+            </a:pPr>
+            <a:r>
+              <a:rPr lang="en-IN" sz="1800" dirty="0">
+                <a:solidFill>
+                  <a:srgbClr val="000000"/>
+                </a:solidFill>
+                <a:effectLst/>
+                <a:latin typeface="Ubuntu Mono" panose="020B0509030602030204" pitchFamily="49" charset="0"/>
+                <a:ea typeface="Times New Roman" panose="02020603050405020304" pitchFamily="18" charset="0"/>
+              </a:rPr>
+              <a:t>from </a:t>
+            </a:r>
+            <a:r>
+              <a:rPr lang="en-IN" sz="1800" dirty="0" err="1">
+                <a:solidFill>
+                  <a:srgbClr val="000000"/>
+                </a:solidFill>
+                <a:effectLst/>
+                <a:latin typeface="Ubuntu Mono" panose="020B0509030602030204" pitchFamily="49" charset="0"/>
+                <a:ea typeface="Times New Roman" panose="02020603050405020304" pitchFamily="18" charset="0"/>
+              </a:rPr>
+              <a:t>keras.preprocessing</a:t>
+            </a:r>
+            <a:r>
+              <a:rPr lang="en-IN" sz="1800" dirty="0">
+                <a:solidFill>
+                  <a:srgbClr val="000000"/>
+                </a:solidFill>
+                <a:effectLst/>
+                <a:latin typeface="Ubuntu Mono" panose="020B0509030602030204" pitchFamily="49" charset="0"/>
+                <a:ea typeface="Times New Roman" panose="02020603050405020304" pitchFamily="18" charset="0"/>
+              </a:rPr>
+              <a:t> import image</a:t>
+            </a:r>
+            <a:endParaRPr lang="en-IN" sz="1800" dirty="0">
+              <a:effectLst/>
+              <a:latin typeface="Times New Roman" panose="02020603050405020304" pitchFamily="18" charset="0"/>
+              <a:ea typeface="Times New Roman" panose="02020603050405020304" pitchFamily="18" charset="0"/>
+            </a:endParaRPr>
+          </a:p>
+          <a:p>
+            <a:pPr marL="342900" indent="-342900">
+              <a:buFont typeface="+mj-lt"/>
+              <a:buAutoNum type="arabicPeriod"/>
+            </a:pPr>
+            <a:r>
+              <a:rPr lang="en-IN" sz="1800" dirty="0">
+                <a:solidFill>
+                  <a:srgbClr val="000000"/>
+                </a:solidFill>
+                <a:effectLst/>
+                <a:latin typeface="Ubuntu Mono" panose="020B0509030602030204" pitchFamily="49" charset="0"/>
+                <a:ea typeface="Times New Roman" panose="02020603050405020304" pitchFamily="18" charset="0"/>
+              </a:rPr>
+              <a:t>from </a:t>
+            </a:r>
+            <a:r>
+              <a:rPr lang="en-IN" sz="1800" dirty="0" err="1">
+                <a:solidFill>
+                  <a:srgbClr val="000000"/>
+                </a:solidFill>
+                <a:effectLst/>
+                <a:latin typeface="Ubuntu Mono" panose="020B0509030602030204" pitchFamily="49" charset="0"/>
+                <a:ea typeface="Times New Roman" panose="02020603050405020304" pitchFamily="18" charset="0"/>
+              </a:rPr>
+              <a:t>keras.models</a:t>
+            </a:r>
+            <a:r>
+              <a:rPr lang="en-IN" sz="1800" dirty="0">
+                <a:solidFill>
+                  <a:srgbClr val="000000"/>
+                </a:solidFill>
+                <a:effectLst/>
+                <a:latin typeface="Ubuntu Mono" panose="020B0509030602030204" pitchFamily="49" charset="0"/>
+                <a:ea typeface="Times New Roman" panose="02020603050405020304" pitchFamily="18" charset="0"/>
+              </a:rPr>
+              <a:t> import </a:t>
+            </a:r>
+            <a:r>
+              <a:rPr lang="en-IN" sz="1800" dirty="0" err="1">
+                <a:solidFill>
+                  <a:srgbClr val="000000"/>
+                </a:solidFill>
+                <a:effectLst/>
+                <a:latin typeface="Ubuntu Mono" panose="020B0509030602030204" pitchFamily="49" charset="0"/>
+                <a:ea typeface="Times New Roman" panose="02020603050405020304" pitchFamily="18" charset="0"/>
+              </a:rPr>
+              <a:t>load_model</a:t>
+            </a:r>
+            <a:endParaRPr lang="en-IN" sz="1800" dirty="0">
+              <a:effectLst/>
+              <a:latin typeface="Times New Roman" panose="02020603050405020304" pitchFamily="18" charset="0"/>
+              <a:ea typeface="Times New Roman" panose="02020603050405020304" pitchFamily="18" charset="0"/>
+            </a:endParaRPr>
+          </a:p>
+          <a:p>
+            <a:pPr marL="342900" indent="-342900">
+              <a:buFont typeface="+mj-lt"/>
+              <a:buAutoNum type="arabicPeriod"/>
+            </a:pPr>
+            <a:r>
+              <a:rPr lang="en-IN" sz="1800" dirty="0">
+                <a:effectLst/>
+                <a:latin typeface="Ubuntu Mono" panose="020B0509030602030204" pitchFamily="49" charset="0"/>
+                <a:ea typeface="Times New Roman" panose="02020603050405020304" pitchFamily="18" charset="0"/>
+                <a:cs typeface="Times New Roman" panose="02020603050405020304" pitchFamily="18" charset="0"/>
+              </a:rPr>
+              <a:t>from </a:t>
+            </a:r>
+            <a:r>
+              <a:rPr lang="en-IN" sz="1800" dirty="0" err="1">
+                <a:effectLst/>
+                <a:latin typeface="Ubuntu Mono" panose="020B0509030602030204" pitchFamily="49" charset="0"/>
+                <a:ea typeface="Times New Roman" panose="02020603050405020304" pitchFamily="18" charset="0"/>
+                <a:cs typeface="Times New Roman" panose="02020603050405020304" pitchFamily="18" charset="0"/>
+              </a:rPr>
+              <a:t>keras.optimizers</a:t>
+            </a:r>
+            <a:r>
+              <a:rPr lang="en-IN" sz="1800" dirty="0">
+                <a:effectLst/>
+                <a:latin typeface="Ubuntu Mono" panose="020B0509030602030204" pitchFamily="49" charset="0"/>
+                <a:ea typeface="Times New Roman" panose="02020603050405020304" pitchFamily="18" charset="0"/>
+                <a:cs typeface="Times New Roman" panose="02020603050405020304" pitchFamily="18" charset="0"/>
+              </a:rPr>
+              <a:t> import Adam</a:t>
+            </a:r>
+          </a:p>
+          <a:p>
+            <a:pPr marL="342900" indent="-342900">
+              <a:buFont typeface="+mj-lt"/>
+              <a:buAutoNum type="arabicPeriod"/>
+            </a:pPr>
+            <a:endParaRPr lang="en-IN" sz="1800" dirty="0">
+              <a:latin typeface="Ubuntu Mono" panose="020B0509030602030204" pitchFamily="49" charset="0"/>
+              <a:ea typeface="Times New Roman" panose="02020603050405020304" pitchFamily="18" charset="0"/>
+              <a:cs typeface="Times New Roman" panose="02020603050405020304" pitchFamily="18" charset="0"/>
+            </a:endParaRPr>
+          </a:p>
+          <a:p>
+            <a:pPr marL="342900" indent="-342900">
+              <a:buFont typeface="+mj-lt"/>
+              <a:buAutoNum type="arabicPeriod"/>
+            </a:pPr>
+            <a:r>
+              <a:rPr lang="en-IN" sz="1800" dirty="0">
+                <a:solidFill>
+                  <a:srgbClr val="000000"/>
+                </a:solidFill>
+                <a:effectLst/>
+                <a:latin typeface="Ubuntu Mono" panose="020B0509030602030204" pitchFamily="49" charset="0"/>
+                <a:ea typeface="Times New Roman" panose="02020603050405020304" pitchFamily="18" charset="0"/>
+              </a:rPr>
+              <a:t>import </a:t>
+            </a:r>
+            <a:r>
+              <a:rPr lang="en-IN" sz="1800" dirty="0" err="1">
+                <a:solidFill>
+                  <a:srgbClr val="000000"/>
+                </a:solidFill>
+                <a:effectLst/>
+                <a:latin typeface="Ubuntu Mono" panose="020B0509030602030204" pitchFamily="49" charset="0"/>
+                <a:ea typeface="Times New Roman" panose="02020603050405020304" pitchFamily="18" charset="0"/>
+              </a:rPr>
+              <a:t>numpy</a:t>
+            </a:r>
+            <a:r>
+              <a:rPr lang="en-IN" sz="1800" dirty="0">
+                <a:solidFill>
+                  <a:srgbClr val="000000"/>
+                </a:solidFill>
+                <a:effectLst/>
+                <a:latin typeface="Ubuntu Mono" panose="020B0509030602030204" pitchFamily="49" charset="0"/>
+                <a:ea typeface="Times New Roman" panose="02020603050405020304" pitchFamily="18" charset="0"/>
+              </a:rPr>
+              <a:t> as np</a:t>
+            </a:r>
+            <a:endParaRPr lang="en-IN" sz="1800" dirty="0">
+              <a:effectLst/>
+              <a:latin typeface="Times New Roman" panose="02020603050405020304" pitchFamily="18" charset="0"/>
+              <a:ea typeface="Times New Roman" panose="02020603050405020304" pitchFamily="18" charset="0"/>
+            </a:endParaRPr>
+          </a:p>
+          <a:p>
+            <a:pPr marL="342900" indent="-342900">
+              <a:buFont typeface="+mj-lt"/>
+              <a:buAutoNum type="arabicPeriod"/>
+            </a:pPr>
+            <a:r>
+              <a:rPr lang="en-IN" sz="1800" dirty="0">
+                <a:solidFill>
+                  <a:srgbClr val="000000"/>
+                </a:solidFill>
+                <a:effectLst/>
+                <a:latin typeface="Ubuntu Mono" panose="020B0509030602030204" pitchFamily="49" charset="0"/>
+                <a:ea typeface="Times New Roman" panose="02020603050405020304" pitchFamily="18" charset="0"/>
+              </a:rPr>
+              <a:t>import </a:t>
+            </a:r>
+            <a:r>
+              <a:rPr lang="en-IN" sz="1800" dirty="0" err="1">
+                <a:solidFill>
+                  <a:srgbClr val="000000"/>
+                </a:solidFill>
+                <a:effectLst/>
+                <a:latin typeface="Ubuntu Mono" panose="020B0509030602030204" pitchFamily="49" charset="0"/>
+                <a:ea typeface="Times New Roman" panose="02020603050405020304" pitchFamily="18" charset="0"/>
+              </a:rPr>
+              <a:t>matplotlib.pyplot</a:t>
+            </a:r>
+            <a:r>
+              <a:rPr lang="en-IN" sz="1800" dirty="0">
+                <a:solidFill>
+                  <a:srgbClr val="000000"/>
+                </a:solidFill>
+                <a:effectLst/>
+                <a:latin typeface="Ubuntu Mono" panose="020B0509030602030204" pitchFamily="49" charset="0"/>
+                <a:ea typeface="Times New Roman" panose="02020603050405020304" pitchFamily="18" charset="0"/>
+              </a:rPr>
+              <a:t> as </a:t>
+            </a:r>
+            <a:r>
+              <a:rPr lang="en-IN" sz="1800" dirty="0" err="1">
+                <a:solidFill>
+                  <a:srgbClr val="000000"/>
+                </a:solidFill>
+                <a:effectLst/>
+                <a:latin typeface="Ubuntu Mono" panose="020B0509030602030204" pitchFamily="49" charset="0"/>
+                <a:ea typeface="Times New Roman" panose="02020603050405020304" pitchFamily="18" charset="0"/>
+              </a:rPr>
+              <a:t>plt</a:t>
+            </a:r>
+            <a:endParaRPr lang="en-IN" sz="1800" dirty="0">
+              <a:effectLst/>
+              <a:latin typeface="Times New Roman" panose="02020603050405020304" pitchFamily="18" charset="0"/>
+              <a:ea typeface="Times New Roman" panose="02020603050405020304" pitchFamily="18" charset="0"/>
+            </a:endParaRPr>
+          </a:p>
+          <a:p>
+            <a:pPr marL="342900" indent="-342900">
+              <a:buFont typeface="+mj-lt"/>
+              <a:buAutoNum type="arabicPeriod"/>
+            </a:pPr>
+            <a:endParaRPr lang="en-IN" sz="1800" dirty="0">
+              <a:effectLst/>
+              <a:latin typeface="Times New Roman" panose="02020603050405020304" pitchFamily="18" charset="0"/>
+              <a:ea typeface="Times New Roman" panose="02020603050405020304" pitchFamily="18" charset="0"/>
+            </a:endParaRPr>
+          </a:p>
+          <a:p>
+            <a:endParaRPr lang="en-IN" dirty="0"/>
+          </a:p>
+        </p:txBody>
+      </p:sp>
+    </p:spTree>
+    <p:extLst>
+      <p:ext uri="{BB962C8B-B14F-4D97-AF65-F5344CB8AC3E}">
+        <p14:creationId xmlns:p14="http://schemas.microsoft.com/office/powerpoint/2010/main" val="1510136491"/>
+      </p:ext>
+    </p:extLst>
+  </p:cSld>
+  <p:clrMapOvr>
+    <a:masterClrMapping/>
+  </p:clrMapOvr>
+</p:sld>
+</file>
+
+<file path=ppt/slides/slide13.xml><?xml version="1.0" encoding="utf-8"?>
+<p:sld xmlns:a="http://schemas.openxmlformats.org/drawingml/2006/main" xmlns:r="http://schemas.openxmlformats.org/officeDocument/2006/relationships" xmlns:p="http://schemas.openxmlformats.org/presentationml/2006/main">
+  <p:cSld>
+    <p:spTree>
+      <p:nvGrpSpPr>
+        <p:cNvPr id="1" name=""/>
+        <p:cNvGrpSpPr/>
+        <p:nvPr/>
+      </p:nvGrpSpPr>
+      <p:grpSpPr>
+        <a:xfrm>
+          <a:off x="0" y="0"/>
+          <a:ext cx="0" cy="0"/>
+          <a:chOff x="0" y="0"/>
+          <a:chExt cx="0" cy="0"/>
+        </a:xfrm>
+      </p:grpSpPr>
+      <p:sp>
+        <p:nvSpPr>
+          <p:cNvPr id="2" name="Title 1">
+            <a:extLst>
+              <a:ext uri="{FF2B5EF4-FFF2-40B4-BE49-F238E27FC236}">
+                <a16:creationId xmlns:a16="http://schemas.microsoft.com/office/drawing/2014/main" id="{DA0678D2-152F-4259-B7AC-D7F433E2B510}"/>
+              </a:ext>
+            </a:extLst>
+          </p:cNvPr>
+          <p:cNvSpPr>
+            <a:spLocks noGrp="1"/>
+          </p:cNvSpPr>
+          <p:nvPr>
+            <p:ph type="title"/>
+          </p:nvPr>
+        </p:nvSpPr>
+        <p:spPr/>
+        <p:txBody>
+          <a:bodyPr/>
+          <a:lstStyle/>
+          <a:p>
+            <a:endParaRPr lang="en-IN"/>
+          </a:p>
+        </p:txBody>
+      </p:sp>
+      <p:sp>
+        <p:nvSpPr>
+          <p:cNvPr id="3" name="Content Placeholder 2">
+            <a:extLst>
+              <a:ext uri="{FF2B5EF4-FFF2-40B4-BE49-F238E27FC236}">
+                <a16:creationId xmlns:a16="http://schemas.microsoft.com/office/drawing/2014/main" id="{A20B69D3-F76D-4A92-95E6-D62EF864FABF}"/>
+              </a:ext>
+            </a:extLst>
+          </p:cNvPr>
+          <p:cNvSpPr>
+            <a:spLocks noGrp="1"/>
+          </p:cNvSpPr>
+          <p:nvPr>
+            <p:ph idx="1"/>
+          </p:nvPr>
+        </p:nvSpPr>
+        <p:spPr/>
+        <p:txBody>
+          <a:bodyPr/>
+          <a:lstStyle/>
+          <a:p>
+            <a:endParaRPr lang="en-IN"/>
+          </a:p>
+        </p:txBody>
+      </p:sp>
+    </p:spTree>
+    <p:extLst>
+      <p:ext uri="{BB962C8B-B14F-4D97-AF65-F5344CB8AC3E}">
+        <p14:creationId xmlns:p14="http://schemas.microsoft.com/office/powerpoint/2010/main" val="2499631946"/>
+      </p:ext>
+    </p:extLst>
+  </p:cSld>
+  <p:clrMapOvr>
+    <a:masterClrMapping/>
+  </p:clrMapOvr>
+</p:sld>
+</file>
+
+<file path=ppt/slides/slide14.xml><?xml version="1.0" encoding="utf-8"?>
+<p:sld xmlns:a="http://schemas.openxmlformats.org/drawingml/2006/main" xmlns:r="http://schemas.openxmlformats.org/officeDocument/2006/relationships" xmlns:p="http://schemas.openxmlformats.org/presentationml/2006/main">
+  <p:cSld>
+    <p:spTree>
+      <p:nvGrpSpPr>
+        <p:cNvPr id="1" name=""/>
+        <p:cNvGrpSpPr/>
+        <p:nvPr/>
+      </p:nvGrpSpPr>
+      <p:grpSpPr>
+        <a:xfrm>
+          <a:off x="0" y="0"/>
+          <a:ext cx="0" cy="0"/>
+          <a:chOff x="0" y="0"/>
+          <a:chExt cx="0" cy="0"/>
+        </a:xfrm>
+      </p:grpSpPr>
+      <p:sp>
+        <p:nvSpPr>
+          <p:cNvPr id="2" name="Title 1">
+            <a:extLst>
+              <a:ext uri="{FF2B5EF4-FFF2-40B4-BE49-F238E27FC236}">
+                <a16:creationId xmlns:a16="http://schemas.microsoft.com/office/drawing/2014/main" id="{381CC4B7-5A8D-4F09-91BF-BC61DC7733A9}"/>
+              </a:ext>
+            </a:extLst>
+          </p:cNvPr>
+          <p:cNvSpPr>
+            <a:spLocks noGrp="1"/>
+          </p:cNvSpPr>
+          <p:nvPr>
+            <p:ph type="title"/>
+          </p:nvPr>
+        </p:nvSpPr>
+        <p:spPr/>
+        <p:txBody>
+          <a:bodyPr/>
+          <a:lstStyle/>
+          <a:p>
+            <a:r>
+              <a:rPr lang="en-US" dirty="0"/>
+              <a:t>Feature Extraction</a:t>
+            </a:r>
+            <a:endParaRPr lang="en-IN" dirty="0"/>
+          </a:p>
+        </p:txBody>
+      </p:sp>
+      <p:sp>
+        <p:nvSpPr>
+          <p:cNvPr id="3" name="Content Placeholder 2">
+            <a:extLst>
+              <a:ext uri="{FF2B5EF4-FFF2-40B4-BE49-F238E27FC236}">
+                <a16:creationId xmlns:a16="http://schemas.microsoft.com/office/drawing/2014/main" id="{C220D63B-EC69-4EA9-9819-1F982DA39252}"/>
+              </a:ext>
+            </a:extLst>
+          </p:cNvPr>
+          <p:cNvSpPr>
+            <a:spLocks noGrp="1"/>
+          </p:cNvSpPr>
+          <p:nvPr>
+            <p:ph idx="1"/>
+          </p:nvPr>
+        </p:nvSpPr>
+        <p:spPr/>
+        <p:txBody>
+          <a:bodyPr/>
+          <a:lstStyle/>
+          <a:p>
+            <a:endParaRPr lang="en-IN"/>
+          </a:p>
+        </p:txBody>
+      </p:sp>
+    </p:spTree>
+    <p:extLst>
+      <p:ext uri="{BB962C8B-B14F-4D97-AF65-F5344CB8AC3E}">
+        <p14:creationId xmlns:p14="http://schemas.microsoft.com/office/powerpoint/2010/main" val="305898157"/>
+      </p:ext>
+    </p:extLst>
+  </p:cSld>
+  <p:clrMapOvr>
+    <a:masterClrMapping/>
+  </p:clrMapOvr>
+</p:sld>
+</file>
+
+<file path=ppt/slides/slide15.xml><?xml version="1.0" encoding="utf-8"?>
+<p:sld xmlns:a="http://schemas.openxmlformats.org/drawingml/2006/main" xmlns:r="http://schemas.openxmlformats.org/officeDocument/2006/relationships" xmlns:p="http://schemas.openxmlformats.org/presentationml/2006/main">
+  <p:cSld>
+    <p:spTree>
+      <p:nvGrpSpPr>
+        <p:cNvPr id="1" name=""/>
+        <p:cNvGrpSpPr/>
+        <p:nvPr/>
+      </p:nvGrpSpPr>
+      <p:grpSpPr>
+        <a:xfrm>
+          <a:off x="0" y="0"/>
+          <a:ext cx="0" cy="0"/>
+          <a:chOff x="0" y="0"/>
+          <a:chExt cx="0" cy="0"/>
+        </a:xfrm>
+      </p:grpSpPr>
+      <p:sp>
+        <p:nvSpPr>
+          <p:cNvPr id="2" name="Title 1">
+            <a:extLst>
+              <a:ext uri="{FF2B5EF4-FFF2-40B4-BE49-F238E27FC236}">
+                <a16:creationId xmlns:a16="http://schemas.microsoft.com/office/drawing/2014/main" id="{ED6B1ED7-9AF7-48E9-91F7-11DA2210943E}"/>
+              </a:ext>
+            </a:extLst>
+          </p:cNvPr>
+          <p:cNvSpPr>
+            <a:spLocks noGrp="1"/>
+          </p:cNvSpPr>
+          <p:nvPr>
+            <p:ph type="title"/>
+          </p:nvPr>
+        </p:nvSpPr>
+        <p:spPr/>
+        <p:txBody>
+          <a:bodyPr/>
+          <a:lstStyle/>
+          <a:p>
+            <a:r>
+              <a:rPr lang="en-US" dirty="0"/>
+              <a:t>Program Walkthrough</a:t>
+            </a:r>
+            <a:endParaRPr lang="en-IN" dirty="0"/>
+          </a:p>
+        </p:txBody>
+      </p:sp>
+      <p:sp>
+        <p:nvSpPr>
+          <p:cNvPr id="3" name="Content Placeholder 2">
+            <a:extLst>
+              <a:ext uri="{FF2B5EF4-FFF2-40B4-BE49-F238E27FC236}">
+                <a16:creationId xmlns:a16="http://schemas.microsoft.com/office/drawing/2014/main" id="{9649E26D-8AB1-4E98-9C9D-DFBD7BDCD9CC}"/>
+              </a:ext>
+            </a:extLst>
+          </p:cNvPr>
+          <p:cNvSpPr>
+            <a:spLocks noGrp="1"/>
+          </p:cNvSpPr>
+          <p:nvPr>
+            <p:ph idx="1"/>
+          </p:nvPr>
+        </p:nvSpPr>
+        <p:spPr/>
+        <p:txBody>
+          <a:bodyPr/>
+          <a:lstStyle/>
+          <a:p>
+            <a:endParaRPr lang="en-IN"/>
+          </a:p>
+        </p:txBody>
+      </p:sp>
+    </p:spTree>
+    <p:extLst>
+      <p:ext uri="{BB962C8B-B14F-4D97-AF65-F5344CB8AC3E}">
+        <p14:creationId xmlns:p14="http://schemas.microsoft.com/office/powerpoint/2010/main" val="353132920"/>
+      </p:ext>
+    </p:extLst>
+  </p:cSld>
+  <p:clrMapOvr>
+    <a:masterClrMapping/>
+  </p:clrMapOvr>
+</p:sld>
+</file>
+
+<file path=ppt/slides/slide16.xml><?xml version="1.0" encoding="utf-8"?>
+<p:sld xmlns:a="http://schemas.openxmlformats.org/drawingml/2006/main" xmlns:r="http://schemas.openxmlformats.org/officeDocument/2006/relationships" xmlns:p="http://schemas.openxmlformats.org/presentationml/2006/main">
+  <p:cSld>
+    <p:spTree>
+      <p:nvGrpSpPr>
+        <p:cNvPr id="1" name=""/>
+        <p:cNvGrpSpPr/>
+        <p:nvPr/>
+      </p:nvGrpSpPr>
+      <p:grpSpPr>
+        <a:xfrm>
+          <a:off x="0" y="0"/>
+          <a:ext cx="0" cy="0"/>
+          <a:chOff x="0" y="0"/>
+          <a:chExt cx="0" cy="0"/>
+        </a:xfrm>
+      </p:grpSpPr>
+      <p:sp>
+        <p:nvSpPr>
+          <p:cNvPr id="2" name="Title 1">
+            <a:extLst>
+              <a:ext uri="{FF2B5EF4-FFF2-40B4-BE49-F238E27FC236}">
+                <a16:creationId xmlns:a16="http://schemas.microsoft.com/office/drawing/2014/main" id="{C5B74EA3-70A7-4D58-A313-F6A23AE5AE60}"/>
+              </a:ext>
+            </a:extLst>
+          </p:cNvPr>
+          <p:cNvSpPr>
+            <a:spLocks noGrp="1"/>
+          </p:cNvSpPr>
+          <p:nvPr>
+            <p:ph type="title"/>
+          </p:nvPr>
+        </p:nvSpPr>
+        <p:spPr/>
+        <p:txBody>
+          <a:bodyPr/>
+          <a:lstStyle/>
+          <a:p>
+            <a:r>
+              <a:rPr lang="en-US" dirty="0"/>
+              <a:t>What comes next</a:t>
+            </a:r>
+            <a:endParaRPr lang="en-IN" dirty="0"/>
+          </a:p>
+        </p:txBody>
+      </p:sp>
+      <p:sp>
+        <p:nvSpPr>
+          <p:cNvPr id="3" name="Content Placeholder 2">
+            <a:extLst>
+              <a:ext uri="{FF2B5EF4-FFF2-40B4-BE49-F238E27FC236}">
+                <a16:creationId xmlns:a16="http://schemas.microsoft.com/office/drawing/2014/main" id="{409F4B5A-1492-49E3-B2C9-138CE0C0895E}"/>
+              </a:ext>
+            </a:extLst>
+          </p:cNvPr>
+          <p:cNvSpPr>
+            <a:spLocks noGrp="1"/>
+          </p:cNvSpPr>
+          <p:nvPr>
+            <p:ph idx="1"/>
+          </p:nvPr>
+        </p:nvSpPr>
+        <p:spPr/>
+        <p:txBody>
+          <a:bodyPr/>
+          <a:lstStyle/>
+          <a:p>
+            <a:endParaRPr lang="en-IN"/>
+          </a:p>
+        </p:txBody>
+      </p:sp>
+    </p:spTree>
+    <p:extLst>
+      <p:ext uri="{BB962C8B-B14F-4D97-AF65-F5344CB8AC3E}">
+        <p14:creationId xmlns:p14="http://schemas.microsoft.com/office/powerpoint/2010/main" val="1737215722"/>
+      </p:ext>
+    </p:extLst>
+  </p:cSld>
+  <p:clrMapOvr>
+    <a:masterClrMapping/>
+  </p:clrMapOvr>
+</p:sld>
+</file>
+
 <file path=ppt/slides/slide2.xml><?xml version="1.0" encoding="utf-8"?>
 <p:sld xmlns:a="http://schemas.openxmlformats.org/drawingml/2006/main" xmlns:r="http://schemas.openxmlformats.org/officeDocument/2006/relationships" xmlns:p="http://schemas.openxmlformats.org/presentationml/2006/main">
   <p:cSld>
@@ -3848,7 +5338,7 @@
           <p:cNvPr id="2" name="Title 1">
             <a:extLst>
               <a:ext uri="{FF2B5EF4-FFF2-40B4-BE49-F238E27FC236}">
-                <a16:creationId xmlns:a16="http://schemas.microsoft.com/office/drawing/2014/main" id="{FBAAA32B-BD42-4446-809A-7EC9BA53ACA7}"/>
+                <a16:creationId xmlns:a16="http://schemas.microsoft.com/office/drawing/2014/main" id="{DBCC1EB3-BDD3-4D3F-A6DA-32CA58C394B5}"/>
               </a:ext>
             </a:extLst>
           </p:cNvPr>
@@ -3866,7 +5356,7 @@
           <a:p>
             <a:r>
               <a:rPr lang="en-US" dirty="0"/>
-              <a:t>Background</a:t>
+              <a:t>Software Used</a:t>
             </a:r>
             <a:endParaRPr lang="en-IN" dirty="0"/>
           </a:p>
@@ -3877,7 +5367,7 @@
           <p:cNvPr id="3" name="Content Placeholder 2">
             <a:extLst>
               <a:ext uri="{FF2B5EF4-FFF2-40B4-BE49-F238E27FC236}">
-                <a16:creationId xmlns:a16="http://schemas.microsoft.com/office/drawing/2014/main" id="{E0643363-7A65-4963-9491-D6A5839A5585}"/>
+                <a16:creationId xmlns:a16="http://schemas.microsoft.com/office/drawing/2014/main" id="{4DEB95E1-32C5-408A-AA5D-D2891327DA28}"/>
               </a:ext>
             </a:extLst>
           </p:cNvPr>
@@ -3890,17 +5380,74 @@
         </p:nvSpPr>
         <p:spPr/>
         <p:txBody>
-          <a:bodyPr/>
-          <a:lstStyle/>
-          <a:p>
-            <a:endParaRPr lang="en-IN"/>
+          <a:bodyPr>
+            <a:normAutofit lnSpcReduction="10000"/>
+          </a:bodyPr>
+          <a:lstStyle/>
+          <a:p>
+            <a:r>
+              <a:rPr lang="en-US" dirty="0"/>
+              <a:t>Python 3.8</a:t>
+            </a:r>
+          </a:p>
+          <a:p>
+            <a:r>
+              <a:rPr lang="en-US" dirty="0"/>
+              <a:t>TensorFlow 2.0</a:t>
+            </a:r>
+          </a:p>
+          <a:p>
+            <a:r>
+              <a:rPr lang="en-US" dirty="0" err="1"/>
+              <a:t>Keras</a:t>
+            </a:r>
+            <a:endParaRPr lang="en-US" dirty="0"/>
+          </a:p>
+          <a:p>
+            <a:r>
+              <a:rPr lang="en-US" dirty="0"/>
+              <a:t>NumPy</a:t>
+            </a:r>
+          </a:p>
+          <a:p>
+            <a:r>
+              <a:rPr lang="en-US" dirty="0"/>
+              <a:t>Pandas</a:t>
+            </a:r>
+          </a:p>
+          <a:p>
+            <a:r>
+              <a:rPr lang="en-US" dirty="0"/>
+              <a:t>Mat Plot Lib</a:t>
+            </a:r>
+          </a:p>
+          <a:p>
+            <a:r>
+              <a:rPr lang="en-US" dirty="0" err="1"/>
+              <a:t>PyPlot</a:t>
+            </a:r>
+            <a:endParaRPr lang="en-US" dirty="0"/>
+          </a:p>
+          <a:p>
+            <a:r>
+              <a:rPr lang="en-US" dirty="0" err="1"/>
+              <a:t>SeaBorn</a:t>
+            </a:r>
+            <a:endParaRPr lang="en-US" dirty="0"/>
+          </a:p>
+          <a:p>
+            <a:r>
+              <a:rPr lang="en-US" dirty="0"/>
+              <a:t>VGG16</a:t>
+            </a:r>
+            <a:endParaRPr lang="en-IN" dirty="0"/>
           </a:p>
         </p:txBody>
       </p:sp>
     </p:spTree>
     <p:extLst>
       <p:ext uri="{BB962C8B-B14F-4D97-AF65-F5344CB8AC3E}">
-        <p14:creationId xmlns:p14="http://schemas.microsoft.com/office/powerpoint/2010/main" val="98565076"/>
+        <p14:creationId xmlns:p14="http://schemas.microsoft.com/office/powerpoint/2010/main" val="1740807983"/>
       </p:ext>
     </p:extLst>
   </p:cSld>
@@ -3932,7 +5479,7 @@
           <p:cNvPr id="2" name="Title 1">
             <a:extLst>
               <a:ext uri="{FF2B5EF4-FFF2-40B4-BE49-F238E27FC236}">
-                <a16:creationId xmlns:a16="http://schemas.microsoft.com/office/drawing/2014/main" id="{D2B92511-C113-4CD4-A7C5-CE0DDE291C15}"/>
+                <a16:creationId xmlns:a16="http://schemas.microsoft.com/office/drawing/2014/main" id="{45A89841-D178-4B1E-8FB7-A968CC75D3E5}"/>
               </a:ext>
             </a:extLst>
           </p:cNvPr>
@@ -3950,7 +5497,7 @@
           <a:p>
             <a:r>
               <a:rPr lang="en-US" dirty="0"/>
-              <a:t>Summary of Present Work</a:t>
+              <a:t>Hardware Used</a:t>
             </a:r>
             <a:endParaRPr lang="en-IN" dirty="0"/>
           </a:p>
@@ -3961,7 +5508,7 @@
           <p:cNvPr id="3" name="Content Placeholder 2">
             <a:extLst>
               <a:ext uri="{FF2B5EF4-FFF2-40B4-BE49-F238E27FC236}">
-                <a16:creationId xmlns:a16="http://schemas.microsoft.com/office/drawing/2014/main" id="{473B03CB-A011-4FAD-974F-93AB0C7BF162}"/>
+                <a16:creationId xmlns:a16="http://schemas.microsoft.com/office/drawing/2014/main" id="{C69C6BB9-394E-4389-98FC-04D2A8AC46E7}"/>
               </a:ext>
             </a:extLst>
           </p:cNvPr>
@@ -3977,14 +5524,45 @@
           <a:bodyPr/>
           <a:lstStyle/>
           <a:p>
-            <a:endParaRPr lang="en-IN"/>
+            <a:r>
+              <a:rPr lang="en-IN" dirty="0"/>
+              <a:t>HP Pavilion with Intel i5 Quad-Core, Integrated Graphics Card, 8GB RAM</a:t>
+            </a:r>
+          </a:p>
+          <a:p>
+            <a:r>
+              <a:rPr lang="en-IN" dirty="0"/>
+              <a:t>Dell G3 with 2.6GHz Hexa-Core Intel i7 Processor, Integrated Graphics Card, 8GB RAM</a:t>
+            </a:r>
+          </a:p>
+          <a:p>
+            <a:r>
+              <a:rPr lang="en-IN" dirty="0"/>
+              <a:t>Asus </a:t>
+            </a:r>
+            <a:r>
+              <a:rPr lang="en-IN" dirty="0" err="1"/>
+              <a:t>Vivibook</a:t>
+            </a:r>
+            <a:r>
+              <a:rPr lang="en-IN" dirty="0"/>
+              <a:t> 2GHz Quad-Core AMD </a:t>
+            </a:r>
+            <a:r>
+              <a:rPr lang="en-IN" dirty="0" err="1"/>
+              <a:t>Ryzen</a:t>
+            </a:r>
+            <a:r>
+              <a:rPr lang="en-IN" dirty="0"/>
+              <a:t> 5 Processor, Integrated Graphics Card, 8GB RAM</a:t>
+            </a:r>
           </a:p>
         </p:txBody>
       </p:sp>
     </p:spTree>
     <p:extLst>
       <p:ext uri="{BB962C8B-B14F-4D97-AF65-F5344CB8AC3E}">
-        <p14:creationId xmlns:p14="http://schemas.microsoft.com/office/powerpoint/2010/main" val="4232411944"/>
+        <p14:creationId xmlns:p14="http://schemas.microsoft.com/office/powerpoint/2010/main" val="4201603467"/>
       </p:ext>
     </p:extLst>
   </p:cSld>
@@ -4016,7 +5594,7 @@
           <p:cNvPr id="2" name="Title 1">
             <a:extLst>
               <a:ext uri="{FF2B5EF4-FFF2-40B4-BE49-F238E27FC236}">
-                <a16:creationId xmlns:a16="http://schemas.microsoft.com/office/drawing/2014/main" id="{45A89841-D178-4B1E-8FB7-A968CC75D3E5}"/>
+                <a16:creationId xmlns:a16="http://schemas.microsoft.com/office/drawing/2014/main" id="{6D8269B7-E799-4838-AD49-925420035CB4}"/>
               </a:ext>
             </a:extLst>
           </p:cNvPr>
@@ -4034,7 +5612,7 @@
           <a:p>
             <a:r>
               <a:rPr lang="en-US" dirty="0"/>
-              <a:t>Hardware and Software Used</a:t>
+              <a:t>Significance of the Hardware</a:t>
             </a:r>
             <a:endParaRPr lang="en-IN" dirty="0"/>
           </a:p>
@@ -4045,7 +5623,7 @@
           <p:cNvPr id="3" name="Content Placeholder 2">
             <a:extLst>
               <a:ext uri="{FF2B5EF4-FFF2-40B4-BE49-F238E27FC236}">
-                <a16:creationId xmlns:a16="http://schemas.microsoft.com/office/drawing/2014/main" id="{C69C6BB9-394E-4389-98FC-04D2A8AC46E7}"/>
+                <a16:creationId xmlns:a16="http://schemas.microsoft.com/office/drawing/2014/main" id="{316EA5F6-470D-4404-A64D-43C58B55C5A6}"/>
               </a:ext>
             </a:extLst>
           </p:cNvPr>
@@ -4061,14 +5639,26 @@
           <a:bodyPr/>
           <a:lstStyle/>
           <a:p>
-            <a:endParaRPr lang="en-IN"/>
+            <a:r>
+              <a:rPr lang="en-US" dirty="0"/>
+              <a:t>RAM and Processor for Processing Speed</a:t>
+            </a:r>
+          </a:p>
+          <a:p>
+            <a:r>
+              <a:rPr lang="en-US" dirty="0"/>
+              <a:t>GPU Might Help!</a:t>
+            </a:r>
+          </a:p>
+          <a:p>
+            <a:endParaRPr lang="en-IN" dirty="0"/>
           </a:p>
         </p:txBody>
       </p:sp>
     </p:spTree>
     <p:extLst>
       <p:ext uri="{BB962C8B-B14F-4D97-AF65-F5344CB8AC3E}">
-        <p14:creationId xmlns:p14="http://schemas.microsoft.com/office/powerpoint/2010/main" val="4201603467"/>
+        <p14:creationId xmlns:p14="http://schemas.microsoft.com/office/powerpoint/2010/main" val="1716320188"/>
       </p:ext>
     </p:extLst>
   </p:cSld>
@@ -4118,7 +5708,7 @@
           <a:p>
             <a:r>
               <a:rPr lang="en-US" dirty="0"/>
-              <a:t>About the Data Set</a:t>
+              <a:t>Collection of Data Set</a:t>
             </a:r>
             <a:endParaRPr lang="en-IN" dirty="0"/>
           </a:p>
@@ -4145,7 +5735,25 @@
           <a:bodyPr/>
           <a:lstStyle/>
           <a:p>
-            <a:endParaRPr lang="en-IN"/>
+            <a:r>
+              <a:rPr lang="en-US" dirty="0"/>
+              <a:t>121 volunteers</a:t>
+            </a:r>
+          </a:p>
+          <a:p>
+            <a:r>
+              <a:rPr lang="en-US" dirty="0"/>
+              <a:t>Handwritten Passage</a:t>
+            </a:r>
+          </a:p>
+          <a:p>
+            <a:r>
+              <a:rPr lang="en-US" dirty="0"/>
+              <a:t>Bangla Text in our project</a:t>
+            </a:r>
+          </a:p>
+          <a:p>
+            <a:endParaRPr lang="en-US" dirty="0"/>
           </a:p>
         </p:txBody>
       </p:sp>
@@ -4184,7 +5792,7 @@
           <p:cNvPr id="2" name="Title 1">
             <a:extLst>
               <a:ext uri="{FF2B5EF4-FFF2-40B4-BE49-F238E27FC236}">
-                <a16:creationId xmlns:a16="http://schemas.microsoft.com/office/drawing/2014/main" id="{0DC8E74A-8FBA-48C4-A822-E3ADE557B88C}"/>
+                <a16:creationId xmlns:a16="http://schemas.microsoft.com/office/drawing/2014/main" id="{323FA6F3-109C-4DE0-B86F-5C0467EBD8FD}"/>
               </a:ext>
             </a:extLst>
           </p:cNvPr>
@@ -4201,42 +5809,152 @@
           <a:lstStyle/>
           <a:p>
             <a:r>
-              <a:rPr lang="en-US" dirty="0"/>
-              <a:t>About the Model</a:t>
-            </a:r>
+              <a:rPr lang="en-US" dirty="0">
+                <a:latin typeface="Garamond" panose="02020404030301010803" pitchFamily="18" charset="0"/>
+              </a:rPr>
+              <a:t>Preparation of Data Set</a:t>
+            </a:r>
+            <a:endParaRPr lang="en-IN" dirty="0">
+              <a:latin typeface="Garamond" panose="02020404030301010803" pitchFamily="18" charset="0"/>
+            </a:endParaRPr>
+          </a:p>
+        </p:txBody>
+      </p:sp>
+      <p:sp>
+        <p:nvSpPr>
+          <p:cNvPr id="3" name="Content Placeholder 2">
+            <a:extLst>
+              <a:ext uri="{FF2B5EF4-FFF2-40B4-BE49-F238E27FC236}">
+                <a16:creationId xmlns:a16="http://schemas.microsoft.com/office/drawing/2014/main" id="{46EF48B6-9995-458D-AA70-B7B974D14D25}"/>
+              </a:ext>
+            </a:extLst>
+          </p:cNvPr>
+          <p:cNvSpPr>
+            <a:spLocks noGrp="1"/>
+          </p:cNvSpPr>
+          <p:nvPr>
+            <p:ph idx="1"/>
+          </p:nvPr>
+        </p:nvSpPr>
+        <p:spPr/>
+        <p:txBody>
+          <a:bodyPr>
+            <a:normAutofit lnSpcReduction="10000"/>
+          </a:bodyPr>
+          <a:lstStyle/>
+          <a:p>
+            <a:r>
+              <a:rPr lang="en-US" dirty="0">
+                <a:latin typeface="Frank Ruhl Hofshi" panose="00000500000000000000" pitchFamily="50" charset="-79"/>
+                <a:cs typeface="Frank Ruhl Hofshi" panose="00000500000000000000" pitchFamily="50" charset="-79"/>
+              </a:rPr>
+              <a:t>Noise Eliminated</a:t>
+            </a:r>
+          </a:p>
+          <a:p>
+            <a:r>
+              <a:rPr lang="en-US" dirty="0">
+                <a:latin typeface="Frank Ruhl Hofshi" panose="00000500000000000000" pitchFamily="50" charset="-79"/>
+                <a:cs typeface="Frank Ruhl Hofshi" panose="00000500000000000000" pitchFamily="50" charset="-79"/>
+              </a:rPr>
+              <a:t>Word-sized Segments</a:t>
+            </a:r>
+          </a:p>
+          <a:p>
+            <a:r>
+              <a:rPr lang="en-US" dirty="0">
+                <a:latin typeface="Frank Ruhl Hofshi" panose="00000500000000000000" pitchFamily="50" charset="-79"/>
+                <a:cs typeface="Frank Ruhl Hofshi" panose="00000500000000000000" pitchFamily="50" charset="-79"/>
+              </a:rPr>
+              <a:t>Each </a:t>
+            </a:r>
+            <a:r>
+              <a:rPr lang="en-US" dirty="0" err="1">
+                <a:latin typeface="Frank Ruhl Hofshi" panose="00000500000000000000" pitchFamily="50" charset="-79"/>
+                <a:cs typeface="Frank Ruhl Hofshi" panose="00000500000000000000" pitchFamily="50" charset="-79"/>
+              </a:rPr>
+              <a:t>DataSet</a:t>
+            </a:r>
+            <a:r>
+              <a:rPr lang="en-US" dirty="0">
+                <a:latin typeface="Frank Ruhl Hofshi" panose="00000500000000000000" pitchFamily="50" charset="-79"/>
+                <a:cs typeface="Frank Ruhl Hofshi" panose="00000500000000000000" pitchFamily="50" charset="-79"/>
+              </a:rPr>
+              <a:t> has 20 Folders</a:t>
+            </a:r>
+          </a:p>
+          <a:p>
+            <a:r>
+              <a:rPr lang="en-US" dirty="0">
+                <a:latin typeface="Frank Ruhl Hofshi" panose="00000500000000000000" pitchFamily="50" charset="-79"/>
+                <a:cs typeface="Frank Ruhl Hofshi" panose="00000500000000000000" pitchFamily="50" charset="-79"/>
+              </a:rPr>
+              <a:t>Every Folder has Data for 2 Authors</a:t>
+            </a:r>
+          </a:p>
+          <a:p>
+            <a:r>
+              <a:rPr lang="en-US" dirty="0">
+                <a:latin typeface="Frank Ruhl Hofshi" panose="00000500000000000000" pitchFamily="50" charset="-79"/>
+                <a:cs typeface="Frank Ruhl Hofshi" panose="00000500000000000000" pitchFamily="50" charset="-79"/>
+              </a:rPr>
+              <a:t>5 Sets of Data for Each Author Pair</a:t>
+            </a:r>
+          </a:p>
+          <a:p>
+            <a:r>
+              <a:rPr lang="en-US" dirty="0">
+                <a:latin typeface="Frank Ruhl Hofshi" panose="00000500000000000000" pitchFamily="50" charset="-79"/>
+                <a:cs typeface="Frank Ruhl Hofshi" panose="00000500000000000000" pitchFamily="50" charset="-79"/>
+              </a:rPr>
+              <a:t>3 Training Sets and 2 Testing Sets</a:t>
+            </a:r>
+          </a:p>
+          <a:p>
+            <a:r>
+              <a:rPr lang="en-US" dirty="0">
+                <a:latin typeface="Frank Ruhl Hofshi" panose="00000500000000000000" pitchFamily="50" charset="-79"/>
+                <a:cs typeface="Frank Ruhl Hofshi" panose="00000500000000000000" pitchFamily="50" charset="-79"/>
+              </a:rPr>
+              <a:t>Tag Image File Format</a:t>
+            </a:r>
+          </a:p>
+          <a:p>
+            <a:r>
+              <a:rPr lang="en-US" dirty="0">
+                <a:latin typeface="Frank Ruhl Hofshi" panose="00000500000000000000" pitchFamily="50" charset="-79"/>
+                <a:cs typeface="Frank Ruhl Hofshi" panose="00000500000000000000" pitchFamily="50" charset="-79"/>
+              </a:rPr>
+              <a:t>Format: &lt;Author Code&gt;_&lt;Set Number&gt;_&lt;Image Number&gt;</a:t>
+            </a:r>
+          </a:p>
+          <a:p>
+            <a:r>
+              <a:rPr lang="en-US" dirty="0">
+                <a:latin typeface="Frank Ruhl Hofshi" panose="00000500000000000000" pitchFamily="50" charset="-79"/>
+                <a:cs typeface="Frank Ruhl Hofshi" panose="00000500000000000000" pitchFamily="50" charset="-79"/>
+              </a:rPr>
+              <a:t>5 Data Sets in Total</a:t>
+            </a:r>
+          </a:p>
+          <a:p>
+            <a:endParaRPr lang="en-US" dirty="0"/>
+          </a:p>
+          <a:p>
+            <a:endParaRPr lang="en-US" dirty="0"/>
+          </a:p>
+          <a:p>
+            <a:endParaRPr lang="en-US" dirty="0"/>
+          </a:p>
+          <a:p>
             <a:endParaRPr lang="en-IN" dirty="0"/>
-          </a:p>
-        </p:txBody>
-      </p:sp>
-      <p:sp>
-        <p:nvSpPr>
-          <p:cNvPr id="3" name="Content Placeholder 2">
-            <a:extLst>
-              <a:ext uri="{FF2B5EF4-FFF2-40B4-BE49-F238E27FC236}">
-                <a16:creationId xmlns:a16="http://schemas.microsoft.com/office/drawing/2014/main" id="{6EA92CA0-D082-4220-A25D-35242FF375F5}"/>
-              </a:ext>
-            </a:extLst>
-          </p:cNvPr>
-          <p:cNvSpPr>
-            <a:spLocks noGrp="1"/>
-          </p:cNvSpPr>
-          <p:nvPr>
-            <p:ph idx="1"/>
-          </p:nvPr>
-        </p:nvSpPr>
-        <p:spPr/>
-        <p:txBody>
-          <a:bodyPr/>
-          <a:lstStyle/>
-          <a:p>
-            <a:endParaRPr lang="en-IN"/>
           </a:p>
         </p:txBody>
       </p:sp>
     </p:spTree>
     <p:extLst>
       <p:ext uri="{BB962C8B-B14F-4D97-AF65-F5344CB8AC3E}">
-        <p14:creationId xmlns:p14="http://schemas.microsoft.com/office/powerpoint/2010/main" val="3148733716"/>
+        <p14:creationId xmlns:p14="http://schemas.microsoft.com/office/powerpoint/2010/main" val="3098385368"/>
       </p:ext>
     </p:extLst>
   </p:cSld>
@@ -4268,7 +5986,7 @@
           <p:cNvPr id="2" name="Title 1">
             <a:extLst>
               <a:ext uri="{FF2B5EF4-FFF2-40B4-BE49-F238E27FC236}">
-                <a16:creationId xmlns:a16="http://schemas.microsoft.com/office/drawing/2014/main" id="{ED6B1ED7-9AF7-48E9-91F7-11DA2210943E}"/>
+                <a16:creationId xmlns:a16="http://schemas.microsoft.com/office/drawing/2014/main" id="{FBAAA32B-BD42-4446-809A-7EC9BA53ACA7}"/>
               </a:ext>
             </a:extLst>
           </p:cNvPr>
@@ -4285,14 +6003,14 @@
           <a:lstStyle/>
           <a:p>
             <a:r>
-              <a:rPr lang="en-US" dirty="0"/>
-              <a:t>Program </a:t>
-            </a:r>
-            <a:r>
-              <a:rPr lang="en-US" dirty="0" err="1"/>
-              <a:t>Walktthrough</a:t>
-            </a:r>
-            <a:endParaRPr lang="en-IN" dirty="0"/>
+              <a:rPr lang="en-US" dirty="0">
+                <a:latin typeface="Garamond" panose="02020404030301010803" pitchFamily="18" charset="0"/>
+              </a:rPr>
+              <a:t>Background</a:t>
+            </a:r>
+            <a:endParaRPr lang="en-IN" dirty="0">
+              <a:latin typeface="Garamond" panose="02020404030301010803" pitchFamily="18" charset="0"/>
+            </a:endParaRPr>
           </a:p>
         </p:txBody>
       </p:sp>
@@ -4301,7 +6019,7 @@
           <p:cNvPr id="3" name="Content Placeholder 2">
             <a:extLst>
               <a:ext uri="{FF2B5EF4-FFF2-40B4-BE49-F238E27FC236}">
-                <a16:creationId xmlns:a16="http://schemas.microsoft.com/office/drawing/2014/main" id="{9649E26D-8AB1-4E98-9C9D-DFBD7BDCD9CC}"/>
+                <a16:creationId xmlns:a16="http://schemas.microsoft.com/office/drawing/2014/main" id="{E0643363-7A65-4963-9491-D6A5839A5585}"/>
               </a:ext>
             </a:extLst>
           </p:cNvPr>
@@ -4312,19 +6030,234 @@
             <p:ph idx="1"/>
           </p:nvPr>
         </p:nvSpPr>
-        <p:spPr/>
-        <p:txBody>
-          <a:bodyPr/>
-          <a:lstStyle/>
-          <a:p>
-            <a:endParaRPr lang="en-IN"/>
+        <p:spPr>
+          <a:xfrm>
+            <a:off x="838200" y="1690688"/>
+            <a:ext cx="10515600" cy="4351338"/>
+          </a:xfrm>
+        </p:spPr>
+        <p:txBody>
+          <a:bodyPr>
+            <a:normAutofit fontScale="92500" lnSpcReduction="10000"/>
+          </a:bodyPr>
+          <a:lstStyle/>
+          <a:p>
+            <a:r>
+              <a:rPr lang="en-US" dirty="0">
+                <a:latin typeface="Frank Ruhl Hofshi" panose="00000500000000000000" pitchFamily="50" charset="-79"/>
+                <a:cs typeface="Frank Ruhl Hofshi" panose="00000500000000000000" pitchFamily="50" charset="-79"/>
+              </a:rPr>
+              <a:t>Works on Image Recognition and CNN</a:t>
+            </a:r>
+          </a:p>
+          <a:p>
+            <a:pPr lvl="1"/>
+            <a:r>
+              <a:rPr lang="en-US" sz="1800" dirty="0">
+                <a:effectLst/>
+                <a:latin typeface="Frank Ruhl Hofshi" panose="00000500000000000000" pitchFamily="50" charset="-79"/>
+                <a:ea typeface="Times New Roman" panose="02020603050405020304" pitchFamily="18" charset="0"/>
+                <a:cs typeface="Frank Ruhl Hofshi" panose="00000500000000000000" pitchFamily="50" charset="-79"/>
+              </a:rPr>
+              <a:t>ImageNet classification with deep Convolutional Neural Networks</a:t>
+            </a:r>
+            <a:endParaRPr lang="en-IN" sz="1800" dirty="0">
+              <a:effectLst/>
+              <a:latin typeface="Frank Ruhl Hofshi" panose="00000500000000000000" pitchFamily="50" charset="-79"/>
+              <a:ea typeface="Times New Roman" panose="02020603050405020304" pitchFamily="18" charset="0"/>
+              <a:cs typeface="Frank Ruhl Hofshi" panose="00000500000000000000" pitchFamily="50" charset="-79"/>
+            </a:endParaRPr>
+          </a:p>
+          <a:p>
+            <a:pPr lvl="1"/>
+            <a:r>
+              <a:rPr lang="en-IN" sz="1800" dirty="0">
+                <a:effectLst/>
+                <a:latin typeface="Frank Ruhl Hofshi" panose="00000500000000000000" pitchFamily="50" charset="-79"/>
+                <a:ea typeface="Times New Roman" panose="02020603050405020304" pitchFamily="18" charset="0"/>
+                <a:cs typeface="Frank Ruhl Hofshi" panose="00000500000000000000" pitchFamily="50" charset="-79"/>
+              </a:rPr>
+              <a:t>Very Deep Convolutional Networks for Large-Scale Image Recognition</a:t>
+            </a:r>
+            <a:endParaRPr lang="en-US" dirty="0">
+              <a:latin typeface="Frank Ruhl Hofshi" panose="00000500000000000000" pitchFamily="50" charset="-79"/>
+              <a:cs typeface="Frank Ruhl Hofshi" panose="00000500000000000000" pitchFamily="50" charset="-79"/>
+            </a:endParaRPr>
+          </a:p>
+          <a:p>
+            <a:r>
+              <a:rPr lang="en-US" dirty="0">
+                <a:latin typeface="Frank Ruhl Hofshi" panose="00000500000000000000" pitchFamily="50" charset="-79"/>
+                <a:cs typeface="Frank Ruhl Hofshi" panose="00000500000000000000" pitchFamily="50" charset="-79"/>
+              </a:rPr>
+              <a:t>Works on Character Recognition</a:t>
+            </a:r>
+          </a:p>
+          <a:p>
+            <a:pPr lvl="1"/>
+            <a:r>
+              <a:rPr lang="en-US" sz="1800" dirty="0">
+                <a:effectLst/>
+                <a:latin typeface="Frank Ruhl Hofshi" panose="00000500000000000000" pitchFamily="50" charset="-79"/>
+                <a:ea typeface="Times New Roman" panose="02020603050405020304" pitchFamily="18" charset="0"/>
+                <a:cs typeface="Frank Ruhl Hofshi" panose="00000500000000000000" pitchFamily="50" charset="-79"/>
+              </a:rPr>
+              <a:t>Automatic Visual Features for Writer Identification: A Deep Learning Approach</a:t>
+            </a:r>
+          </a:p>
+          <a:p>
+            <a:pPr lvl="1"/>
+            <a:r>
+              <a:rPr lang="en-US" sz="1800" dirty="0">
+                <a:effectLst/>
+                <a:latin typeface="Frank Ruhl Hofshi" panose="00000500000000000000" pitchFamily="50" charset="-79"/>
+                <a:ea typeface="Times New Roman" panose="02020603050405020304" pitchFamily="18" charset="0"/>
+                <a:cs typeface="Frank Ruhl Hofshi" panose="00000500000000000000" pitchFamily="50" charset="-79"/>
+              </a:rPr>
+              <a:t>Handwritten Character Recognition of South Indian Scripts: A Review</a:t>
+            </a:r>
+            <a:endParaRPr lang="en-US" sz="1800" dirty="0">
+              <a:latin typeface="Frank Ruhl Hofshi" panose="00000500000000000000" pitchFamily="50" charset="-79"/>
+              <a:ea typeface="Times New Roman" panose="02020603050405020304" pitchFamily="18" charset="0"/>
+              <a:cs typeface="Frank Ruhl Hofshi" panose="00000500000000000000" pitchFamily="50" charset="-79"/>
+            </a:endParaRPr>
+          </a:p>
+          <a:p>
+            <a:pPr lvl="1"/>
+            <a:r>
+              <a:rPr lang="en-US" sz="1800" dirty="0">
+                <a:effectLst/>
+                <a:latin typeface="Frank Ruhl Hofshi" panose="00000500000000000000" pitchFamily="50" charset="-79"/>
+                <a:ea typeface="Times New Roman" panose="02020603050405020304" pitchFamily="18" charset="0"/>
+                <a:cs typeface="Frank Ruhl Hofshi" panose="00000500000000000000" pitchFamily="50" charset="-79"/>
+              </a:rPr>
+              <a:t>A High Performance Domain Specific </a:t>
+            </a:r>
+            <a:r>
+              <a:rPr lang="en-US" sz="1800" dirty="0" err="1">
+                <a:effectLst/>
+                <a:latin typeface="Frank Ruhl Hofshi" panose="00000500000000000000" pitchFamily="50" charset="-79"/>
+                <a:ea typeface="Times New Roman" panose="02020603050405020304" pitchFamily="18" charset="0"/>
+                <a:cs typeface="Frank Ruhl Hofshi" panose="00000500000000000000" pitchFamily="50" charset="-79"/>
+              </a:rPr>
+              <a:t>Ocr</a:t>
+            </a:r>
+            <a:r>
+              <a:rPr lang="en-US" sz="1800" dirty="0">
+                <a:effectLst/>
+                <a:latin typeface="Frank Ruhl Hofshi" panose="00000500000000000000" pitchFamily="50" charset="-79"/>
+                <a:ea typeface="Times New Roman" panose="02020603050405020304" pitchFamily="18" charset="0"/>
+                <a:cs typeface="Frank Ruhl Hofshi" panose="00000500000000000000" pitchFamily="50" charset="-79"/>
+              </a:rPr>
+              <a:t> For Bangla Script</a:t>
+            </a:r>
+          </a:p>
+          <a:p>
+            <a:pPr lvl="1"/>
+            <a:r>
+              <a:rPr lang="en-US" sz="1800" dirty="0">
+                <a:effectLst/>
+                <a:latin typeface="Frank Ruhl Hofshi" panose="00000500000000000000" pitchFamily="50" charset="-79"/>
+                <a:ea typeface="Times New Roman" panose="02020603050405020304" pitchFamily="18" charset="0"/>
+                <a:cs typeface="Frank Ruhl Hofshi" panose="00000500000000000000" pitchFamily="50" charset="-79"/>
+              </a:rPr>
+              <a:t>Bangla character recognition based on </a:t>
+            </a:r>
+            <a:r>
+              <a:rPr lang="en-US" sz="1800" dirty="0" err="1">
+                <a:effectLst/>
+                <a:latin typeface="Frank Ruhl Hofshi" panose="00000500000000000000" pitchFamily="50" charset="-79"/>
+                <a:ea typeface="Times New Roman" panose="02020603050405020304" pitchFamily="18" charset="0"/>
+                <a:cs typeface="Frank Ruhl Hofshi" panose="00000500000000000000" pitchFamily="50" charset="-79"/>
+              </a:rPr>
+              <a:t>Mobilenet</a:t>
+            </a:r>
+            <a:r>
+              <a:rPr lang="en-US" sz="1800" dirty="0">
+                <a:effectLst/>
+                <a:latin typeface="Frank Ruhl Hofshi" panose="00000500000000000000" pitchFamily="50" charset="-79"/>
+                <a:ea typeface="Times New Roman" panose="02020603050405020304" pitchFamily="18" charset="0"/>
+                <a:cs typeface="Frank Ruhl Hofshi" panose="00000500000000000000" pitchFamily="50" charset="-79"/>
+              </a:rPr>
+              <a:t> v1 and Inception v3</a:t>
+            </a:r>
+            <a:endParaRPr lang="en-US" sz="1800" dirty="0">
+              <a:latin typeface="Frank Ruhl Hofshi" panose="00000500000000000000" pitchFamily="50" charset="-79"/>
+              <a:ea typeface="Times New Roman" panose="02020603050405020304" pitchFamily="18" charset="0"/>
+              <a:cs typeface="Frank Ruhl Hofshi" panose="00000500000000000000" pitchFamily="50" charset="-79"/>
+            </a:endParaRPr>
+          </a:p>
+          <a:p>
+            <a:pPr lvl="1"/>
+            <a:r>
+              <a:rPr lang="en-US" sz="1800" dirty="0">
+                <a:effectLst/>
+                <a:latin typeface="Frank Ruhl Hofshi" panose="00000500000000000000" pitchFamily="50" charset="-79"/>
+                <a:ea typeface="Times New Roman" panose="02020603050405020304" pitchFamily="18" charset="0"/>
+                <a:cs typeface="Frank Ruhl Hofshi" panose="00000500000000000000" pitchFamily="50" charset="-79"/>
+              </a:rPr>
+              <a:t>CNN implementation based on Bangla numeral character recognition</a:t>
+            </a:r>
+            <a:endParaRPr lang="en-US" dirty="0">
+              <a:latin typeface="Frank Ruhl Hofshi" panose="00000500000000000000" pitchFamily="50" charset="-79"/>
+              <a:cs typeface="Frank Ruhl Hofshi" panose="00000500000000000000" pitchFamily="50" charset="-79"/>
+            </a:endParaRPr>
+          </a:p>
+          <a:p>
+            <a:r>
+              <a:rPr lang="en-US" dirty="0">
+                <a:latin typeface="Frank Ruhl Hofshi" panose="00000500000000000000" pitchFamily="50" charset="-79"/>
+                <a:cs typeface="Frank Ruhl Hofshi" panose="00000500000000000000" pitchFamily="50" charset="-79"/>
+              </a:rPr>
+              <a:t>Works on Writer Recognition</a:t>
+            </a:r>
+          </a:p>
+          <a:p>
+            <a:pPr lvl="1"/>
+            <a:r>
+              <a:rPr lang="en-US" sz="1800" dirty="0">
+                <a:effectLst/>
+                <a:latin typeface="Frank Ruhl Hofshi" panose="00000500000000000000" pitchFamily="50" charset="-79"/>
+                <a:ea typeface="Times New Roman" panose="02020603050405020304" pitchFamily="18" charset="0"/>
+                <a:cs typeface="Frank Ruhl Hofshi" panose="00000500000000000000" pitchFamily="50" charset="-79"/>
+              </a:rPr>
+              <a:t>Offline writer identification using convolutional neural network activation features</a:t>
+            </a:r>
+          </a:p>
+          <a:p>
+            <a:pPr lvl="1"/>
+            <a:r>
+              <a:rPr lang="en-US" sz="1800" dirty="0">
+                <a:effectLst/>
+                <a:latin typeface="Frank Ruhl Hofshi" panose="00000500000000000000" pitchFamily="50" charset="-79"/>
+                <a:ea typeface="Times New Roman" panose="02020603050405020304" pitchFamily="18" charset="0"/>
+                <a:cs typeface="Frank Ruhl Hofshi" panose="00000500000000000000" pitchFamily="50" charset="-79"/>
+              </a:rPr>
+              <a:t>Writer identification using an HMM-based handwriting recognition system: To normalize the input or not</a:t>
+            </a:r>
+          </a:p>
+          <a:p>
+            <a:pPr lvl="1"/>
+            <a:r>
+              <a:rPr lang="en-US" sz="1800" dirty="0">
+                <a:effectLst/>
+                <a:latin typeface="Frank Ruhl Hofshi" panose="00000500000000000000" pitchFamily="50" charset="-79"/>
+                <a:ea typeface="Times New Roman" panose="02020603050405020304" pitchFamily="18" charset="0"/>
+                <a:cs typeface="Frank Ruhl Hofshi" panose="00000500000000000000" pitchFamily="50" charset="-79"/>
+              </a:rPr>
+              <a:t>Offline Text-Independent Writer Identification Based on Scale Invariant Feature Transform</a:t>
+            </a:r>
+            <a:endParaRPr lang="en-IN" dirty="0">
+              <a:latin typeface="Frank Ruhl Hofshi" panose="00000500000000000000" pitchFamily="50" charset="-79"/>
+              <a:cs typeface="Frank Ruhl Hofshi" panose="00000500000000000000" pitchFamily="50" charset="-79"/>
+            </a:endParaRPr>
           </a:p>
         </p:txBody>
       </p:sp>
     </p:spTree>
     <p:extLst>
       <p:ext uri="{BB962C8B-B14F-4D97-AF65-F5344CB8AC3E}">
-        <p14:creationId xmlns:p14="http://schemas.microsoft.com/office/powerpoint/2010/main" val="353132920"/>
+        <p14:creationId xmlns:p14="http://schemas.microsoft.com/office/powerpoint/2010/main" val="98565076"/>
       </p:ext>
     </p:extLst>
   </p:cSld>
@@ -4356,7 +6289,7 @@
           <p:cNvPr id="2" name="Title 1">
             <a:extLst>
               <a:ext uri="{FF2B5EF4-FFF2-40B4-BE49-F238E27FC236}">
-                <a16:creationId xmlns:a16="http://schemas.microsoft.com/office/drawing/2014/main" id="{C5B74EA3-70A7-4D58-A313-F6A23AE5AE60}"/>
+                <a16:creationId xmlns:a16="http://schemas.microsoft.com/office/drawing/2014/main" id="{D2B92511-C113-4CD4-A7C5-CE0DDE291C15}"/>
               </a:ext>
             </a:extLst>
           </p:cNvPr>
@@ -4374,7 +6307,7 @@
           <a:p>
             <a:r>
               <a:rPr lang="en-US" dirty="0"/>
-              <a:t>What comes next</a:t>
+              <a:t>Summary of Present Work</a:t>
             </a:r>
             <a:endParaRPr lang="en-IN" dirty="0"/>
           </a:p>
@@ -4385,7 +6318,7 @@
           <p:cNvPr id="3" name="Content Placeholder 2">
             <a:extLst>
               <a:ext uri="{FF2B5EF4-FFF2-40B4-BE49-F238E27FC236}">
-                <a16:creationId xmlns:a16="http://schemas.microsoft.com/office/drawing/2014/main" id="{409F4B5A-1492-49E3-B2C9-138CE0C0895E}"/>
+                <a16:creationId xmlns:a16="http://schemas.microsoft.com/office/drawing/2014/main" id="{473B03CB-A011-4FAD-974F-93AB0C7BF162}"/>
               </a:ext>
             </a:extLst>
           </p:cNvPr>
@@ -4408,7 +6341,7 @@
     </p:spTree>
     <p:extLst>
       <p:ext uri="{BB962C8B-B14F-4D97-AF65-F5344CB8AC3E}">
-        <p14:creationId xmlns:p14="http://schemas.microsoft.com/office/powerpoint/2010/main" val="1737215722"/>
+        <p14:creationId xmlns:p14="http://schemas.microsoft.com/office/powerpoint/2010/main" val="4232411944"/>
       </p:ext>
     </p:extLst>
   </p:cSld>

</xml_diff>

<commit_message>
Completed report and presentation
</commit_message>
<xml_diff>
--- a/Documentation/4th Year Project Presentation.pptx
+++ b/Documentation/4th Year Project Presentation.pptx
@@ -5,7 +5,7 @@
     <p:sldMasterId id="2147483731" r:id="rId1"/>
   </p:sldMasterIdLst>
   <p:notesMasterIdLst>
-    <p:notesMasterId r:id="rId18"/>
+    <p:notesMasterId r:id="rId21"/>
   </p:notesMasterIdLst>
   <p:sldIdLst>
     <p:sldId id="256" r:id="rId2"/>
@@ -15,15 +15,18 @@
     <p:sldId id="266" r:id="rId6"/>
     <p:sldId id="258" r:id="rId7"/>
     <p:sldId id="259" r:id="rId8"/>
-    <p:sldId id="261" r:id="rId9"/>
-    <p:sldId id="267" r:id="rId10"/>
-    <p:sldId id="262" r:id="rId11"/>
-    <p:sldId id="268" r:id="rId12"/>
-    <p:sldId id="278" r:id="rId13"/>
-    <p:sldId id="279" r:id="rId14"/>
-    <p:sldId id="270" r:id="rId15"/>
-    <p:sldId id="280" r:id="rId16"/>
-    <p:sldId id="263" r:id="rId17"/>
+    <p:sldId id="281" r:id="rId9"/>
+    <p:sldId id="282" r:id="rId10"/>
+    <p:sldId id="283" r:id="rId11"/>
+    <p:sldId id="261" r:id="rId12"/>
+    <p:sldId id="267" r:id="rId13"/>
+    <p:sldId id="262" r:id="rId14"/>
+    <p:sldId id="268" r:id="rId15"/>
+    <p:sldId id="278" r:id="rId16"/>
+    <p:sldId id="279" r:id="rId17"/>
+    <p:sldId id="270" r:id="rId18"/>
+    <p:sldId id="280" r:id="rId19"/>
+    <p:sldId id="263" r:id="rId20"/>
   </p:sldIdLst>
   <p:sldSz cx="12192000" cy="6858000"/>
   <p:notesSz cx="6858000" cy="9144000"/>
@@ -8133,7 +8136,7 @@
           <a:p>
             <a:fld id="{E0460530-21AB-4667-8DDF-0CFD1A19A456}" type="slidenum">
               <a:rPr lang="en-IN" smtClean="0"/>
-              <a:t>8</a:t>
+              <a:t>11</a:t>
             </a:fld>
             <a:endParaRPr lang="en-IN"/>
           </a:p>
@@ -8314,7 +8317,7 @@
           <a:p>
             <a:fld id="{E0460530-21AB-4667-8DDF-0CFD1A19A456}" type="slidenum">
               <a:rPr lang="en-IN" smtClean="0"/>
-              <a:t>9</a:t>
+              <a:t>12</a:t>
             </a:fld>
             <a:endParaRPr lang="en-IN"/>
           </a:p>
@@ -8566,7 +8569,7 @@
           <a:p>
             <a:fld id="{E0460530-21AB-4667-8DDF-0CFD1A19A456}" type="slidenum">
               <a:rPr lang="en-IN" smtClean="0"/>
-              <a:t>10</a:t>
+              <a:t>13</a:t>
             </a:fld>
             <a:endParaRPr lang="en-IN"/>
           </a:p>
@@ -8829,7 +8832,7 @@
           <a:p>
             <a:fld id="{E0460530-21AB-4667-8DDF-0CFD1A19A456}" type="slidenum">
               <a:rPr lang="en-IN" smtClean="0"/>
-              <a:t>11</a:t>
+              <a:t>14</a:t>
             </a:fld>
             <a:endParaRPr lang="en-IN"/>
           </a:p>
@@ -8839,6 +8842,90 @@
     <p:extLst>
       <p:ext uri="{BB962C8B-B14F-4D97-AF65-F5344CB8AC3E}">
         <p14:creationId xmlns:p14="http://schemas.microsoft.com/office/powerpoint/2010/main" val="654931584"/>
+      </p:ext>
+    </p:extLst>
+  </p:cSld>
+  <p:clrMapOvr>
+    <a:masterClrMapping/>
+  </p:clrMapOvr>
+</p:notes>
+</file>
+
+<file path=ppt/notesSlides/notesSlide5.xml><?xml version="1.0" encoding="utf-8"?>
+<p:notes xmlns:a="http://schemas.openxmlformats.org/drawingml/2006/main" xmlns:r="http://schemas.openxmlformats.org/officeDocument/2006/relationships" xmlns:p="http://schemas.openxmlformats.org/presentationml/2006/main">
+  <p:cSld>
+    <p:spTree>
+      <p:nvGrpSpPr>
+        <p:cNvPr id="1" name=""/>
+        <p:cNvGrpSpPr/>
+        <p:nvPr/>
+      </p:nvGrpSpPr>
+      <p:grpSpPr>
+        <a:xfrm>
+          <a:off x="0" y="0"/>
+          <a:ext cx="0" cy="0"/>
+          <a:chOff x="0" y="0"/>
+          <a:chExt cx="0" cy="0"/>
+        </a:xfrm>
+      </p:grpSpPr>
+      <p:sp>
+        <p:nvSpPr>
+          <p:cNvPr id="2" name="Slide Image Placeholder 1"/>
+          <p:cNvSpPr>
+            <a:spLocks noGrp="1" noRot="1" noChangeAspect="1"/>
+          </p:cNvSpPr>
+          <p:nvPr>
+            <p:ph type="sldImg"/>
+          </p:nvPr>
+        </p:nvSpPr>
+        <p:spPr/>
+      </p:sp>
+      <p:sp>
+        <p:nvSpPr>
+          <p:cNvPr id="3" name="Notes Placeholder 2"/>
+          <p:cNvSpPr>
+            <a:spLocks noGrp="1"/>
+          </p:cNvSpPr>
+          <p:nvPr>
+            <p:ph type="body" idx="1"/>
+          </p:nvPr>
+        </p:nvSpPr>
+        <p:spPr/>
+        <p:txBody>
+          <a:bodyPr/>
+          <a:lstStyle/>
+          <a:p>
+            <a:endParaRPr lang="en-IN" dirty="0"/>
+          </a:p>
+        </p:txBody>
+      </p:sp>
+      <p:sp>
+        <p:nvSpPr>
+          <p:cNvPr id="4" name="Slide Number Placeholder 3"/>
+          <p:cNvSpPr>
+            <a:spLocks noGrp="1"/>
+          </p:cNvSpPr>
+          <p:nvPr>
+            <p:ph type="sldNum" sz="quarter" idx="5"/>
+          </p:nvPr>
+        </p:nvSpPr>
+        <p:spPr/>
+        <p:txBody>
+          <a:bodyPr/>
+          <a:lstStyle/>
+          <a:p>
+            <a:fld id="{E0460530-21AB-4667-8DDF-0CFD1A19A456}" type="slidenum">
+              <a:rPr lang="en-IN" smtClean="0"/>
+              <a:t>19</a:t>
+            </a:fld>
+            <a:endParaRPr lang="en-IN"/>
+          </a:p>
+        </p:txBody>
+      </p:sp>
+    </p:spTree>
+    <p:extLst>
+      <p:ext uri="{BB962C8B-B14F-4D97-AF65-F5344CB8AC3E}">
+        <p14:creationId xmlns:p14="http://schemas.microsoft.com/office/powerpoint/2010/main" val="63072498"/>
       </p:ext>
     </p:extLst>
   </p:cSld>
@@ -8979,7 +9066,7 @@
           <a:p>
             <a:fld id="{21D9AB09-D600-4578-8243-21B8A8CCB975}" type="datetimeFigureOut">
               <a:rPr lang="en-IN" smtClean="0"/>
-              <a:t>27-03-2021</a:t>
+              <a:t>28-03-2021</a:t>
             </a:fld>
             <a:endParaRPr lang="en-IN"/>
           </a:p>
@@ -9149,7 +9236,7 @@
           <a:p>
             <a:fld id="{21D9AB09-D600-4578-8243-21B8A8CCB975}" type="datetimeFigureOut">
               <a:rPr lang="en-IN" smtClean="0"/>
-              <a:t>27-03-2021</a:t>
+              <a:t>28-03-2021</a:t>
             </a:fld>
             <a:endParaRPr lang="en-IN"/>
           </a:p>
@@ -9329,7 +9416,7 @@
           <a:p>
             <a:fld id="{21D9AB09-D600-4578-8243-21B8A8CCB975}" type="datetimeFigureOut">
               <a:rPr lang="en-IN" smtClean="0"/>
-              <a:t>27-03-2021</a:t>
+              <a:t>28-03-2021</a:t>
             </a:fld>
             <a:endParaRPr lang="en-IN"/>
           </a:p>
@@ -9499,7 +9586,7 @@
           <a:p>
             <a:fld id="{21D9AB09-D600-4578-8243-21B8A8CCB975}" type="datetimeFigureOut">
               <a:rPr lang="en-IN" smtClean="0"/>
-              <a:t>27-03-2021</a:t>
+              <a:t>28-03-2021</a:t>
             </a:fld>
             <a:endParaRPr lang="en-IN"/>
           </a:p>
@@ -9745,7 +9832,7 @@
           <a:p>
             <a:fld id="{21D9AB09-D600-4578-8243-21B8A8CCB975}" type="datetimeFigureOut">
               <a:rPr lang="en-IN" smtClean="0"/>
-              <a:t>27-03-2021</a:t>
+              <a:t>28-03-2021</a:t>
             </a:fld>
             <a:endParaRPr lang="en-IN"/>
           </a:p>
@@ -9977,7 +10064,7 @@
           <a:p>
             <a:fld id="{21D9AB09-D600-4578-8243-21B8A8CCB975}" type="datetimeFigureOut">
               <a:rPr lang="en-IN" smtClean="0"/>
-              <a:t>27-03-2021</a:t>
+              <a:t>28-03-2021</a:t>
             </a:fld>
             <a:endParaRPr lang="en-IN"/>
           </a:p>
@@ -10344,7 +10431,7 @@
           <a:p>
             <a:fld id="{21D9AB09-D600-4578-8243-21B8A8CCB975}" type="datetimeFigureOut">
               <a:rPr lang="en-IN" smtClean="0"/>
-              <a:t>27-03-2021</a:t>
+              <a:t>28-03-2021</a:t>
             </a:fld>
             <a:endParaRPr lang="en-IN"/>
           </a:p>
@@ -10462,7 +10549,7 @@
           <a:p>
             <a:fld id="{21D9AB09-D600-4578-8243-21B8A8CCB975}" type="datetimeFigureOut">
               <a:rPr lang="en-IN" smtClean="0"/>
-              <a:t>27-03-2021</a:t>
+              <a:t>28-03-2021</a:t>
             </a:fld>
             <a:endParaRPr lang="en-IN"/>
           </a:p>
@@ -10557,7 +10644,7 @@
           <a:p>
             <a:fld id="{21D9AB09-D600-4578-8243-21B8A8CCB975}" type="datetimeFigureOut">
               <a:rPr lang="en-IN" smtClean="0"/>
-              <a:t>27-03-2021</a:t>
+              <a:t>28-03-2021</a:t>
             </a:fld>
             <a:endParaRPr lang="en-IN"/>
           </a:p>
@@ -10834,7 +10921,7 @@
           <a:p>
             <a:fld id="{21D9AB09-D600-4578-8243-21B8A8CCB975}" type="datetimeFigureOut">
               <a:rPr lang="en-IN" smtClean="0"/>
-              <a:t>27-03-2021</a:t>
+              <a:t>28-03-2021</a:t>
             </a:fld>
             <a:endParaRPr lang="en-IN"/>
           </a:p>
@@ -11091,7 +11178,7 @@
           <a:p>
             <a:fld id="{21D9AB09-D600-4578-8243-21B8A8CCB975}" type="datetimeFigureOut">
               <a:rPr lang="en-IN" smtClean="0"/>
-              <a:t>27-03-2021</a:t>
+              <a:t>28-03-2021</a:t>
             </a:fld>
             <a:endParaRPr lang="en-IN"/>
           </a:p>
@@ -11332,7 +11419,7 @@
           <a:p>
             <a:fld id="{21D9AB09-D600-4578-8243-21B8A8CCB975}" type="datetimeFigureOut">
               <a:rPr lang="en-IN" smtClean="0"/>
-              <a:t>27-03-2021</a:t>
+              <a:t>28-03-2021</a:t>
             </a:fld>
             <a:endParaRPr lang="en-IN"/>
           </a:p>
@@ -12199,6 +12286,1391 @@
 </file>
 
 <file path=ppt/slides/slide10.xml><?xml version="1.0" encoding="utf-8"?>
+<p:sld xmlns:a="http://schemas.openxmlformats.org/drawingml/2006/main" xmlns:r="http://schemas.openxmlformats.org/officeDocument/2006/relationships" xmlns:p="http://schemas.openxmlformats.org/presentationml/2006/main">
+  <p:cSld>
+    <p:spTree>
+      <p:nvGrpSpPr>
+        <p:cNvPr id="1" name=""/>
+        <p:cNvGrpSpPr/>
+        <p:nvPr/>
+      </p:nvGrpSpPr>
+      <p:grpSpPr>
+        <a:xfrm>
+          <a:off x="0" y="0"/>
+          <a:ext cx="0" cy="0"/>
+          <a:chOff x="0" y="0"/>
+          <a:chExt cx="0" cy="0"/>
+        </a:xfrm>
+      </p:grpSpPr>
+      <p:sp>
+        <p:nvSpPr>
+          <p:cNvPr id="2" name="Title 1">
+            <a:extLst>
+              <a:ext uri="{FF2B5EF4-FFF2-40B4-BE49-F238E27FC236}">
+                <a16:creationId xmlns:a16="http://schemas.microsoft.com/office/drawing/2014/main" id="{FF947F9E-45E4-42E9-A1B4-4FDAE2D811F4}"/>
+              </a:ext>
+            </a:extLst>
+          </p:cNvPr>
+          <p:cNvSpPr>
+            <a:spLocks noGrp="1"/>
+          </p:cNvSpPr>
+          <p:nvPr>
+            <p:ph type="title"/>
+          </p:nvPr>
+        </p:nvSpPr>
+        <p:spPr/>
+        <p:txBody>
+          <a:bodyPr/>
+          <a:lstStyle/>
+          <a:p>
+            <a:r>
+              <a:rPr lang="en-US" dirty="0">
+                <a:latin typeface="Garamond" panose="02020404030301010803" pitchFamily="18" charset="0"/>
+              </a:rPr>
+              <a:t>Our Contribution to Present Work</a:t>
+            </a:r>
+            <a:endParaRPr lang="en-IN" dirty="0"/>
+          </a:p>
+        </p:txBody>
+      </p:sp>
+      <p:sp>
+        <p:nvSpPr>
+          <p:cNvPr id="3" name="Content Placeholder 2">
+            <a:extLst>
+              <a:ext uri="{FF2B5EF4-FFF2-40B4-BE49-F238E27FC236}">
+                <a16:creationId xmlns:a16="http://schemas.microsoft.com/office/drawing/2014/main" id="{3EA79CA9-68AB-4609-AE0D-6BC3D39E5268}"/>
+              </a:ext>
+            </a:extLst>
+          </p:cNvPr>
+          <p:cNvSpPr>
+            <a:spLocks noGrp="1"/>
+          </p:cNvSpPr>
+          <p:nvPr>
+            <p:ph idx="1"/>
+          </p:nvPr>
+        </p:nvSpPr>
+        <p:spPr/>
+        <p:txBody>
+          <a:bodyPr/>
+          <a:lstStyle/>
+          <a:p>
+            <a:r>
+              <a:rPr lang="en-US" dirty="0">
+                <a:latin typeface="Frank Ruhl Hofshi" panose="00000500000000000000" pitchFamily="50" charset="-79"/>
+                <a:cs typeface="Frank Ruhl Hofshi" panose="00000500000000000000" pitchFamily="50" charset="-79"/>
+              </a:rPr>
+              <a:t>Writer verification</a:t>
+            </a:r>
+          </a:p>
+          <a:p>
+            <a:r>
+              <a:rPr lang="en-US" dirty="0">
+                <a:latin typeface="Frank Ruhl Hofshi" panose="00000500000000000000" pitchFamily="50" charset="-79"/>
+                <a:cs typeface="Frank Ruhl Hofshi" panose="00000500000000000000" pitchFamily="50" charset="-79"/>
+              </a:rPr>
+              <a:t>Percentage of Similarities with the author</a:t>
+            </a:r>
+          </a:p>
+          <a:p>
+            <a:r>
+              <a:rPr lang="en-IN" dirty="0">
+                <a:latin typeface="Frank Ruhl Hofshi" panose="00000500000000000000" pitchFamily="50" charset="-79"/>
+                <a:cs typeface="Frank Ruhl Hofshi" panose="00000500000000000000" pitchFamily="50" charset="-79"/>
+              </a:rPr>
+              <a:t>Unique Dataset with 121 volunteers</a:t>
+            </a:r>
+          </a:p>
+          <a:p>
+            <a:endParaRPr lang="en-IN" dirty="0"/>
+          </a:p>
+        </p:txBody>
+      </p:sp>
+    </p:spTree>
+    <p:extLst>
+      <p:ext uri="{BB962C8B-B14F-4D97-AF65-F5344CB8AC3E}">
+        <p14:creationId xmlns:p14="http://schemas.microsoft.com/office/powerpoint/2010/main" val="346754489"/>
+      </p:ext>
+    </p:extLst>
+  </p:cSld>
+  <p:clrMapOvr>
+    <a:masterClrMapping/>
+  </p:clrMapOvr>
+  <p:timing>
+    <p:tnLst>
+      <p:par>
+        <p:cTn id="1" dur="indefinite" restart="never" nodeType="tmRoot">
+          <p:childTnLst>
+            <p:seq concurrent="1" nextAc="seek">
+              <p:cTn id="2" dur="indefinite" nodeType="mainSeq">
+                <p:childTnLst>
+                  <p:par>
+                    <p:cTn id="3" fill="hold">
+                      <p:stCondLst>
+                        <p:cond delay="indefinite"/>
+                      </p:stCondLst>
+                      <p:childTnLst>
+                        <p:par>
+                          <p:cTn id="4" fill="hold">
+                            <p:stCondLst>
+                              <p:cond delay="0"/>
+                            </p:stCondLst>
+                            <p:childTnLst>
+                              <p:par>
+                                <p:cTn id="5" presetID="1" presetClass="entr" presetSubtype="0" fill="hold" nodeType="clickEffect">
+                                  <p:stCondLst>
+                                    <p:cond delay="0"/>
+                                  </p:stCondLst>
+                                  <p:childTnLst>
+                                    <p:set>
+                                      <p:cBhvr>
+                                        <p:cTn id="6" dur="1" fill="hold">
+                                          <p:stCondLst>
+                                            <p:cond delay="0"/>
+                                          </p:stCondLst>
+                                        </p:cTn>
+                                        <p:tgtEl>
+                                          <p:spTgt spid="3">
+                                            <p:txEl>
+                                              <p:pRg st="0" end="0"/>
+                                            </p:txEl>
+                                          </p:spTgt>
+                                        </p:tgtEl>
+                                        <p:attrNameLst>
+                                          <p:attrName>style.visibility</p:attrName>
+                                        </p:attrNameLst>
+                                      </p:cBhvr>
+                                      <p:to>
+                                        <p:strVal val="visible"/>
+                                      </p:to>
+                                    </p:set>
+                                  </p:childTnLst>
+                                </p:cTn>
+                              </p:par>
+                            </p:childTnLst>
+                          </p:cTn>
+                        </p:par>
+                      </p:childTnLst>
+                    </p:cTn>
+                  </p:par>
+                  <p:par>
+                    <p:cTn id="7" fill="hold">
+                      <p:stCondLst>
+                        <p:cond delay="indefinite"/>
+                      </p:stCondLst>
+                      <p:childTnLst>
+                        <p:par>
+                          <p:cTn id="8" fill="hold">
+                            <p:stCondLst>
+                              <p:cond delay="0"/>
+                            </p:stCondLst>
+                            <p:childTnLst>
+                              <p:par>
+                                <p:cTn id="9" presetID="1" presetClass="entr" presetSubtype="0" fill="hold" nodeType="clickEffect">
+                                  <p:stCondLst>
+                                    <p:cond delay="0"/>
+                                  </p:stCondLst>
+                                  <p:childTnLst>
+                                    <p:set>
+                                      <p:cBhvr>
+                                        <p:cTn id="10" dur="1" fill="hold">
+                                          <p:stCondLst>
+                                            <p:cond delay="0"/>
+                                          </p:stCondLst>
+                                        </p:cTn>
+                                        <p:tgtEl>
+                                          <p:spTgt spid="3">
+                                            <p:txEl>
+                                              <p:pRg st="1" end="1"/>
+                                            </p:txEl>
+                                          </p:spTgt>
+                                        </p:tgtEl>
+                                        <p:attrNameLst>
+                                          <p:attrName>style.visibility</p:attrName>
+                                        </p:attrNameLst>
+                                      </p:cBhvr>
+                                      <p:to>
+                                        <p:strVal val="visible"/>
+                                      </p:to>
+                                    </p:set>
+                                  </p:childTnLst>
+                                </p:cTn>
+                              </p:par>
+                            </p:childTnLst>
+                          </p:cTn>
+                        </p:par>
+                      </p:childTnLst>
+                    </p:cTn>
+                  </p:par>
+                  <p:par>
+                    <p:cTn id="11" fill="hold">
+                      <p:stCondLst>
+                        <p:cond delay="indefinite"/>
+                      </p:stCondLst>
+                      <p:childTnLst>
+                        <p:par>
+                          <p:cTn id="12" fill="hold">
+                            <p:stCondLst>
+                              <p:cond delay="0"/>
+                            </p:stCondLst>
+                            <p:childTnLst>
+                              <p:par>
+                                <p:cTn id="13" presetID="1" presetClass="entr" presetSubtype="0" fill="hold" nodeType="clickEffect">
+                                  <p:stCondLst>
+                                    <p:cond delay="0"/>
+                                  </p:stCondLst>
+                                  <p:childTnLst>
+                                    <p:set>
+                                      <p:cBhvr>
+                                        <p:cTn id="14" dur="1" fill="hold">
+                                          <p:stCondLst>
+                                            <p:cond delay="0"/>
+                                          </p:stCondLst>
+                                        </p:cTn>
+                                        <p:tgtEl>
+                                          <p:spTgt spid="3">
+                                            <p:txEl>
+                                              <p:pRg st="2" end="2"/>
+                                            </p:txEl>
+                                          </p:spTgt>
+                                        </p:tgtEl>
+                                        <p:attrNameLst>
+                                          <p:attrName>style.visibility</p:attrName>
+                                        </p:attrNameLst>
+                                      </p:cBhvr>
+                                      <p:to>
+                                        <p:strVal val="visible"/>
+                                      </p:to>
+                                    </p:set>
+                                  </p:childTnLst>
+                                </p:cTn>
+                              </p:par>
+                            </p:childTnLst>
+                          </p:cTn>
+                        </p:par>
+                      </p:childTnLst>
+                    </p:cTn>
+                  </p:par>
+                </p:childTnLst>
+              </p:cTn>
+              <p:prevCondLst>
+                <p:cond evt="onPrev" delay="0">
+                  <p:tgtEl>
+                    <p:sldTgt/>
+                  </p:tgtEl>
+                </p:cond>
+              </p:prevCondLst>
+              <p:nextCondLst>
+                <p:cond evt="onNext" delay="0">
+                  <p:tgtEl>
+                    <p:sldTgt/>
+                  </p:tgtEl>
+                </p:cond>
+              </p:nextCondLst>
+            </p:seq>
+          </p:childTnLst>
+        </p:cTn>
+      </p:par>
+    </p:tnLst>
+  </p:timing>
+</p:sld>
+</file>
+
+<file path=ppt/slides/slide11.xml><?xml version="1.0" encoding="utf-8"?>
+<p:sld xmlns:a="http://schemas.openxmlformats.org/drawingml/2006/main" xmlns:r="http://schemas.openxmlformats.org/officeDocument/2006/relationships" xmlns:p="http://schemas.openxmlformats.org/presentationml/2006/main">
+  <p:cSld>
+    <p:spTree>
+      <p:nvGrpSpPr>
+        <p:cNvPr id="1" name=""/>
+        <p:cNvGrpSpPr/>
+        <p:nvPr/>
+      </p:nvGrpSpPr>
+      <p:grpSpPr>
+        <a:xfrm>
+          <a:off x="0" y="0"/>
+          <a:ext cx="0" cy="0"/>
+          <a:chOff x="0" y="0"/>
+          <a:chExt cx="0" cy="0"/>
+        </a:xfrm>
+      </p:grpSpPr>
+      <p:sp>
+        <p:nvSpPr>
+          <p:cNvPr id="2" name="Title 1">
+            <a:extLst>
+              <a:ext uri="{FF2B5EF4-FFF2-40B4-BE49-F238E27FC236}">
+                <a16:creationId xmlns:a16="http://schemas.microsoft.com/office/drawing/2014/main" id="{643A320E-D976-47E4-929C-B3785801B479}"/>
+              </a:ext>
+            </a:extLst>
+          </p:cNvPr>
+          <p:cNvSpPr>
+            <a:spLocks noGrp="1"/>
+          </p:cNvSpPr>
+          <p:nvPr>
+            <p:ph type="title"/>
+          </p:nvPr>
+        </p:nvSpPr>
+        <p:spPr/>
+        <p:txBody>
+          <a:bodyPr/>
+          <a:lstStyle/>
+          <a:p>
+            <a:r>
+              <a:rPr lang="en-US" dirty="0">
+                <a:latin typeface="Garamond" panose="02020404030301010803" pitchFamily="18" charset="0"/>
+              </a:rPr>
+              <a:t>Collection of Data Set</a:t>
+            </a:r>
+            <a:endParaRPr lang="en-IN" dirty="0">
+              <a:latin typeface="Garamond" panose="02020404030301010803" pitchFamily="18" charset="0"/>
+            </a:endParaRPr>
+          </a:p>
+        </p:txBody>
+      </p:sp>
+      <p:sp>
+        <p:nvSpPr>
+          <p:cNvPr id="3" name="Content Placeholder 2">
+            <a:extLst>
+              <a:ext uri="{FF2B5EF4-FFF2-40B4-BE49-F238E27FC236}">
+                <a16:creationId xmlns:a16="http://schemas.microsoft.com/office/drawing/2014/main" id="{DDDF508F-4344-4318-A1AF-BCE8A393EBAF}"/>
+              </a:ext>
+            </a:extLst>
+          </p:cNvPr>
+          <p:cNvSpPr>
+            <a:spLocks noGrp="1"/>
+          </p:cNvSpPr>
+          <p:nvPr>
+            <p:ph idx="1"/>
+          </p:nvPr>
+        </p:nvSpPr>
+        <p:spPr/>
+        <p:txBody>
+          <a:bodyPr/>
+          <a:lstStyle/>
+          <a:p>
+            <a:r>
+              <a:rPr lang="en-US" dirty="0">
+                <a:latin typeface="Frank Ruhl Hofshi" panose="00000500000000000000" pitchFamily="50" charset="-79"/>
+                <a:cs typeface="Frank Ruhl Hofshi" panose="00000500000000000000" pitchFamily="50" charset="-79"/>
+              </a:rPr>
+              <a:t>121 volunteers</a:t>
+            </a:r>
+          </a:p>
+          <a:p>
+            <a:r>
+              <a:rPr lang="en-US" dirty="0">
+                <a:latin typeface="Frank Ruhl Hofshi" panose="00000500000000000000" pitchFamily="50" charset="-79"/>
+                <a:cs typeface="Frank Ruhl Hofshi" panose="00000500000000000000" pitchFamily="50" charset="-79"/>
+              </a:rPr>
+              <a:t>3 Language: English, Hindi, Bangla</a:t>
+            </a:r>
+          </a:p>
+          <a:p>
+            <a:r>
+              <a:rPr lang="en-US" dirty="0">
+                <a:latin typeface="Frank Ruhl Hofshi" panose="00000500000000000000" pitchFamily="50" charset="-79"/>
+                <a:cs typeface="Frank Ruhl Hofshi" panose="00000500000000000000" pitchFamily="50" charset="-79"/>
+              </a:rPr>
+              <a:t>Handwritten Passage</a:t>
+            </a:r>
+          </a:p>
+          <a:p>
+            <a:r>
+              <a:rPr lang="en-US" dirty="0">
+                <a:latin typeface="Frank Ruhl Hofshi" panose="00000500000000000000" pitchFamily="50" charset="-79"/>
+                <a:cs typeface="Frank Ruhl Hofshi" panose="00000500000000000000" pitchFamily="50" charset="-79"/>
+              </a:rPr>
+              <a:t>Passages scanned into images</a:t>
+            </a:r>
+          </a:p>
+          <a:p>
+            <a:r>
+              <a:rPr lang="en-US" dirty="0">
+                <a:latin typeface="Frank Ruhl Hofshi" panose="00000500000000000000" pitchFamily="50" charset="-79"/>
+                <a:cs typeface="Frank Ruhl Hofshi" panose="00000500000000000000" pitchFamily="50" charset="-79"/>
+              </a:rPr>
+              <a:t>Bangla Text only in our project</a:t>
+            </a:r>
+          </a:p>
+          <a:p>
+            <a:endParaRPr lang="en-US" dirty="0"/>
+          </a:p>
+        </p:txBody>
+      </p:sp>
+    </p:spTree>
+    <p:extLst>
+      <p:ext uri="{BB962C8B-B14F-4D97-AF65-F5344CB8AC3E}">
+        <p14:creationId xmlns:p14="http://schemas.microsoft.com/office/powerpoint/2010/main" val="1124173596"/>
+      </p:ext>
+    </p:extLst>
+  </p:cSld>
+  <p:clrMapOvr>
+    <a:masterClrMapping/>
+  </p:clrMapOvr>
+  <p:timing>
+    <p:tnLst>
+      <p:par>
+        <p:cTn id="1" dur="indefinite" restart="never" nodeType="tmRoot">
+          <p:childTnLst>
+            <p:seq concurrent="1" nextAc="seek">
+              <p:cTn id="2" dur="indefinite" nodeType="mainSeq">
+                <p:childTnLst>
+                  <p:par>
+                    <p:cTn id="3" fill="hold">
+                      <p:stCondLst>
+                        <p:cond delay="indefinite"/>
+                      </p:stCondLst>
+                      <p:childTnLst>
+                        <p:par>
+                          <p:cTn id="4" fill="hold">
+                            <p:stCondLst>
+                              <p:cond delay="0"/>
+                            </p:stCondLst>
+                            <p:childTnLst>
+                              <p:par>
+                                <p:cTn id="5" presetID="1" presetClass="entr" presetSubtype="0" fill="hold" grpId="0" nodeType="clickEffect">
+                                  <p:stCondLst>
+                                    <p:cond delay="0"/>
+                                  </p:stCondLst>
+                                  <p:childTnLst>
+                                    <p:set>
+                                      <p:cBhvr>
+                                        <p:cTn id="6" dur="1" fill="hold">
+                                          <p:stCondLst>
+                                            <p:cond delay="0"/>
+                                          </p:stCondLst>
+                                        </p:cTn>
+                                        <p:tgtEl>
+                                          <p:spTgt spid="3">
+                                            <p:txEl>
+                                              <p:pRg st="0" end="0"/>
+                                            </p:txEl>
+                                          </p:spTgt>
+                                        </p:tgtEl>
+                                        <p:attrNameLst>
+                                          <p:attrName>style.visibility</p:attrName>
+                                        </p:attrNameLst>
+                                      </p:cBhvr>
+                                      <p:to>
+                                        <p:strVal val="visible"/>
+                                      </p:to>
+                                    </p:set>
+                                  </p:childTnLst>
+                                </p:cTn>
+                              </p:par>
+                            </p:childTnLst>
+                          </p:cTn>
+                        </p:par>
+                      </p:childTnLst>
+                    </p:cTn>
+                  </p:par>
+                  <p:par>
+                    <p:cTn id="7" fill="hold">
+                      <p:stCondLst>
+                        <p:cond delay="indefinite"/>
+                      </p:stCondLst>
+                      <p:childTnLst>
+                        <p:par>
+                          <p:cTn id="8" fill="hold">
+                            <p:stCondLst>
+                              <p:cond delay="0"/>
+                            </p:stCondLst>
+                            <p:childTnLst>
+                              <p:par>
+                                <p:cTn id="9" presetID="1" presetClass="entr" presetSubtype="0" fill="hold" grpId="0" nodeType="clickEffect">
+                                  <p:stCondLst>
+                                    <p:cond delay="0"/>
+                                  </p:stCondLst>
+                                  <p:childTnLst>
+                                    <p:set>
+                                      <p:cBhvr>
+                                        <p:cTn id="10" dur="1" fill="hold">
+                                          <p:stCondLst>
+                                            <p:cond delay="0"/>
+                                          </p:stCondLst>
+                                        </p:cTn>
+                                        <p:tgtEl>
+                                          <p:spTgt spid="3">
+                                            <p:txEl>
+                                              <p:pRg st="1" end="1"/>
+                                            </p:txEl>
+                                          </p:spTgt>
+                                        </p:tgtEl>
+                                        <p:attrNameLst>
+                                          <p:attrName>style.visibility</p:attrName>
+                                        </p:attrNameLst>
+                                      </p:cBhvr>
+                                      <p:to>
+                                        <p:strVal val="visible"/>
+                                      </p:to>
+                                    </p:set>
+                                  </p:childTnLst>
+                                </p:cTn>
+                              </p:par>
+                            </p:childTnLst>
+                          </p:cTn>
+                        </p:par>
+                      </p:childTnLst>
+                    </p:cTn>
+                  </p:par>
+                  <p:par>
+                    <p:cTn id="11" fill="hold">
+                      <p:stCondLst>
+                        <p:cond delay="indefinite"/>
+                      </p:stCondLst>
+                      <p:childTnLst>
+                        <p:par>
+                          <p:cTn id="12" fill="hold">
+                            <p:stCondLst>
+                              <p:cond delay="0"/>
+                            </p:stCondLst>
+                            <p:childTnLst>
+                              <p:par>
+                                <p:cTn id="13" presetID="1" presetClass="entr" presetSubtype="0" fill="hold" grpId="0" nodeType="clickEffect">
+                                  <p:stCondLst>
+                                    <p:cond delay="0"/>
+                                  </p:stCondLst>
+                                  <p:childTnLst>
+                                    <p:set>
+                                      <p:cBhvr>
+                                        <p:cTn id="14" dur="1" fill="hold">
+                                          <p:stCondLst>
+                                            <p:cond delay="0"/>
+                                          </p:stCondLst>
+                                        </p:cTn>
+                                        <p:tgtEl>
+                                          <p:spTgt spid="3">
+                                            <p:txEl>
+                                              <p:pRg st="2" end="2"/>
+                                            </p:txEl>
+                                          </p:spTgt>
+                                        </p:tgtEl>
+                                        <p:attrNameLst>
+                                          <p:attrName>style.visibility</p:attrName>
+                                        </p:attrNameLst>
+                                      </p:cBhvr>
+                                      <p:to>
+                                        <p:strVal val="visible"/>
+                                      </p:to>
+                                    </p:set>
+                                  </p:childTnLst>
+                                </p:cTn>
+                              </p:par>
+                            </p:childTnLst>
+                          </p:cTn>
+                        </p:par>
+                      </p:childTnLst>
+                    </p:cTn>
+                  </p:par>
+                  <p:par>
+                    <p:cTn id="15" fill="hold">
+                      <p:stCondLst>
+                        <p:cond delay="indefinite"/>
+                      </p:stCondLst>
+                      <p:childTnLst>
+                        <p:par>
+                          <p:cTn id="16" fill="hold">
+                            <p:stCondLst>
+                              <p:cond delay="0"/>
+                            </p:stCondLst>
+                            <p:childTnLst>
+                              <p:par>
+                                <p:cTn id="17" presetID="1" presetClass="entr" presetSubtype="0" fill="hold" grpId="0" nodeType="clickEffect">
+                                  <p:stCondLst>
+                                    <p:cond delay="0"/>
+                                  </p:stCondLst>
+                                  <p:childTnLst>
+                                    <p:set>
+                                      <p:cBhvr>
+                                        <p:cTn id="18" dur="1" fill="hold">
+                                          <p:stCondLst>
+                                            <p:cond delay="0"/>
+                                          </p:stCondLst>
+                                        </p:cTn>
+                                        <p:tgtEl>
+                                          <p:spTgt spid="3">
+                                            <p:txEl>
+                                              <p:pRg st="3" end="3"/>
+                                            </p:txEl>
+                                          </p:spTgt>
+                                        </p:tgtEl>
+                                        <p:attrNameLst>
+                                          <p:attrName>style.visibility</p:attrName>
+                                        </p:attrNameLst>
+                                      </p:cBhvr>
+                                      <p:to>
+                                        <p:strVal val="visible"/>
+                                      </p:to>
+                                    </p:set>
+                                  </p:childTnLst>
+                                </p:cTn>
+                              </p:par>
+                            </p:childTnLst>
+                          </p:cTn>
+                        </p:par>
+                      </p:childTnLst>
+                    </p:cTn>
+                  </p:par>
+                  <p:par>
+                    <p:cTn id="19" fill="hold">
+                      <p:stCondLst>
+                        <p:cond delay="indefinite"/>
+                      </p:stCondLst>
+                      <p:childTnLst>
+                        <p:par>
+                          <p:cTn id="20" fill="hold">
+                            <p:stCondLst>
+                              <p:cond delay="0"/>
+                            </p:stCondLst>
+                            <p:childTnLst>
+                              <p:par>
+                                <p:cTn id="21" presetID="1" presetClass="entr" presetSubtype="0" fill="hold" grpId="0" nodeType="clickEffect">
+                                  <p:stCondLst>
+                                    <p:cond delay="0"/>
+                                  </p:stCondLst>
+                                  <p:childTnLst>
+                                    <p:set>
+                                      <p:cBhvr>
+                                        <p:cTn id="22" dur="1" fill="hold">
+                                          <p:stCondLst>
+                                            <p:cond delay="0"/>
+                                          </p:stCondLst>
+                                        </p:cTn>
+                                        <p:tgtEl>
+                                          <p:spTgt spid="3">
+                                            <p:txEl>
+                                              <p:pRg st="4" end="4"/>
+                                            </p:txEl>
+                                          </p:spTgt>
+                                        </p:tgtEl>
+                                        <p:attrNameLst>
+                                          <p:attrName>style.visibility</p:attrName>
+                                        </p:attrNameLst>
+                                      </p:cBhvr>
+                                      <p:to>
+                                        <p:strVal val="visible"/>
+                                      </p:to>
+                                    </p:set>
+                                  </p:childTnLst>
+                                </p:cTn>
+                              </p:par>
+                            </p:childTnLst>
+                          </p:cTn>
+                        </p:par>
+                      </p:childTnLst>
+                    </p:cTn>
+                  </p:par>
+                </p:childTnLst>
+              </p:cTn>
+              <p:prevCondLst>
+                <p:cond evt="onPrev" delay="0">
+                  <p:tgtEl>
+                    <p:sldTgt/>
+                  </p:tgtEl>
+                </p:cond>
+              </p:prevCondLst>
+              <p:nextCondLst>
+                <p:cond evt="onNext" delay="0">
+                  <p:tgtEl>
+                    <p:sldTgt/>
+                  </p:tgtEl>
+                </p:cond>
+              </p:nextCondLst>
+            </p:seq>
+          </p:childTnLst>
+        </p:cTn>
+      </p:par>
+    </p:tnLst>
+    <p:bldLst>
+      <p:bldP spid="3" grpId="0" build="p"/>
+    </p:bldLst>
+  </p:timing>
+</p:sld>
+</file>
+
+<file path=ppt/slides/slide12.xml><?xml version="1.0" encoding="utf-8"?>
+<p:sld xmlns:a="http://schemas.openxmlformats.org/drawingml/2006/main" xmlns:r="http://schemas.openxmlformats.org/officeDocument/2006/relationships" xmlns:p="http://schemas.openxmlformats.org/presentationml/2006/main">
+  <p:cSld>
+    <p:spTree>
+      <p:nvGrpSpPr>
+        <p:cNvPr id="1" name=""/>
+        <p:cNvGrpSpPr/>
+        <p:nvPr/>
+      </p:nvGrpSpPr>
+      <p:grpSpPr>
+        <a:xfrm>
+          <a:off x="0" y="0"/>
+          <a:ext cx="0" cy="0"/>
+          <a:chOff x="0" y="0"/>
+          <a:chExt cx="0" cy="0"/>
+        </a:xfrm>
+      </p:grpSpPr>
+      <p:sp>
+        <p:nvSpPr>
+          <p:cNvPr id="2" name="Title 1">
+            <a:extLst>
+              <a:ext uri="{FF2B5EF4-FFF2-40B4-BE49-F238E27FC236}">
+                <a16:creationId xmlns:a16="http://schemas.microsoft.com/office/drawing/2014/main" id="{323FA6F3-109C-4DE0-B86F-5C0467EBD8FD}"/>
+              </a:ext>
+            </a:extLst>
+          </p:cNvPr>
+          <p:cNvSpPr>
+            <a:spLocks noGrp="1"/>
+          </p:cNvSpPr>
+          <p:nvPr>
+            <p:ph type="title"/>
+          </p:nvPr>
+        </p:nvSpPr>
+        <p:spPr/>
+        <p:txBody>
+          <a:bodyPr/>
+          <a:lstStyle/>
+          <a:p>
+            <a:r>
+              <a:rPr lang="en-US" dirty="0">
+                <a:latin typeface="Garamond" panose="02020404030301010803" pitchFamily="18" charset="0"/>
+              </a:rPr>
+              <a:t>Preparation of Data Set</a:t>
+            </a:r>
+            <a:endParaRPr lang="en-IN" dirty="0">
+              <a:latin typeface="Garamond" panose="02020404030301010803" pitchFamily="18" charset="0"/>
+            </a:endParaRPr>
+          </a:p>
+        </p:txBody>
+      </p:sp>
+      <p:sp>
+        <p:nvSpPr>
+          <p:cNvPr id="3" name="Content Placeholder 2">
+            <a:extLst>
+              <a:ext uri="{FF2B5EF4-FFF2-40B4-BE49-F238E27FC236}">
+                <a16:creationId xmlns:a16="http://schemas.microsoft.com/office/drawing/2014/main" id="{46EF48B6-9995-458D-AA70-B7B974D14D25}"/>
+              </a:ext>
+            </a:extLst>
+          </p:cNvPr>
+          <p:cNvSpPr>
+            <a:spLocks noGrp="1"/>
+          </p:cNvSpPr>
+          <p:nvPr>
+            <p:ph idx="1"/>
+          </p:nvPr>
+        </p:nvSpPr>
+        <p:spPr>
+          <a:xfrm>
+            <a:off x="838200" y="1690688"/>
+            <a:ext cx="10515600" cy="4486275"/>
+          </a:xfrm>
+        </p:spPr>
+        <p:txBody>
+          <a:bodyPr>
+            <a:normAutofit fontScale="92500" lnSpcReduction="20000"/>
+          </a:bodyPr>
+          <a:lstStyle/>
+          <a:p>
+            <a:r>
+              <a:rPr lang="en-US" dirty="0">
+                <a:latin typeface="Frank Ruhl Hofshi" panose="00000500000000000000" pitchFamily="50" charset="-79"/>
+                <a:cs typeface="Frank Ruhl Hofshi" panose="00000500000000000000" pitchFamily="50" charset="-79"/>
+              </a:rPr>
+              <a:t>Data Segmented into Word-Sized Images</a:t>
+            </a:r>
+          </a:p>
+          <a:p>
+            <a:endParaRPr lang="en-US" dirty="0">
+              <a:latin typeface="Frank Ruhl Hofshi" panose="00000500000000000000" pitchFamily="50" charset="-79"/>
+              <a:cs typeface="Frank Ruhl Hofshi" panose="00000500000000000000" pitchFamily="50" charset="-79"/>
+            </a:endParaRPr>
+          </a:p>
+          <a:p>
+            <a:pPr marL="0" indent="0">
+              <a:buNone/>
+            </a:pPr>
+            <a:r>
+              <a:rPr lang="en-US" b="1" dirty="0">
+                <a:latin typeface="Frank Ruhl Hofshi" panose="00000500000000000000" pitchFamily="50" charset="-79"/>
+                <a:cs typeface="Frank Ruhl Hofshi" panose="00000500000000000000" pitchFamily="50" charset="-79"/>
+              </a:rPr>
+              <a:t>Folder </a:t>
+            </a:r>
+            <a:r>
+              <a:rPr lang="en-IN" b="1" dirty="0">
+                <a:latin typeface="Frank Ruhl Hofshi" panose="00000500000000000000" pitchFamily="50" charset="-79"/>
+                <a:cs typeface="Frank Ruhl Hofshi" panose="00000500000000000000" pitchFamily="50" charset="-79"/>
+              </a:rPr>
+              <a:t>Organisation</a:t>
+            </a:r>
+          </a:p>
+          <a:p>
+            <a:pPr marL="0" indent="0">
+              <a:buNone/>
+            </a:pPr>
+            <a:endParaRPr lang="en-US" b="1" dirty="0">
+              <a:latin typeface="Frank Ruhl Hofshi" panose="00000500000000000000" pitchFamily="50" charset="-79"/>
+              <a:cs typeface="Frank Ruhl Hofshi" panose="00000500000000000000" pitchFamily="50" charset="-79"/>
+            </a:endParaRPr>
+          </a:p>
+          <a:p>
+            <a:r>
+              <a:rPr lang="en-US" dirty="0">
+                <a:latin typeface="Frank Ruhl Hofshi" panose="00000500000000000000" pitchFamily="50" charset="-79"/>
+                <a:cs typeface="Frank Ruhl Hofshi" panose="00000500000000000000" pitchFamily="50" charset="-79"/>
+              </a:rPr>
+              <a:t>Each Dataset has 20 Folders</a:t>
+            </a:r>
+          </a:p>
+          <a:p>
+            <a:r>
+              <a:rPr lang="en-US" dirty="0">
+                <a:latin typeface="Frank Ruhl Hofshi" panose="00000500000000000000" pitchFamily="50" charset="-79"/>
+                <a:cs typeface="Frank Ruhl Hofshi" panose="00000500000000000000" pitchFamily="50" charset="-79"/>
+              </a:rPr>
+              <a:t>Every Folder has Data for 2 Authors</a:t>
+            </a:r>
+          </a:p>
+          <a:p>
+            <a:r>
+              <a:rPr lang="en-US" dirty="0">
+                <a:latin typeface="Frank Ruhl Hofshi" panose="00000500000000000000" pitchFamily="50" charset="-79"/>
+                <a:cs typeface="Frank Ruhl Hofshi" panose="00000500000000000000" pitchFamily="50" charset="-79"/>
+              </a:rPr>
+              <a:t>5 Sets of Data for Each Author Pair</a:t>
+            </a:r>
+          </a:p>
+          <a:p>
+            <a:r>
+              <a:rPr lang="en-US" dirty="0">
+                <a:latin typeface="Frank Ruhl Hofshi" panose="00000500000000000000" pitchFamily="50" charset="-79"/>
+                <a:cs typeface="Frank Ruhl Hofshi" panose="00000500000000000000" pitchFamily="50" charset="-79"/>
+              </a:rPr>
+              <a:t>3 Training Sets and 2 Testing Sets</a:t>
+            </a:r>
+          </a:p>
+          <a:p>
+            <a:r>
+              <a:rPr lang="en-US" dirty="0">
+                <a:latin typeface="Frank Ruhl Hofshi" panose="00000500000000000000" pitchFamily="50" charset="-79"/>
+                <a:cs typeface="Frank Ruhl Hofshi" panose="00000500000000000000" pitchFamily="50" charset="-79"/>
+              </a:rPr>
+              <a:t>Tag Image File Format</a:t>
+            </a:r>
+          </a:p>
+          <a:p>
+            <a:r>
+              <a:rPr lang="en-US" dirty="0">
+                <a:latin typeface="Frank Ruhl Hofshi" panose="00000500000000000000" pitchFamily="50" charset="-79"/>
+                <a:cs typeface="Frank Ruhl Hofshi" panose="00000500000000000000" pitchFamily="50" charset="-79"/>
+              </a:rPr>
+              <a:t>Format: &lt;Author Code&gt;_&lt;Set Number&gt;_&lt;Image Number&gt;</a:t>
+            </a:r>
+          </a:p>
+          <a:p>
+            <a:r>
+              <a:rPr lang="en-US" dirty="0">
+                <a:latin typeface="Frank Ruhl Hofshi" panose="00000500000000000000" pitchFamily="50" charset="-79"/>
+                <a:cs typeface="Frank Ruhl Hofshi" panose="00000500000000000000" pitchFamily="50" charset="-79"/>
+              </a:rPr>
+              <a:t>5 Data Sets in Total</a:t>
+            </a:r>
+          </a:p>
+          <a:p>
+            <a:endParaRPr lang="en-US" dirty="0"/>
+          </a:p>
+          <a:p>
+            <a:endParaRPr lang="en-US" dirty="0"/>
+          </a:p>
+          <a:p>
+            <a:endParaRPr lang="en-US" dirty="0"/>
+          </a:p>
+          <a:p>
+            <a:endParaRPr lang="en-IN" dirty="0"/>
+          </a:p>
+        </p:txBody>
+      </p:sp>
+    </p:spTree>
+    <p:extLst>
+      <p:ext uri="{BB962C8B-B14F-4D97-AF65-F5344CB8AC3E}">
+        <p14:creationId xmlns:p14="http://schemas.microsoft.com/office/powerpoint/2010/main" val="3098385368"/>
+      </p:ext>
+    </p:extLst>
+  </p:cSld>
+  <p:clrMapOvr>
+    <a:masterClrMapping/>
+  </p:clrMapOvr>
+  <p:timing>
+    <p:tnLst>
+      <p:par>
+        <p:cTn id="1" dur="indefinite" restart="never" nodeType="tmRoot">
+          <p:childTnLst>
+            <p:seq concurrent="1" nextAc="seek">
+              <p:cTn id="2" dur="indefinite" nodeType="mainSeq">
+                <p:childTnLst>
+                  <p:par>
+                    <p:cTn id="3" fill="hold">
+                      <p:stCondLst>
+                        <p:cond delay="indefinite"/>
+                      </p:stCondLst>
+                      <p:childTnLst>
+                        <p:par>
+                          <p:cTn id="4" fill="hold">
+                            <p:stCondLst>
+                              <p:cond delay="0"/>
+                            </p:stCondLst>
+                            <p:childTnLst>
+                              <p:par>
+                                <p:cTn id="5" presetID="1" presetClass="entr" presetSubtype="0" fill="hold" grpId="0" nodeType="clickEffect">
+                                  <p:stCondLst>
+                                    <p:cond delay="0"/>
+                                  </p:stCondLst>
+                                  <p:childTnLst>
+                                    <p:set>
+                                      <p:cBhvr>
+                                        <p:cTn id="6" dur="1" fill="hold">
+                                          <p:stCondLst>
+                                            <p:cond delay="0"/>
+                                          </p:stCondLst>
+                                        </p:cTn>
+                                        <p:tgtEl>
+                                          <p:spTgt spid="3">
+                                            <p:txEl>
+                                              <p:pRg st="0" end="0"/>
+                                            </p:txEl>
+                                          </p:spTgt>
+                                        </p:tgtEl>
+                                        <p:attrNameLst>
+                                          <p:attrName>style.visibility</p:attrName>
+                                        </p:attrNameLst>
+                                      </p:cBhvr>
+                                      <p:to>
+                                        <p:strVal val="visible"/>
+                                      </p:to>
+                                    </p:set>
+                                  </p:childTnLst>
+                                </p:cTn>
+                              </p:par>
+                            </p:childTnLst>
+                          </p:cTn>
+                        </p:par>
+                      </p:childTnLst>
+                    </p:cTn>
+                  </p:par>
+                  <p:par>
+                    <p:cTn id="7" fill="hold">
+                      <p:stCondLst>
+                        <p:cond delay="indefinite"/>
+                      </p:stCondLst>
+                      <p:childTnLst>
+                        <p:par>
+                          <p:cTn id="8" fill="hold">
+                            <p:stCondLst>
+                              <p:cond delay="0"/>
+                            </p:stCondLst>
+                            <p:childTnLst>
+                              <p:par>
+                                <p:cTn id="9" presetID="1" presetClass="entr" presetSubtype="0" fill="hold" grpId="0" nodeType="clickEffect">
+                                  <p:stCondLst>
+                                    <p:cond delay="0"/>
+                                  </p:stCondLst>
+                                  <p:childTnLst>
+                                    <p:set>
+                                      <p:cBhvr>
+                                        <p:cTn id="10" dur="1" fill="hold">
+                                          <p:stCondLst>
+                                            <p:cond delay="0"/>
+                                          </p:stCondLst>
+                                        </p:cTn>
+                                        <p:tgtEl>
+                                          <p:spTgt spid="3">
+                                            <p:txEl>
+                                              <p:pRg st="2" end="2"/>
+                                            </p:txEl>
+                                          </p:spTgt>
+                                        </p:tgtEl>
+                                        <p:attrNameLst>
+                                          <p:attrName>style.visibility</p:attrName>
+                                        </p:attrNameLst>
+                                      </p:cBhvr>
+                                      <p:to>
+                                        <p:strVal val="visible"/>
+                                      </p:to>
+                                    </p:set>
+                                  </p:childTnLst>
+                                </p:cTn>
+                              </p:par>
+                            </p:childTnLst>
+                          </p:cTn>
+                        </p:par>
+                      </p:childTnLst>
+                    </p:cTn>
+                  </p:par>
+                  <p:par>
+                    <p:cTn id="11" fill="hold">
+                      <p:stCondLst>
+                        <p:cond delay="indefinite"/>
+                      </p:stCondLst>
+                      <p:childTnLst>
+                        <p:par>
+                          <p:cTn id="12" fill="hold">
+                            <p:stCondLst>
+                              <p:cond delay="0"/>
+                            </p:stCondLst>
+                            <p:childTnLst>
+                              <p:par>
+                                <p:cTn id="13" presetID="1" presetClass="entr" presetSubtype="0" fill="hold" grpId="0" nodeType="clickEffect">
+                                  <p:stCondLst>
+                                    <p:cond delay="0"/>
+                                  </p:stCondLst>
+                                  <p:childTnLst>
+                                    <p:set>
+                                      <p:cBhvr>
+                                        <p:cTn id="14" dur="1" fill="hold">
+                                          <p:stCondLst>
+                                            <p:cond delay="0"/>
+                                          </p:stCondLst>
+                                        </p:cTn>
+                                        <p:tgtEl>
+                                          <p:spTgt spid="3">
+                                            <p:txEl>
+                                              <p:pRg st="4" end="4"/>
+                                            </p:txEl>
+                                          </p:spTgt>
+                                        </p:tgtEl>
+                                        <p:attrNameLst>
+                                          <p:attrName>style.visibility</p:attrName>
+                                        </p:attrNameLst>
+                                      </p:cBhvr>
+                                      <p:to>
+                                        <p:strVal val="visible"/>
+                                      </p:to>
+                                    </p:set>
+                                  </p:childTnLst>
+                                </p:cTn>
+                              </p:par>
+                            </p:childTnLst>
+                          </p:cTn>
+                        </p:par>
+                      </p:childTnLst>
+                    </p:cTn>
+                  </p:par>
+                  <p:par>
+                    <p:cTn id="15" fill="hold">
+                      <p:stCondLst>
+                        <p:cond delay="indefinite"/>
+                      </p:stCondLst>
+                      <p:childTnLst>
+                        <p:par>
+                          <p:cTn id="16" fill="hold">
+                            <p:stCondLst>
+                              <p:cond delay="0"/>
+                            </p:stCondLst>
+                            <p:childTnLst>
+                              <p:par>
+                                <p:cTn id="17" presetID="1" presetClass="entr" presetSubtype="0" fill="hold" grpId="0" nodeType="clickEffect">
+                                  <p:stCondLst>
+                                    <p:cond delay="0"/>
+                                  </p:stCondLst>
+                                  <p:childTnLst>
+                                    <p:set>
+                                      <p:cBhvr>
+                                        <p:cTn id="18" dur="1" fill="hold">
+                                          <p:stCondLst>
+                                            <p:cond delay="0"/>
+                                          </p:stCondLst>
+                                        </p:cTn>
+                                        <p:tgtEl>
+                                          <p:spTgt spid="3">
+                                            <p:txEl>
+                                              <p:pRg st="5" end="5"/>
+                                            </p:txEl>
+                                          </p:spTgt>
+                                        </p:tgtEl>
+                                        <p:attrNameLst>
+                                          <p:attrName>style.visibility</p:attrName>
+                                        </p:attrNameLst>
+                                      </p:cBhvr>
+                                      <p:to>
+                                        <p:strVal val="visible"/>
+                                      </p:to>
+                                    </p:set>
+                                  </p:childTnLst>
+                                </p:cTn>
+                              </p:par>
+                            </p:childTnLst>
+                          </p:cTn>
+                        </p:par>
+                      </p:childTnLst>
+                    </p:cTn>
+                  </p:par>
+                  <p:par>
+                    <p:cTn id="19" fill="hold">
+                      <p:stCondLst>
+                        <p:cond delay="indefinite"/>
+                      </p:stCondLst>
+                      <p:childTnLst>
+                        <p:par>
+                          <p:cTn id="20" fill="hold">
+                            <p:stCondLst>
+                              <p:cond delay="0"/>
+                            </p:stCondLst>
+                            <p:childTnLst>
+                              <p:par>
+                                <p:cTn id="21" presetID="1" presetClass="entr" presetSubtype="0" fill="hold" grpId="0" nodeType="clickEffect">
+                                  <p:stCondLst>
+                                    <p:cond delay="0"/>
+                                  </p:stCondLst>
+                                  <p:childTnLst>
+                                    <p:set>
+                                      <p:cBhvr>
+                                        <p:cTn id="22" dur="1" fill="hold">
+                                          <p:stCondLst>
+                                            <p:cond delay="0"/>
+                                          </p:stCondLst>
+                                        </p:cTn>
+                                        <p:tgtEl>
+                                          <p:spTgt spid="3">
+                                            <p:txEl>
+                                              <p:pRg st="6" end="6"/>
+                                            </p:txEl>
+                                          </p:spTgt>
+                                        </p:tgtEl>
+                                        <p:attrNameLst>
+                                          <p:attrName>style.visibility</p:attrName>
+                                        </p:attrNameLst>
+                                      </p:cBhvr>
+                                      <p:to>
+                                        <p:strVal val="visible"/>
+                                      </p:to>
+                                    </p:set>
+                                  </p:childTnLst>
+                                </p:cTn>
+                              </p:par>
+                            </p:childTnLst>
+                          </p:cTn>
+                        </p:par>
+                      </p:childTnLst>
+                    </p:cTn>
+                  </p:par>
+                  <p:par>
+                    <p:cTn id="23" fill="hold">
+                      <p:stCondLst>
+                        <p:cond delay="indefinite"/>
+                      </p:stCondLst>
+                      <p:childTnLst>
+                        <p:par>
+                          <p:cTn id="24" fill="hold">
+                            <p:stCondLst>
+                              <p:cond delay="0"/>
+                            </p:stCondLst>
+                            <p:childTnLst>
+                              <p:par>
+                                <p:cTn id="25" presetID="1" presetClass="entr" presetSubtype="0" fill="hold" grpId="0" nodeType="clickEffect">
+                                  <p:stCondLst>
+                                    <p:cond delay="0"/>
+                                  </p:stCondLst>
+                                  <p:childTnLst>
+                                    <p:set>
+                                      <p:cBhvr>
+                                        <p:cTn id="26" dur="1" fill="hold">
+                                          <p:stCondLst>
+                                            <p:cond delay="0"/>
+                                          </p:stCondLst>
+                                        </p:cTn>
+                                        <p:tgtEl>
+                                          <p:spTgt spid="3">
+                                            <p:txEl>
+                                              <p:pRg st="7" end="7"/>
+                                            </p:txEl>
+                                          </p:spTgt>
+                                        </p:tgtEl>
+                                        <p:attrNameLst>
+                                          <p:attrName>style.visibility</p:attrName>
+                                        </p:attrNameLst>
+                                      </p:cBhvr>
+                                      <p:to>
+                                        <p:strVal val="visible"/>
+                                      </p:to>
+                                    </p:set>
+                                  </p:childTnLst>
+                                </p:cTn>
+                              </p:par>
+                            </p:childTnLst>
+                          </p:cTn>
+                        </p:par>
+                      </p:childTnLst>
+                    </p:cTn>
+                  </p:par>
+                  <p:par>
+                    <p:cTn id="27" fill="hold">
+                      <p:stCondLst>
+                        <p:cond delay="indefinite"/>
+                      </p:stCondLst>
+                      <p:childTnLst>
+                        <p:par>
+                          <p:cTn id="28" fill="hold">
+                            <p:stCondLst>
+                              <p:cond delay="0"/>
+                            </p:stCondLst>
+                            <p:childTnLst>
+                              <p:par>
+                                <p:cTn id="29" presetID="1" presetClass="entr" presetSubtype="0" fill="hold" grpId="0" nodeType="clickEffect">
+                                  <p:stCondLst>
+                                    <p:cond delay="0"/>
+                                  </p:stCondLst>
+                                  <p:childTnLst>
+                                    <p:set>
+                                      <p:cBhvr>
+                                        <p:cTn id="30" dur="1" fill="hold">
+                                          <p:stCondLst>
+                                            <p:cond delay="0"/>
+                                          </p:stCondLst>
+                                        </p:cTn>
+                                        <p:tgtEl>
+                                          <p:spTgt spid="3">
+                                            <p:txEl>
+                                              <p:pRg st="8" end="8"/>
+                                            </p:txEl>
+                                          </p:spTgt>
+                                        </p:tgtEl>
+                                        <p:attrNameLst>
+                                          <p:attrName>style.visibility</p:attrName>
+                                        </p:attrNameLst>
+                                      </p:cBhvr>
+                                      <p:to>
+                                        <p:strVal val="visible"/>
+                                      </p:to>
+                                    </p:set>
+                                  </p:childTnLst>
+                                </p:cTn>
+                              </p:par>
+                            </p:childTnLst>
+                          </p:cTn>
+                        </p:par>
+                      </p:childTnLst>
+                    </p:cTn>
+                  </p:par>
+                  <p:par>
+                    <p:cTn id="31" fill="hold">
+                      <p:stCondLst>
+                        <p:cond delay="indefinite"/>
+                      </p:stCondLst>
+                      <p:childTnLst>
+                        <p:par>
+                          <p:cTn id="32" fill="hold">
+                            <p:stCondLst>
+                              <p:cond delay="0"/>
+                            </p:stCondLst>
+                            <p:childTnLst>
+                              <p:par>
+                                <p:cTn id="33" presetID="1" presetClass="entr" presetSubtype="0" fill="hold" grpId="0" nodeType="clickEffect">
+                                  <p:stCondLst>
+                                    <p:cond delay="0"/>
+                                  </p:stCondLst>
+                                  <p:childTnLst>
+                                    <p:set>
+                                      <p:cBhvr>
+                                        <p:cTn id="34" dur="1" fill="hold">
+                                          <p:stCondLst>
+                                            <p:cond delay="0"/>
+                                          </p:stCondLst>
+                                        </p:cTn>
+                                        <p:tgtEl>
+                                          <p:spTgt spid="3">
+                                            <p:txEl>
+                                              <p:pRg st="9" end="9"/>
+                                            </p:txEl>
+                                          </p:spTgt>
+                                        </p:tgtEl>
+                                        <p:attrNameLst>
+                                          <p:attrName>style.visibility</p:attrName>
+                                        </p:attrNameLst>
+                                      </p:cBhvr>
+                                      <p:to>
+                                        <p:strVal val="visible"/>
+                                      </p:to>
+                                    </p:set>
+                                  </p:childTnLst>
+                                </p:cTn>
+                              </p:par>
+                            </p:childTnLst>
+                          </p:cTn>
+                        </p:par>
+                      </p:childTnLst>
+                    </p:cTn>
+                  </p:par>
+                  <p:par>
+                    <p:cTn id="35" fill="hold">
+                      <p:stCondLst>
+                        <p:cond delay="indefinite"/>
+                      </p:stCondLst>
+                      <p:childTnLst>
+                        <p:par>
+                          <p:cTn id="36" fill="hold">
+                            <p:stCondLst>
+                              <p:cond delay="0"/>
+                            </p:stCondLst>
+                            <p:childTnLst>
+                              <p:par>
+                                <p:cTn id="37" presetID="1" presetClass="entr" presetSubtype="0" fill="hold" grpId="0" nodeType="clickEffect">
+                                  <p:stCondLst>
+                                    <p:cond delay="0"/>
+                                  </p:stCondLst>
+                                  <p:childTnLst>
+                                    <p:set>
+                                      <p:cBhvr>
+                                        <p:cTn id="38" dur="1" fill="hold">
+                                          <p:stCondLst>
+                                            <p:cond delay="0"/>
+                                          </p:stCondLst>
+                                        </p:cTn>
+                                        <p:tgtEl>
+                                          <p:spTgt spid="3">
+                                            <p:txEl>
+                                              <p:pRg st="10" end="10"/>
+                                            </p:txEl>
+                                          </p:spTgt>
+                                        </p:tgtEl>
+                                        <p:attrNameLst>
+                                          <p:attrName>style.visibility</p:attrName>
+                                        </p:attrNameLst>
+                                      </p:cBhvr>
+                                      <p:to>
+                                        <p:strVal val="visible"/>
+                                      </p:to>
+                                    </p:set>
+                                  </p:childTnLst>
+                                </p:cTn>
+                              </p:par>
+                            </p:childTnLst>
+                          </p:cTn>
+                        </p:par>
+                      </p:childTnLst>
+                    </p:cTn>
+                  </p:par>
+                </p:childTnLst>
+              </p:cTn>
+              <p:prevCondLst>
+                <p:cond evt="onPrev" delay="0">
+                  <p:tgtEl>
+                    <p:sldTgt/>
+                  </p:tgtEl>
+                </p:cond>
+              </p:prevCondLst>
+              <p:nextCondLst>
+                <p:cond evt="onNext" delay="0">
+                  <p:tgtEl>
+                    <p:sldTgt/>
+                  </p:tgtEl>
+                </p:cond>
+              </p:nextCondLst>
+            </p:seq>
+          </p:childTnLst>
+        </p:cTn>
+      </p:par>
+    </p:tnLst>
+    <p:bldLst>
+      <p:bldP spid="3" grpId="0" build="p"/>
+    </p:bldLst>
+  </p:timing>
+</p:sld>
+</file>
+
+<file path=ppt/slides/slide13.xml><?xml version="1.0" encoding="utf-8"?>
 <p:sld xmlns:a="http://schemas.openxmlformats.org/drawingml/2006/main" xmlns:r="http://schemas.openxmlformats.org/officeDocument/2006/relationships" xmlns:p="http://schemas.openxmlformats.org/presentationml/2006/main">
   <p:cSld>
     <p:spTree>
@@ -12815,7 +14287,7 @@
 </p:sld>
 </file>
 
-<file path=ppt/slides/slide11.xml><?xml version="1.0" encoding="utf-8"?>
+<file path=ppt/slides/slide14.xml><?xml version="1.0" encoding="utf-8"?>
 <p:sld xmlns:a="http://schemas.openxmlformats.org/drawingml/2006/main" xmlns:r="http://schemas.openxmlformats.org/officeDocument/2006/relationships" xmlns:p="http://schemas.openxmlformats.org/presentationml/2006/main">
   <p:cSld>
     <p:spTree>
@@ -13053,7 +14525,7 @@
 </p:sld>
 </file>
 
-<file path=ppt/slides/slide12.xml><?xml version="1.0" encoding="utf-8"?>
+<file path=ppt/slides/slide15.xml><?xml version="1.0" encoding="utf-8"?>
 <p:sld xmlns:a="http://schemas.openxmlformats.org/drawingml/2006/main" xmlns:r="http://schemas.openxmlformats.org/officeDocument/2006/relationships" xmlns:p="http://schemas.openxmlformats.org/presentationml/2006/main">
   <p:cSld>
     <p:spTree>
@@ -13163,7 +14635,7 @@
 </p:sld>
 </file>
 
-<file path=ppt/slides/slide13.xml><?xml version="1.0" encoding="utf-8"?>
+<file path=ppt/slides/slide16.xml><?xml version="1.0" encoding="utf-8"?>
 <p:sld xmlns:a="http://schemas.openxmlformats.org/drawingml/2006/main" xmlns:r="http://schemas.openxmlformats.org/officeDocument/2006/relationships" xmlns:p="http://schemas.openxmlformats.org/presentationml/2006/main">
   <p:cSld>
     <p:spTree>
@@ -13746,7 +15218,7 @@
 </p:sld>
 </file>
 
-<file path=ppt/slides/slide14.xml><?xml version="1.0" encoding="utf-8"?>
+<file path=ppt/slides/slide17.xml><?xml version="1.0" encoding="utf-8"?>
 <p:sld xmlns:a="http://schemas.openxmlformats.org/drawingml/2006/main" xmlns:r="http://schemas.openxmlformats.org/officeDocument/2006/relationships" xmlns:p="http://schemas.openxmlformats.org/presentationml/2006/main">
   <p:cSld>
     <p:spTree>
@@ -14325,7 +15797,7 @@
 </p:sld>
 </file>
 
-<file path=ppt/slides/slide15.xml><?xml version="1.0" encoding="utf-8"?>
+<file path=ppt/slides/slide18.xml><?xml version="1.0" encoding="utf-8"?>
 <p:sld xmlns:a="http://schemas.openxmlformats.org/drawingml/2006/main" xmlns:r="http://schemas.openxmlformats.org/officeDocument/2006/relationships" xmlns:p="http://schemas.openxmlformats.org/presentationml/2006/main">
   <p:cSld>
     <p:spTree>
@@ -14709,7 +16181,7 @@
 </p:sld>
 </file>
 
-<file path=ppt/slides/slide16.xml><?xml version="1.0" encoding="utf-8"?>
+<file path=ppt/slides/slide19.xml><?xml version="1.0" encoding="utf-8"?>
 <p:sld xmlns:a="http://schemas.openxmlformats.org/drawingml/2006/main" xmlns:r="http://schemas.openxmlformats.org/officeDocument/2006/relationships" xmlns:p="http://schemas.openxmlformats.org/presentationml/2006/main">
   <p:cSld>
     <p:spTree>
@@ -17678,6 +19150,66 @@
           <a:bodyPr/>
           <a:lstStyle/>
           <a:p>
+            <a:r>
+              <a:rPr lang="en-US" dirty="0">
+                <a:latin typeface="Frank Ruhl Hofshi" panose="00000500000000000000" pitchFamily="50" charset="-79"/>
+                <a:cs typeface="Frank Ruhl Hofshi" panose="00000500000000000000" pitchFamily="50" charset="-79"/>
+              </a:rPr>
+              <a:t>Lack of Work</a:t>
+            </a:r>
+          </a:p>
+          <a:p>
+            <a:r>
+              <a:rPr lang="en-US" dirty="0">
+                <a:latin typeface="Frank Ruhl Hofshi" panose="00000500000000000000" pitchFamily="50" charset="-79"/>
+                <a:cs typeface="Frank Ruhl Hofshi" panose="00000500000000000000" pitchFamily="50" charset="-79"/>
+              </a:rPr>
+              <a:t>Adak et al.</a:t>
+            </a:r>
+          </a:p>
+          <a:p>
+            <a:endParaRPr lang="en-US" dirty="0">
+              <a:latin typeface="Frank Ruhl Hofshi" panose="00000500000000000000" pitchFamily="50" charset="-79"/>
+              <a:cs typeface="Frank Ruhl Hofshi" panose="00000500000000000000" pitchFamily="50" charset="-79"/>
+            </a:endParaRPr>
+          </a:p>
+          <a:p>
+            <a:pPr marL="0" indent="0">
+              <a:buNone/>
+            </a:pPr>
+            <a:r>
+              <a:rPr lang="en-US" b="1" dirty="0">
+                <a:latin typeface="Frank Ruhl Hofshi" panose="00000500000000000000" pitchFamily="50" charset="-79"/>
+                <a:cs typeface="Frank Ruhl Hofshi" panose="00000500000000000000" pitchFamily="50" charset="-79"/>
+              </a:rPr>
+              <a:t>Summary of Adak et al.</a:t>
+            </a:r>
+          </a:p>
+          <a:p>
+            <a:r>
+              <a:rPr lang="en-US" dirty="0">
+                <a:latin typeface="Frank Ruhl Hofshi" panose="00000500000000000000" pitchFamily="50" charset="-79"/>
+                <a:cs typeface="Frank Ruhl Hofshi" panose="00000500000000000000" pitchFamily="50" charset="-79"/>
+              </a:rPr>
+              <a:t>High intra-variable handwriting-based writer identification/verification</a:t>
+            </a:r>
+          </a:p>
+          <a:p>
+            <a:r>
+              <a:rPr lang="en-US" dirty="0">
+                <a:latin typeface="Frank Ruhl Hofshi" panose="00000500000000000000" pitchFamily="50" charset="-79"/>
+                <a:cs typeface="Frank Ruhl Hofshi" panose="00000500000000000000" pitchFamily="50" charset="-79"/>
+              </a:rPr>
+              <a:t>Both handcrafted and auto-derived feature-based models are considered</a:t>
+            </a:r>
+          </a:p>
+          <a:p>
+            <a:endParaRPr lang="en-US" dirty="0">
+              <a:latin typeface="Frank Ruhl Hofshi" panose="00000500000000000000" pitchFamily="50" charset="-79"/>
+              <a:cs typeface="Frank Ruhl Hofshi" panose="00000500000000000000" pitchFamily="50" charset="-79"/>
+            </a:endParaRPr>
+          </a:p>
+          <a:p>
             <a:endParaRPr lang="en-IN" dirty="0">
               <a:latin typeface="Frank Ruhl Hofshi" panose="00000500000000000000" pitchFamily="50" charset="-79"/>
               <a:cs typeface="Frank Ruhl Hofshi" panose="00000500000000000000" pitchFamily="50" charset="-79"/>
@@ -17689,139 +19221,6 @@
     <p:extLst>
       <p:ext uri="{BB962C8B-B14F-4D97-AF65-F5344CB8AC3E}">
         <p14:creationId xmlns:p14="http://schemas.microsoft.com/office/powerpoint/2010/main" val="4232411944"/>
-      </p:ext>
-    </p:extLst>
-  </p:cSld>
-  <p:clrMapOvr>
-    <a:masterClrMapping/>
-  </p:clrMapOvr>
-</p:sld>
-</file>
-
-<file path=ppt/slides/slide8.xml><?xml version="1.0" encoding="utf-8"?>
-<p:sld xmlns:a="http://schemas.openxmlformats.org/drawingml/2006/main" xmlns:r="http://schemas.openxmlformats.org/officeDocument/2006/relationships" xmlns:p="http://schemas.openxmlformats.org/presentationml/2006/main">
-  <p:cSld>
-    <p:spTree>
-      <p:nvGrpSpPr>
-        <p:cNvPr id="1" name=""/>
-        <p:cNvGrpSpPr/>
-        <p:nvPr/>
-      </p:nvGrpSpPr>
-      <p:grpSpPr>
-        <a:xfrm>
-          <a:off x="0" y="0"/>
-          <a:ext cx="0" cy="0"/>
-          <a:chOff x="0" y="0"/>
-          <a:chExt cx="0" cy="0"/>
-        </a:xfrm>
-      </p:grpSpPr>
-      <p:sp>
-        <p:nvSpPr>
-          <p:cNvPr id="2" name="Title 1">
-            <a:extLst>
-              <a:ext uri="{FF2B5EF4-FFF2-40B4-BE49-F238E27FC236}">
-                <a16:creationId xmlns:a16="http://schemas.microsoft.com/office/drawing/2014/main" id="{643A320E-D976-47E4-929C-B3785801B479}"/>
-              </a:ext>
-            </a:extLst>
-          </p:cNvPr>
-          <p:cNvSpPr>
-            <a:spLocks noGrp="1"/>
-          </p:cNvSpPr>
-          <p:nvPr>
-            <p:ph type="title"/>
-          </p:nvPr>
-        </p:nvSpPr>
-        <p:spPr/>
-        <p:txBody>
-          <a:bodyPr/>
-          <a:lstStyle/>
-          <a:p>
-            <a:r>
-              <a:rPr lang="en-US" dirty="0">
-                <a:latin typeface="Garamond" panose="02020404030301010803" pitchFamily="18" charset="0"/>
-              </a:rPr>
-              <a:t>Collection of Data Set</a:t>
-            </a:r>
-            <a:endParaRPr lang="en-IN" dirty="0">
-              <a:latin typeface="Garamond" panose="02020404030301010803" pitchFamily="18" charset="0"/>
-            </a:endParaRPr>
-          </a:p>
-        </p:txBody>
-      </p:sp>
-      <p:sp>
-        <p:nvSpPr>
-          <p:cNvPr id="3" name="Content Placeholder 2">
-            <a:extLst>
-              <a:ext uri="{FF2B5EF4-FFF2-40B4-BE49-F238E27FC236}">
-                <a16:creationId xmlns:a16="http://schemas.microsoft.com/office/drawing/2014/main" id="{DDDF508F-4344-4318-A1AF-BCE8A393EBAF}"/>
-              </a:ext>
-            </a:extLst>
-          </p:cNvPr>
-          <p:cNvSpPr>
-            <a:spLocks noGrp="1"/>
-          </p:cNvSpPr>
-          <p:nvPr>
-            <p:ph idx="1"/>
-          </p:nvPr>
-        </p:nvSpPr>
-        <p:spPr/>
-        <p:txBody>
-          <a:bodyPr/>
-          <a:lstStyle/>
-          <a:p>
-            <a:r>
-              <a:rPr lang="en-US" dirty="0">
-                <a:latin typeface="Frank Ruhl Hofshi" panose="00000500000000000000" pitchFamily="50" charset="-79"/>
-                <a:cs typeface="Frank Ruhl Hofshi" panose="00000500000000000000" pitchFamily="50" charset="-79"/>
-              </a:rPr>
-              <a:t>121 volunteers</a:t>
-            </a:r>
-          </a:p>
-          <a:p>
-            <a:r>
-              <a:rPr lang="en-US" dirty="0">
-                <a:latin typeface="Frank Ruhl Hofshi" panose="00000500000000000000" pitchFamily="50" charset="-79"/>
-                <a:cs typeface="Frank Ruhl Hofshi" panose="00000500000000000000" pitchFamily="50" charset="-79"/>
-              </a:rPr>
-              <a:t>3 Language: English, Hindi, Bangla</a:t>
-            </a:r>
-          </a:p>
-          <a:p>
-            <a:r>
-              <a:rPr lang="en-US" dirty="0">
-                <a:latin typeface="Frank Ruhl Hofshi" panose="00000500000000000000" pitchFamily="50" charset="-79"/>
-                <a:cs typeface="Frank Ruhl Hofshi" panose="00000500000000000000" pitchFamily="50" charset="-79"/>
-              </a:rPr>
-              <a:t>Handwritten Passage</a:t>
-            </a:r>
-          </a:p>
-          <a:p>
-            <a:r>
-              <a:rPr lang="en-US" dirty="0">
-                <a:latin typeface="Frank Ruhl Hofshi" panose="00000500000000000000" pitchFamily="50" charset="-79"/>
-                <a:cs typeface="Frank Ruhl Hofshi" panose="00000500000000000000" pitchFamily="50" charset="-79"/>
-              </a:rPr>
-              <a:t>Passages scanned into images</a:t>
-            </a:r>
-          </a:p>
-          <a:p>
-            <a:r>
-              <a:rPr lang="en-US" dirty="0">
-                <a:latin typeface="Frank Ruhl Hofshi" panose="00000500000000000000" pitchFamily="50" charset="-79"/>
-                <a:cs typeface="Frank Ruhl Hofshi" panose="00000500000000000000" pitchFamily="50" charset="-79"/>
-              </a:rPr>
-              <a:t>Bangla Text only in our project</a:t>
-            </a:r>
-          </a:p>
-          <a:p>
-            <a:endParaRPr lang="en-US" dirty="0"/>
-          </a:p>
-        </p:txBody>
-      </p:sp>
-    </p:spTree>
-    <p:extLst>
-      <p:ext uri="{BB962C8B-B14F-4D97-AF65-F5344CB8AC3E}">
-        <p14:creationId xmlns:p14="http://schemas.microsoft.com/office/powerpoint/2010/main" val="1124173596"/>
       </p:ext>
     </p:extLst>
   </p:cSld>
@@ -17849,7 +19248,7 @@
                             </p:stCondLst>
                             <p:childTnLst>
                               <p:par>
-                                <p:cTn id="5" presetID="1" presetClass="entr" presetSubtype="0" fill="hold" grpId="0" nodeType="clickEffect">
+                                <p:cTn id="5" presetID="1" presetClass="entr" presetSubtype="0" fill="hold" nodeType="clickEffect">
                                   <p:stCondLst>
                                     <p:cond delay="0"/>
                                   </p:stCondLst>
@@ -17898,7 +19297,7 @@
                             </p:stCondLst>
                             <p:childTnLst>
                               <p:par>
-                                <p:cTn id="9" presetID="1" presetClass="entr" presetSubtype="0" fill="hold" grpId="0" nodeType="clickEffect">
+                                <p:cTn id="9" presetID="1" presetClass="entr" presetSubtype="0" fill="hold" nodeType="clickEffect">
                                   <p:stCondLst>
                                     <p:cond delay="0"/>
                                   </p:stCondLst>
@@ -17947,7 +19346,7 @@
                             </p:stCondLst>
                             <p:childTnLst>
                               <p:par>
-                                <p:cTn id="13" presetID="1" presetClass="entr" presetSubtype="0" fill="hold" grpId="0" nodeType="clickEffect">
+                                <p:cTn id="13" presetID="1" presetClass="entr" presetSubtype="0" fill="hold" nodeType="clickEffect">
                                   <p:stCondLst>
                                     <p:cond delay="0"/>
                                   </p:stCondLst>
@@ -17962,7 +19361,7 @@
                                         <p:tgtEl>
                                           <p:spTgt spid="3">
                                             <p:txEl>
-                                              <p:pRg st="2" end="2"/>
+                                              <p:pRg st="3" end="3"/>
                                             </p:txEl>
                                           </p:spTgt>
                                         </p:tgtEl>
@@ -17996,7 +19395,7 @@
                             </p:stCondLst>
                             <p:childTnLst>
                               <p:par>
-                                <p:cTn id="17" presetID="1" presetClass="entr" presetSubtype="0" fill="hold" grpId="0" nodeType="clickEffect">
+                                <p:cTn id="17" presetID="1" presetClass="entr" presetSubtype="0" fill="hold" nodeType="clickEffect">
                                   <p:stCondLst>
                                     <p:cond delay="0"/>
                                   </p:stCondLst>
@@ -18011,7 +19410,7 @@
                                         <p:tgtEl>
                                           <p:spTgt spid="3">
                                             <p:txEl>
-                                              <p:pRg st="3" end="3"/>
+                                              <p:pRg st="4" end="4"/>
                                             </p:txEl>
                                           </p:spTgt>
                                         </p:tgtEl>
@@ -18045,7 +19444,7 @@
                             </p:stCondLst>
                             <p:childTnLst>
                               <p:par>
-                                <p:cTn id="21" presetID="1" presetClass="entr" presetSubtype="0" fill="hold" grpId="0" nodeType="clickEffect">
+                                <p:cTn id="21" presetID="1" presetClass="entr" presetSubtype="0" fill="hold" nodeType="clickEffect">
                                   <p:stCondLst>
                                     <p:cond delay="0"/>
                                   </p:stCondLst>
@@ -18060,7 +19459,7 @@
                                         <p:tgtEl>
                                           <p:spTgt spid="3">
                                             <p:txEl>
-                                              <p:pRg st="4" end="4"/>
+                                              <p:pRg st="5" end="5"/>
                                             </p:txEl>
                                           </p:spTgt>
                                         </p:tgtEl>
@@ -18102,14 +19501,11 @@
         </p:cTn>
       </p:par>
     </p:tnLst>
-    <p:bldLst>
-      <p:bldP spid="3" grpId="0" build="p"/>
-    </p:bldLst>
   </p:timing>
 </p:sld>
 </file>
 
-<file path=ppt/slides/slide9.xml><?xml version="1.0" encoding="utf-8"?>
+<file path=ppt/slides/slide8.xml><?xml version="1.0" encoding="utf-8"?>
 <p:sld xmlns:a="http://schemas.openxmlformats.org/drawingml/2006/main" xmlns:r="http://schemas.openxmlformats.org/officeDocument/2006/relationships" xmlns:p="http://schemas.openxmlformats.org/presentationml/2006/main">
   <p:cSld>
     <p:spTree>
@@ -18131,7 +19527,7 @@
           <p:cNvPr id="2" name="Title 1">
             <a:extLst>
               <a:ext uri="{FF2B5EF4-FFF2-40B4-BE49-F238E27FC236}">
-                <a16:creationId xmlns:a16="http://schemas.microsoft.com/office/drawing/2014/main" id="{323FA6F3-109C-4DE0-B86F-5C0467EBD8FD}"/>
+                <a16:creationId xmlns:a16="http://schemas.microsoft.com/office/drawing/2014/main" id="{C5872436-0191-4215-8794-3E7446DE5AF3}"/>
               </a:ext>
             </a:extLst>
           </p:cNvPr>
@@ -18151,7 +19547,7 @@
               <a:rPr lang="en-US" dirty="0">
                 <a:latin typeface="Garamond" panose="02020404030301010803" pitchFamily="18" charset="0"/>
               </a:rPr>
-              <a:t>Preparation of Data Set</a:t>
+              <a:t>Summary of Present Work: Adak et al.</a:t>
             </a:r>
             <a:endParaRPr lang="en-IN" dirty="0">
               <a:latin typeface="Garamond" panose="02020404030301010803" pitchFamily="18" charset="0"/>
@@ -18164,7 +19560,7 @@
           <p:cNvPr id="3" name="Content Placeholder 2">
             <a:extLst>
               <a:ext uri="{FF2B5EF4-FFF2-40B4-BE49-F238E27FC236}">
-                <a16:creationId xmlns:a16="http://schemas.microsoft.com/office/drawing/2014/main" id="{46EF48B6-9995-458D-AA70-B7B974D14D25}"/>
+                <a16:creationId xmlns:a16="http://schemas.microsoft.com/office/drawing/2014/main" id="{4A25DC9A-62BA-4694-B3AB-CC5E355497A0}"/>
               </a:ext>
             </a:extLst>
           </p:cNvPr>
@@ -18175,16 +19571,9 @@
             <p:ph idx="1"/>
           </p:nvPr>
         </p:nvSpPr>
-        <p:spPr>
-          <a:xfrm>
-            <a:off x="838200" y="1690688"/>
-            <a:ext cx="10515600" cy="4486275"/>
-          </a:xfrm>
-        </p:spPr>
+        <p:spPr/>
         <p:txBody>
-          <a:bodyPr>
-            <a:normAutofit fontScale="92500" lnSpcReduction="20000"/>
-          </a:bodyPr>
+          <a:bodyPr/>
           <a:lstStyle/>
           <a:p>
             <a:r>
@@ -18192,124 +19581,75 @@
                 <a:latin typeface="Frank Ruhl Hofshi" panose="00000500000000000000" pitchFamily="50" charset="-79"/>
                 <a:cs typeface="Frank Ruhl Hofshi" panose="00000500000000000000" pitchFamily="50" charset="-79"/>
               </a:rPr>
-              <a:t>Data Segmented into Word-Sized Images</a:t>
-            </a:r>
-          </a:p>
-          <a:p>
+              <a:t>2 Offline Bangla intra-variable handwriting databases from 2 different sets of 100 writers</a:t>
+            </a:r>
+          </a:p>
+          <a:p>
+            <a:pPr lvl="1"/>
+            <a:r>
+              <a:rPr lang="en-US" dirty="0">
+                <a:latin typeface="Frank Ruhl Hofshi" panose="00000500000000000000" pitchFamily="50" charset="-79"/>
+                <a:cs typeface="Frank Ruhl Hofshi" panose="00000500000000000000" pitchFamily="50" charset="-79"/>
+              </a:rPr>
+              <a:t>Controlled</a:t>
+            </a:r>
+          </a:p>
+          <a:p>
+            <a:pPr lvl="1"/>
+            <a:r>
+              <a:rPr lang="en-US" dirty="0">
+                <a:latin typeface="Frank Ruhl Hofshi" panose="00000500000000000000" pitchFamily="50" charset="-79"/>
+                <a:cs typeface="Frank Ruhl Hofshi" panose="00000500000000000000" pitchFamily="50" charset="-79"/>
+              </a:rPr>
+              <a:t>Uncontrolled</a:t>
+            </a:r>
+          </a:p>
+          <a:p>
+            <a:pPr lvl="1"/>
             <a:endParaRPr lang="en-US" dirty="0">
               <a:latin typeface="Frank Ruhl Hofshi" panose="00000500000000000000" pitchFamily="50" charset="-79"/>
               <a:cs typeface="Frank Ruhl Hofshi" panose="00000500000000000000" pitchFamily="50" charset="-79"/>
             </a:endParaRPr>
           </a:p>
           <a:p>
-            <a:pPr marL="0" indent="0">
-              <a:buNone/>
-            </a:pPr>
-            <a:r>
-              <a:rPr lang="en-US" b="1" dirty="0">
-                <a:latin typeface="Frank Ruhl Hofshi" panose="00000500000000000000" pitchFamily="50" charset="-79"/>
-                <a:cs typeface="Frank Ruhl Hofshi" panose="00000500000000000000" pitchFamily="50" charset="-79"/>
-              </a:rPr>
-              <a:t>Folder </a:t>
-            </a:r>
-            <a:r>
-              <a:rPr lang="en-IN" b="1" dirty="0">
-                <a:latin typeface="Frank Ruhl Hofshi" panose="00000500000000000000" pitchFamily="50" charset="-79"/>
-                <a:cs typeface="Frank Ruhl Hofshi" panose="00000500000000000000" pitchFamily="50" charset="-79"/>
-              </a:rPr>
-              <a:t>Organisation</a:t>
-            </a:r>
-          </a:p>
-          <a:p>
-            <a:pPr marL="0" indent="0">
-              <a:buNone/>
-            </a:pPr>
-            <a:endParaRPr lang="en-US" b="1" dirty="0">
-              <a:latin typeface="Frank Ruhl Hofshi" panose="00000500000000000000" pitchFamily="50" charset="-79"/>
-              <a:cs typeface="Frank Ruhl Hofshi" panose="00000500000000000000" pitchFamily="50" charset="-79"/>
-            </a:endParaRPr>
-          </a:p>
-          <a:p>
             <a:r>
               <a:rPr lang="en-US" dirty="0">
                 <a:latin typeface="Frank Ruhl Hofshi" panose="00000500000000000000" pitchFamily="50" charset="-79"/>
                 <a:cs typeface="Frank Ruhl Hofshi" panose="00000500000000000000" pitchFamily="50" charset="-79"/>
               </a:rPr>
-              <a:t>Each Dataset has 20 Folders</a:t>
-            </a:r>
-          </a:p>
-          <a:p>
+              <a:t>2 Primary Tasks</a:t>
+            </a:r>
+          </a:p>
+          <a:p>
+            <a:pPr lvl="1"/>
             <a:r>
               <a:rPr lang="en-US" dirty="0">
                 <a:latin typeface="Frank Ruhl Hofshi" panose="00000500000000000000" pitchFamily="50" charset="-79"/>
                 <a:cs typeface="Frank Ruhl Hofshi" panose="00000500000000000000" pitchFamily="50" charset="-79"/>
               </a:rPr>
-              <a:t>Every Folder has Data for 2 Authors</a:t>
-            </a:r>
-          </a:p>
-          <a:p>
+              <a:t>Writer Identification: Multi-class Classification </a:t>
+            </a:r>
+          </a:p>
+          <a:p>
+            <a:pPr lvl="1"/>
             <a:r>
               <a:rPr lang="en-US" dirty="0">
                 <a:latin typeface="Frank Ruhl Hofshi" panose="00000500000000000000" pitchFamily="50" charset="-79"/>
                 <a:cs typeface="Frank Ruhl Hofshi" panose="00000500000000000000" pitchFamily="50" charset="-79"/>
               </a:rPr>
-              <a:t>5 Sets of Data for Each Author Pair</a:t>
-            </a:r>
-          </a:p>
-          <a:p>
-            <a:r>
-              <a:rPr lang="en-US" dirty="0">
-                <a:latin typeface="Frank Ruhl Hofshi" panose="00000500000000000000" pitchFamily="50" charset="-79"/>
-                <a:cs typeface="Frank Ruhl Hofshi" panose="00000500000000000000" pitchFamily="50" charset="-79"/>
-              </a:rPr>
-              <a:t>3 Training Sets and 2 Testing Sets</a:t>
-            </a:r>
-          </a:p>
-          <a:p>
-            <a:r>
-              <a:rPr lang="en-US" dirty="0">
-                <a:latin typeface="Frank Ruhl Hofshi" panose="00000500000000000000" pitchFamily="50" charset="-79"/>
-                <a:cs typeface="Frank Ruhl Hofshi" panose="00000500000000000000" pitchFamily="50" charset="-79"/>
-              </a:rPr>
-              <a:t>Tag Image File Format</a:t>
-            </a:r>
-          </a:p>
-          <a:p>
-            <a:r>
-              <a:rPr lang="en-US" dirty="0">
-                <a:latin typeface="Frank Ruhl Hofshi" panose="00000500000000000000" pitchFamily="50" charset="-79"/>
-                <a:cs typeface="Frank Ruhl Hofshi" panose="00000500000000000000" pitchFamily="50" charset="-79"/>
-              </a:rPr>
-              <a:t>Format: &lt;Author Code&gt;_&lt;Set Number&gt;_&lt;Image Number&gt;</a:t>
-            </a:r>
-          </a:p>
-          <a:p>
-            <a:r>
-              <a:rPr lang="en-US" dirty="0">
-                <a:latin typeface="Frank Ruhl Hofshi" panose="00000500000000000000" pitchFamily="50" charset="-79"/>
-                <a:cs typeface="Frank Ruhl Hofshi" panose="00000500000000000000" pitchFamily="50" charset="-79"/>
-              </a:rPr>
-              <a:t>5 Data Sets in Total</a:t>
-            </a:r>
-          </a:p>
-          <a:p>
-            <a:endParaRPr lang="en-US" dirty="0"/>
-          </a:p>
-          <a:p>
-            <a:endParaRPr lang="en-US" dirty="0"/>
-          </a:p>
-          <a:p>
-            <a:endParaRPr lang="en-US" dirty="0"/>
-          </a:p>
-          <a:p>
-            <a:endParaRPr lang="en-IN" dirty="0"/>
+              <a:t>Writer Verification: Binary Classification </a:t>
+            </a:r>
+            <a:endParaRPr lang="en-IN" dirty="0">
+              <a:latin typeface="Frank Ruhl Hofshi" panose="00000500000000000000" pitchFamily="50" charset="-79"/>
+              <a:cs typeface="Frank Ruhl Hofshi" panose="00000500000000000000" pitchFamily="50" charset="-79"/>
+            </a:endParaRPr>
           </a:p>
         </p:txBody>
       </p:sp>
     </p:spTree>
     <p:extLst>
       <p:ext uri="{BB962C8B-B14F-4D97-AF65-F5344CB8AC3E}">
-        <p14:creationId xmlns:p14="http://schemas.microsoft.com/office/powerpoint/2010/main" val="3098385368"/>
+        <p14:creationId xmlns:p14="http://schemas.microsoft.com/office/powerpoint/2010/main" val="1092332634"/>
       </p:ext>
     </p:extLst>
   </p:cSld>
@@ -18337,7 +19677,7 @@
                             </p:stCondLst>
                             <p:childTnLst>
                               <p:par>
-                                <p:cTn id="5" presetID="1" presetClass="entr" presetSubtype="0" fill="hold" grpId="0" nodeType="clickEffect">
+                                <p:cTn id="5" presetID="1" presetClass="entr" presetSubtype="0" fill="hold" nodeType="clickEffect">
                                   <p:stCondLst>
                                     <p:cond delay="0"/>
                                   </p:stCondLst>
@@ -18386,7 +19726,7 @@
                             </p:stCondLst>
                             <p:childTnLst>
                               <p:par>
-                                <p:cTn id="9" presetID="1" presetClass="entr" presetSubtype="0" fill="hold" grpId="0" nodeType="clickEffect">
+                                <p:cTn id="9" presetID="1" presetClass="entr" presetSubtype="0" fill="hold" nodeType="clickEffect">
                                   <p:stCondLst>
                                     <p:cond delay="0"/>
                                   </p:stCondLst>
@@ -18394,6 +19734,37 @@
                                     <p:set>
                                       <p:cBhvr>
                                         <p:cTn id="10" dur="1" fill="hold">
+                                          <p:stCondLst>
+                                            <p:cond delay="0"/>
+                                          </p:stCondLst>
+                                        </p:cTn>
+                                        <p:tgtEl>
+                                          <p:spTgt spid="3">
+                                            <p:txEl>
+                                              <p:pRg st="1" end="1"/>
+                                            </p:txEl>
+                                          </p:spTgt>
+                                        </p:tgtEl>
+                                        <p:attrNameLst>
+                                          <p:attrName>style.visibility</p:attrName>
+                                        </p:attrNameLst>
+                                      </p:cBhvr>
+                                      <p:to>
+                                        <p:strVal val="visible"/>
+                                      </p:to>
+                                    </p:set>
+                                  </p:childTnLst>
+                                </p:cTn>
+                              </p:par>
+                              <p:par>
+                                <p:cTn id="11" presetID="1" presetClass="entr" presetSubtype="0" fill="hold" nodeType="withEffect">
+                                  <p:stCondLst>
+                                    <p:cond delay="0"/>
+                                  </p:stCondLst>
+                                  <p:childTnLst>
+                                    <p:set>
+                                      <p:cBhvr>
+                                        <p:cTn id="12" dur="1" fill="hold">
                                           <p:stCondLst>
                                             <p:cond delay="0"/>
                                           </p:stCondLst>
@@ -18423,26 +19794,26 @@
                     </p:cTn>
                   </p:par>
                   <p:par>
-                    <p:cTn id="11" fill="hold">
+                    <p:cTn id="13" fill="hold">
                       <p:stCondLst>
                         <p:cond delay="indefinite"/>
                       </p:stCondLst>
                       <p:childTnLst>
                         <p:par>
-                          <p:cTn id="12" fill="hold">
+                          <p:cTn id="14" fill="hold">
                             <p:stCondLst>
                               <p:cond delay="0"/>
                             </p:stCondLst>
                             <p:childTnLst>
                               <p:par>
-                                <p:cTn id="13" presetID="1" presetClass="entr" presetSubtype="0" fill="hold" grpId="0" nodeType="clickEffect">
+                                <p:cTn id="15" presetID="1" presetClass="entr" presetSubtype="0" fill="hold" nodeType="clickEffect">
                                   <p:stCondLst>
                                     <p:cond delay="0"/>
                                   </p:stCondLst>
                                   <p:childTnLst>
                                     <p:set>
                                       <p:cBhvr>
-                                        <p:cTn id="14" dur="1" fill="hold">
+                                        <p:cTn id="16" dur="1" fill="hold">
                                           <p:stCondLst>
                                             <p:cond delay="0"/>
                                           </p:stCondLst>
@@ -18472,26 +19843,26 @@
                     </p:cTn>
                   </p:par>
                   <p:par>
-                    <p:cTn id="15" fill="hold">
+                    <p:cTn id="17" fill="hold">
                       <p:stCondLst>
                         <p:cond delay="indefinite"/>
                       </p:stCondLst>
                       <p:childTnLst>
                         <p:par>
-                          <p:cTn id="16" fill="hold">
+                          <p:cTn id="18" fill="hold">
                             <p:stCondLst>
                               <p:cond delay="0"/>
                             </p:stCondLst>
                             <p:childTnLst>
                               <p:par>
-                                <p:cTn id="17" presetID="1" presetClass="entr" presetSubtype="0" fill="hold" grpId="0" nodeType="clickEffect">
+                                <p:cTn id="19" presetID="1" presetClass="entr" presetSubtype="0" fill="hold" nodeType="clickEffect">
                                   <p:stCondLst>
                                     <p:cond delay="0"/>
                                   </p:stCondLst>
                                   <p:childTnLst>
                                     <p:set>
                                       <p:cBhvr>
-                                        <p:cTn id="18" dur="1" fill="hold">
+                                        <p:cTn id="20" dur="1" fill="hold">
                                           <p:stCondLst>
                                             <p:cond delay="0"/>
                                           </p:stCondLst>
@@ -18521,26 +19892,26 @@
                     </p:cTn>
                   </p:par>
                   <p:par>
-                    <p:cTn id="19" fill="hold">
+                    <p:cTn id="21" fill="hold">
                       <p:stCondLst>
                         <p:cond delay="indefinite"/>
                       </p:stCondLst>
                       <p:childTnLst>
                         <p:par>
-                          <p:cTn id="20" fill="hold">
+                          <p:cTn id="22" fill="hold">
                             <p:stCondLst>
                               <p:cond delay="0"/>
                             </p:stCondLst>
                             <p:childTnLst>
                               <p:par>
-                                <p:cTn id="21" presetID="1" presetClass="entr" presetSubtype="0" fill="hold" grpId="0" nodeType="clickEffect">
+                                <p:cTn id="23" presetID="1" presetClass="entr" presetSubtype="0" fill="hold" nodeType="clickEffect">
                                   <p:stCondLst>
                                     <p:cond delay="0"/>
                                   </p:stCondLst>
                                   <p:childTnLst>
                                     <p:set>
                                       <p:cBhvr>
-                                        <p:cTn id="22" dur="1" fill="hold">
+                                        <p:cTn id="24" dur="1" fill="hold">
                                           <p:stCondLst>
                                             <p:cond delay="0"/>
                                           </p:stCondLst>
@@ -18549,202 +19920,6 @@
                                           <p:spTgt spid="3">
                                             <p:txEl>
                                               <p:pRg st="6" end="6"/>
-                                            </p:txEl>
-                                          </p:spTgt>
-                                        </p:tgtEl>
-                                        <p:attrNameLst>
-                                          <p:attrName>style.visibility</p:attrName>
-                                        </p:attrNameLst>
-                                      </p:cBhvr>
-                                      <p:to>
-                                        <p:strVal val="visible"/>
-                                      </p:to>
-                                    </p:set>
-                                  </p:childTnLst>
-                                </p:cTn>
-                              </p:par>
-                            </p:childTnLst>
-                          </p:cTn>
-                        </p:par>
-                      </p:childTnLst>
-                    </p:cTn>
-                  </p:par>
-                  <p:par>
-                    <p:cTn id="23" fill="hold">
-                      <p:stCondLst>
-                        <p:cond delay="indefinite"/>
-                      </p:stCondLst>
-                      <p:childTnLst>
-                        <p:par>
-                          <p:cTn id="24" fill="hold">
-                            <p:stCondLst>
-                              <p:cond delay="0"/>
-                            </p:stCondLst>
-                            <p:childTnLst>
-                              <p:par>
-                                <p:cTn id="25" presetID="1" presetClass="entr" presetSubtype="0" fill="hold" grpId="0" nodeType="clickEffect">
-                                  <p:stCondLst>
-                                    <p:cond delay="0"/>
-                                  </p:stCondLst>
-                                  <p:childTnLst>
-                                    <p:set>
-                                      <p:cBhvr>
-                                        <p:cTn id="26" dur="1" fill="hold">
-                                          <p:stCondLst>
-                                            <p:cond delay="0"/>
-                                          </p:stCondLst>
-                                        </p:cTn>
-                                        <p:tgtEl>
-                                          <p:spTgt spid="3">
-                                            <p:txEl>
-                                              <p:pRg st="7" end="7"/>
-                                            </p:txEl>
-                                          </p:spTgt>
-                                        </p:tgtEl>
-                                        <p:attrNameLst>
-                                          <p:attrName>style.visibility</p:attrName>
-                                        </p:attrNameLst>
-                                      </p:cBhvr>
-                                      <p:to>
-                                        <p:strVal val="visible"/>
-                                      </p:to>
-                                    </p:set>
-                                  </p:childTnLst>
-                                </p:cTn>
-                              </p:par>
-                            </p:childTnLst>
-                          </p:cTn>
-                        </p:par>
-                      </p:childTnLst>
-                    </p:cTn>
-                  </p:par>
-                  <p:par>
-                    <p:cTn id="27" fill="hold">
-                      <p:stCondLst>
-                        <p:cond delay="indefinite"/>
-                      </p:stCondLst>
-                      <p:childTnLst>
-                        <p:par>
-                          <p:cTn id="28" fill="hold">
-                            <p:stCondLst>
-                              <p:cond delay="0"/>
-                            </p:stCondLst>
-                            <p:childTnLst>
-                              <p:par>
-                                <p:cTn id="29" presetID="1" presetClass="entr" presetSubtype="0" fill="hold" grpId="0" nodeType="clickEffect">
-                                  <p:stCondLst>
-                                    <p:cond delay="0"/>
-                                  </p:stCondLst>
-                                  <p:childTnLst>
-                                    <p:set>
-                                      <p:cBhvr>
-                                        <p:cTn id="30" dur="1" fill="hold">
-                                          <p:stCondLst>
-                                            <p:cond delay="0"/>
-                                          </p:stCondLst>
-                                        </p:cTn>
-                                        <p:tgtEl>
-                                          <p:spTgt spid="3">
-                                            <p:txEl>
-                                              <p:pRg st="8" end="8"/>
-                                            </p:txEl>
-                                          </p:spTgt>
-                                        </p:tgtEl>
-                                        <p:attrNameLst>
-                                          <p:attrName>style.visibility</p:attrName>
-                                        </p:attrNameLst>
-                                      </p:cBhvr>
-                                      <p:to>
-                                        <p:strVal val="visible"/>
-                                      </p:to>
-                                    </p:set>
-                                  </p:childTnLst>
-                                </p:cTn>
-                              </p:par>
-                            </p:childTnLst>
-                          </p:cTn>
-                        </p:par>
-                      </p:childTnLst>
-                    </p:cTn>
-                  </p:par>
-                  <p:par>
-                    <p:cTn id="31" fill="hold">
-                      <p:stCondLst>
-                        <p:cond delay="indefinite"/>
-                      </p:stCondLst>
-                      <p:childTnLst>
-                        <p:par>
-                          <p:cTn id="32" fill="hold">
-                            <p:stCondLst>
-                              <p:cond delay="0"/>
-                            </p:stCondLst>
-                            <p:childTnLst>
-                              <p:par>
-                                <p:cTn id="33" presetID="1" presetClass="entr" presetSubtype="0" fill="hold" grpId="0" nodeType="clickEffect">
-                                  <p:stCondLst>
-                                    <p:cond delay="0"/>
-                                  </p:stCondLst>
-                                  <p:childTnLst>
-                                    <p:set>
-                                      <p:cBhvr>
-                                        <p:cTn id="34" dur="1" fill="hold">
-                                          <p:stCondLst>
-                                            <p:cond delay="0"/>
-                                          </p:stCondLst>
-                                        </p:cTn>
-                                        <p:tgtEl>
-                                          <p:spTgt spid="3">
-                                            <p:txEl>
-                                              <p:pRg st="9" end="9"/>
-                                            </p:txEl>
-                                          </p:spTgt>
-                                        </p:tgtEl>
-                                        <p:attrNameLst>
-                                          <p:attrName>style.visibility</p:attrName>
-                                        </p:attrNameLst>
-                                      </p:cBhvr>
-                                      <p:to>
-                                        <p:strVal val="visible"/>
-                                      </p:to>
-                                    </p:set>
-                                  </p:childTnLst>
-                                </p:cTn>
-                              </p:par>
-                            </p:childTnLst>
-                          </p:cTn>
-                        </p:par>
-                      </p:childTnLst>
-                    </p:cTn>
-                  </p:par>
-                  <p:par>
-                    <p:cTn id="35" fill="hold">
-                      <p:stCondLst>
-                        <p:cond delay="indefinite"/>
-                      </p:stCondLst>
-                      <p:childTnLst>
-                        <p:par>
-                          <p:cTn id="36" fill="hold">
-                            <p:stCondLst>
-                              <p:cond delay="0"/>
-                            </p:stCondLst>
-                            <p:childTnLst>
-                              <p:par>
-                                <p:cTn id="37" presetID="1" presetClass="entr" presetSubtype="0" fill="hold" grpId="0" nodeType="clickEffect">
-                                  <p:stCondLst>
-                                    <p:cond delay="0"/>
-                                  </p:stCondLst>
-                                  <p:childTnLst>
-                                    <p:set>
-                                      <p:cBhvr>
-                                        <p:cTn id="38" dur="1" fill="hold">
-                                          <p:stCondLst>
-                                            <p:cond delay="0"/>
-                                          </p:stCondLst>
-                                        </p:cTn>
-                                        <p:tgtEl>
-                                          <p:spTgt spid="3">
-                                            <p:txEl>
-                                              <p:pRg st="10" end="10"/>
                                             </p:txEl>
                                           </p:spTgt>
                                         </p:tgtEl>
@@ -18786,9 +19961,309 @@
         </p:cTn>
       </p:par>
     </p:tnLst>
-    <p:bldLst>
-      <p:bldP spid="3" grpId="0" build="p"/>
-    </p:bldLst>
+  </p:timing>
+</p:sld>
+</file>
+
+<file path=ppt/slides/slide9.xml><?xml version="1.0" encoding="utf-8"?>
+<p:sld xmlns:a="http://schemas.openxmlformats.org/drawingml/2006/main" xmlns:r="http://schemas.openxmlformats.org/officeDocument/2006/relationships" xmlns:p="http://schemas.openxmlformats.org/presentationml/2006/main">
+  <p:cSld>
+    <p:spTree>
+      <p:nvGrpSpPr>
+        <p:cNvPr id="1" name=""/>
+        <p:cNvGrpSpPr/>
+        <p:nvPr/>
+      </p:nvGrpSpPr>
+      <p:grpSpPr>
+        <a:xfrm>
+          <a:off x="0" y="0"/>
+          <a:ext cx="0" cy="0"/>
+          <a:chOff x="0" y="0"/>
+          <a:chExt cx="0" cy="0"/>
+        </a:xfrm>
+      </p:grpSpPr>
+      <p:sp>
+        <p:nvSpPr>
+          <p:cNvPr id="2" name="Title 1">
+            <a:extLst>
+              <a:ext uri="{FF2B5EF4-FFF2-40B4-BE49-F238E27FC236}">
+                <a16:creationId xmlns:a16="http://schemas.microsoft.com/office/drawing/2014/main" id="{60A0D986-15BD-47AA-A093-39C14BD2E700}"/>
+              </a:ext>
+            </a:extLst>
+          </p:cNvPr>
+          <p:cNvSpPr>
+            <a:spLocks noGrp="1"/>
+          </p:cNvSpPr>
+          <p:nvPr>
+            <p:ph type="title"/>
+          </p:nvPr>
+        </p:nvSpPr>
+        <p:spPr/>
+        <p:txBody>
+          <a:bodyPr/>
+          <a:lstStyle/>
+          <a:p>
+            <a:r>
+              <a:rPr lang="en-US" dirty="0">
+                <a:latin typeface="Garamond" panose="02020404030301010803" pitchFamily="18" charset="0"/>
+              </a:rPr>
+              <a:t>Summary of Present Work: Adak et al.</a:t>
+            </a:r>
+            <a:endParaRPr lang="en-IN" dirty="0">
+              <a:latin typeface="Garamond" panose="02020404030301010803" pitchFamily="18" charset="0"/>
+            </a:endParaRPr>
+          </a:p>
+        </p:txBody>
+      </p:sp>
+      <p:sp>
+        <p:nvSpPr>
+          <p:cNvPr id="3" name="Content Placeholder 2">
+            <a:extLst>
+              <a:ext uri="{FF2B5EF4-FFF2-40B4-BE49-F238E27FC236}">
+                <a16:creationId xmlns:a16="http://schemas.microsoft.com/office/drawing/2014/main" id="{A4A83809-7AD3-401B-91A8-B38FDA02955B}"/>
+              </a:ext>
+            </a:extLst>
+          </p:cNvPr>
+          <p:cNvSpPr>
+            <a:spLocks noGrp="1"/>
+          </p:cNvSpPr>
+          <p:nvPr>
+            <p:ph idx="1"/>
+          </p:nvPr>
+        </p:nvSpPr>
+        <p:spPr/>
+        <p:txBody>
+          <a:bodyPr>
+            <a:normAutofit/>
+          </a:bodyPr>
+          <a:lstStyle/>
+          <a:p>
+            <a:pPr marL="0" indent="0">
+              <a:buNone/>
+            </a:pPr>
+            <a:r>
+              <a:rPr lang="en-US" b="1" dirty="0">
+                <a:latin typeface="Frank Ruhl Hofshi" panose="00000500000000000000" pitchFamily="50" charset="-79"/>
+                <a:cs typeface="Frank Ruhl Hofshi" panose="00000500000000000000" pitchFamily="50" charset="-79"/>
+              </a:rPr>
+              <a:t>Strategies</a:t>
+            </a:r>
+          </a:p>
+          <a:p>
+            <a:r>
+              <a:rPr lang="en-US" dirty="0">
+                <a:latin typeface="Frank Ruhl Hofshi" panose="00000500000000000000" pitchFamily="50" charset="-79"/>
+                <a:cs typeface="Frank Ruhl Hofshi" panose="00000500000000000000" pitchFamily="50" charset="-79"/>
+              </a:rPr>
+              <a:t>Handcrafted Feature-Based Identification/Verification</a:t>
+            </a:r>
+          </a:p>
+          <a:p>
+            <a:r>
+              <a:rPr lang="en-US" dirty="0">
+                <a:latin typeface="Frank Ruhl Hofshi" panose="00000500000000000000" pitchFamily="50" charset="-79"/>
+                <a:cs typeface="Frank Ruhl Hofshi" panose="00000500000000000000" pitchFamily="50" charset="-79"/>
+              </a:rPr>
+              <a:t>Auto-Derived Feature-Based Identification/Verification</a:t>
+            </a:r>
+          </a:p>
+          <a:p>
+            <a:endParaRPr lang="en-IN" dirty="0">
+              <a:latin typeface="Frank Ruhl Hofshi" panose="00000500000000000000" pitchFamily="50" charset="-79"/>
+              <a:cs typeface="Frank Ruhl Hofshi" panose="00000500000000000000" pitchFamily="50" charset="-79"/>
+            </a:endParaRPr>
+          </a:p>
+        </p:txBody>
+      </p:sp>
+    </p:spTree>
+    <p:extLst>
+      <p:ext uri="{BB962C8B-B14F-4D97-AF65-F5344CB8AC3E}">
+        <p14:creationId xmlns:p14="http://schemas.microsoft.com/office/powerpoint/2010/main" val="3397303208"/>
+      </p:ext>
+    </p:extLst>
+  </p:cSld>
+  <p:clrMapOvr>
+    <a:masterClrMapping/>
+  </p:clrMapOvr>
+  <p:timing>
+    <p:tnLst>
+      <p:par>
+        <p:cTn id="1" dur="indefinite" restart="never" nodeType="tmRoot">
+          <p:childTnLst>
+            <p:seq concurrent="1" nextAc="seek">
+              <p:cTn id="2" dur="indefinite" nodeType="mainSeq">
+                <p:childTnLst>
+                  <p:par>
+                    <p:cTn id="3" fill="hold">
+                      <p:stCondLst>
+                        <p:cond delay="indefinite"/>
+                        <p:cond evt="onBegin" delay="0">
+                          <p:tn val="2"/>
+                        </p:cond>
+                      </p:stCondLst>
+                      <p:childTnLst>
+                        <p:par>
+                          <p:cTn id="4" fill="hold">
+                            <p:stCondLst>
+                              <p:cond delay="0"/>
+                            </p:stCondLst>
+                            <p:childTnLst>
+                              <p:par>
+                                <p:cTn id="5" presetID="1" presetClass="entr" presetSubtype="0" fill="hold" nodeType="withEffect">
+                                  <p:stCondLst>
+                                    <p:cond delay="0"/>
+                                  </p:stCondLst>
+                                  <p:childTnLst>
+                                    <p:set>
+                                      <p:cBhvr>
+                                        <p:cTn id="6" dur="1" fill="hold">
+                                          <p:stCondLst>
+                                            <p:cond delay="0"/>
+                                          </p:stCondLst>
+                                        </p:cTn>
+                                        <p:tgtEl>
+                                          <p:spTgt spid="3">
+                                            <p:txEl>
+                                              <p:pRg st="0" end="0"/>
+                                            </p:txEl>
+                                          </p:spTgt>
+                                        </p:tgtEl>
+                                        <p:attrNameLst>
+                                          <p:attrName>style.visibility</p:attrName>
+                                        </p:attrNameLst>
+                                      </p:cBhvr>
+                                      <p:to>
+                                        <p:strVal val="visible"/>
+                                      </p:to>
+                                    </p:set>
+                                  </p:childTnLst>
+                                </p:cTn>
+                              </p:par>
+                            </p:childTnLst>
+                          </p:cTn>
+                        </p:par>
+                      </p:childTnLst>
+                    </p:cTn>
+                  </p:par>
+                  <p:par>
+                    <p:cTn id="7" fill="hold">
+                      <p:stCondLst>
+                        <p:cond delay="indefinite"/>
+                      </p:stCondLst>
+                      <p:childTnLst>
+                        <p:par>
+                          <p:cTn id="8" fill="hold">
+                            <p:stCondLst>
+                              <p:cond delay="0"/>
+                            </p:stCondLst>
+                            <p:childTnLst>
+                              <p:par>
+                                <p:cTn id="9" presetID="1" presetClass="entr" presetSubtype="0" fill="hold" nodeType="clickEffect">
+                                  <p:stCondLst>
+                                    <p:cond delay="0"/>
+                                  </p:stCondLst>
+                                  <p:childTnLst>
+                                    <p:set>
+                                      <p:cBhvr>
+                                        <p:cTn id="10" dur="1" fill="hold">
+                                          <p:stCondLst>
+                                            <p:cond delay="0"/>
+                                          </p:stCondLst>
+                                        </p:cTn>
+                                        <p:tgtEl>
+                                          <p:spTgt spid="3">
+                                            <p:txEl>
+                                              <p:pRg st="1" end="1"/>
+                                            </p:txEl>
+                                          </p:spTgt>
+                                        </p:tgtEl>
+                                        <p:attrNameLst>
+                                          <p:attrName>style.visibility</p:attrName>
+                                        </p:attrNameLst>
+                                      </p:cBhvr>
+                                      <p:to>
+                                        <p:strVal val="visible"/>
+                                      </p:to>
+                                    </p:set>
+                                  </p:childTnLst>
+                                </p:cTn>
+                              </p:par>
+                            </p:childTnLst>
+                          </p:cTn>
+                        </p:par>
+                      </p:childTnLst>
+                    </p:cTn>
+                  </p:par>
+                  <p:par>
+                    <p:cTn id="11" fill="hold">
+                      <p:stCondLst>
+                        <p:cond delay="indefinite"/>
+                      </p:stCondLst>
+                      <p:childTnLst>
+                        <p:par>
+                          <p:cTn id="12" fill="hold">
+                            <p:stCondLst>
+                              <p:cond delay="0"/>
+                            </p:stCondLst>
+                            <p:childTnLst>
+                              <p:par>
+                                <p:cTn id="13" presetID="1" presetClass="entr" presetSubtype="0" fill="hold" nodeType="clickEffect">
+                                  <p:stCondLst>
+                                    <p:cond delay="0"/>
+                                  </p:stCondLst>
+                                  <p:childTnLst>
+                                    <p:set>
+                                      <p:cBhvr>
+                                        <p:cTn id="14" dur="1" fill="hold">
+                                          <p:stCondLst>
+                                            <p:cond delay="0"/>
+                                          </p:stCondLst>
+                                        </p:cTn>
+                                        <p:tgtEl>
+                                          <p:spTgt spid="3">
+                                            <p:txEl>
+                                              <p:pRg st="2" end="2"/>
+                                            </p:txEl>
+                                          </p:spTgt>
+                                        </p:tgtEl>
+                                        <p:attrNameLst>
+                                          <p:attrName>style.visibility</p:attrName>
+                                        </p:attrNameLst>
+                                      </p:cBhvr>
+                                      <p:to>
+                                        <p:strVal val="visible"/>
+                                      </p:to>
+                                    </p:set>
+                                  </p:childTnLst>
+                                </p:cTn>
+                              </p:par>
+                            </p:childTnLst>
+                          </p:cTn>
+                        </p:par>
+                      </p:childTnLst>
+                    </p:cTn>
+                  </p:par>
+                </p:childTnLst>
+              </p:cTn>
+              <p:prevCondLst>
+                <p:cond evt="onPrev" delay="0">
+                  <p:tgtEl>
+                    <p:sldTgt/>
+                  </p:tgtEl>
+                </p:cond>
+              </p:prevCondLst>
+              <p:nextCondLst>
+                <p:cond evt="onNext" delay="0">
+                  <p:tgtEl>
+                    <p:sldTgt/>
+                  </p:tgtEl>
+                </p:cond>
+              </p:nextCondLst>
+            </p:seq>
+          </p:childTnLst>
+        </p:cTn>
+      </p:par>
+    </p:tnLst>
   </p:timing>
 </p:sld>
 </file>

</xml_diff>

<commit_message>
Update 4th Year Project Presentation.pptx
</commit_message>
<xml_diff>
--- a/Documentation/4th Year Project Presentation.pptx
+++ b/Documentation/4th Year Project Presentation.pptx
@@ -14632,6 +14632,81 @@
   <p:clrMapOvr>
     <a:masterClrMapping/>
   </p:clrMapOvr>
+  <p:timing>
+    <p:tnLst>
+      <p:par>
+        <p:cTn id="1" dur="indefinite" restart="never" nodeType="tmRoot">
+          <p:childTnLst>
+            <p:seq concurrent="1" nextAc="seek">
+              <p:cTn id="2" dur="indefinite" nodeType="mainSeq">
+                <p:childTnLst>
+                  <p:par>
+                    <p:cTn id="3" fill="hold">
+                      <p:stCondLst>
+                        <p:cond delay="indefinite"/>
+                      </p:stCondLst>
+                      <p:childTnLst>
+                        <p:par>
+                          <p:cTn id="4" fill="hold">
+                            <p:stCondLst>
+                              <p:cond delay="0"/>
+                            </p:stCondLst>
+                            <p:childTnLst>
+                              <p:par>
+                                <p:cTn id="5" presetID="1" presetClass="entr" presetSubtype="0" fill="hold" nodeType="clickEffect">
+                                  <p:stCondLst>
+                                    <p:cond delay="0"/>
+                                  </p:stCondLst>
+                                  <p:childTnLst>
+                                    <p:set>
+                                      <p:cBhvr>
+                                        <p:cTn id="6" dur="1" fill="hold">
+                                          <p:stCondLst>
+                                            <p:cond delay="0"/>
+                                          </p:stCondLst>
+                                        </p:cTn>
+                                        <p:tgtEl>
+                                          <p:spTgt spid="1026"/>
+                                        </p:tgtEl>
+                                        <p:attrNameLst>
+                                          <p:attrName>style.visibility</p:attrName>
+                                        </p:attrNameLst>
+                                      </p:cBhvr>
+                                      <p:to>
+                                        <p:strVal val="visible"/>
+                                      </p:to>
+                                    </p:set>
+                                  </p:childTnLst>
+                                </p:cTn>
+                              </p:par>
+                            </p:childTnLst>
+                          </p:cTn>
+                        </p:par>
+                      </p:childTnLst>
+                    </p:cTn>
+                  </p:par>
+                </p:childTnLst>
+              </p:cTn>
+              <p:prevCondLst>
+                <p:cond evt="onPrev" delay="0">
+                  <p:tgtEl>
+                    <p:sldTgt/>
+                  </p:tgtEl>
+                </p:cond>
+              </p:prevCondLst>
+              <p:nextCondLst>
+                <p:cond evt="onNext" delay="0">
+                  <p:tgtEl>
+                    <p:sldTgt/>
+                  </p:tgtEl>
+                </p:cond>
+              </p:nextCondLst>
+            </p:seq>
+          </p:childTnLst>
+        </p:cTn>
+      </p:par>
+    </p:tnLst>
+  </p:timing>
 </p:sld>
 </file>
 
@@ -14736,6 +14811,9 @@
                     <p:cTn id="3" fill="hold">
                       <p:stCondLst>
                         <p:cond delay="indefinite"/>
+                        <p:cond evt="onBegin" delay="0">
+                          <p:tn val="2"/>
+                        </p:cond>
                       </p:stCondLst>
                       <p:childTnLst>
                         <p:par>
@@ -14745,7 +14823,7 @@
                             </p:stCondLst>
                             <p:childTnLst>
                               <p:par>
-                                <p:cTn id="5" presetID="1" presetClass="entr" presetSubtype="0" fill="hold" grpId="0" nodeType="clickEffect">
+                                <p:cTn id="5" presetID="1" presetClass="entr" presetSubtype="0" fill="hold" grpId="0" nodeType="withEffect">
                                   <p:stCondLst>
                                     <p:cond delay="0"/>
                                   </p:stCondLst>

</xml_diff>